<commit_message>
SOAS-6_1: code for Aufgabe c + d
</commit_message>
<xml_diff>
--- a/Blatt-06/Präsentation.pptx
+++ b/Blatt-06/Präsentation.pptx
@@ -5,15 +5,17 @@
     <p:sldMasterId id="2147483705" r:id="rId1"/>
   </p:sldMasterIdLst>
   <p:notesMasterIdLst>
-    <p:notesMasterId r:id="rId8"/>
+    <p:notesMasterId r:id="rId10"/>
   </p:notesMasterIdLst>
   <p:sldIdLst>
     <p:sldId id="256" r:id="rId2"/>
     <p:sldId id="257" r:id="rId3"/>
     <p:sldId id="258" r:id="rId4"/>
     <p:sldId id="259" r:id="rId5"/>
-    <p:sldId id="260" r:id="rId6"/>
-    <p:sldId id="261" r:id="rId7"/>
+    <p:sldId id="263" r:id="rId6"/>
+    <p:sldId id="260" r:id="rId7"/>
+    <p:sldId id="261" r:id="rId8"/>
+    <p:sldId id="262" r:id="rId9"/>
   </p:sldIdLst>
   <p:sldSz cx="12192000" cy="6858000"/>
   <p:notesSz cx="6858000" cy="9144000"/>
@@ -6578,11 +6580,7 @@
           <a:p>
             <a:r>
               <a:rPr lang="de-DE" dirty="0" smtClean="0"/>
-              <a:t>Präsentation Blatt </a:t>
-            </a:r>
-            <a:r>
-              <a:rPr lang="de-DE" dirty="0" smtClean="0"/>
-              <a:t>6</a:t>
+              <a:t>Präsentation Blatt 6</a:t>
             </a:r>
             <a:endParaRPr lang="de-DE" dirty="0">
               <a:latin typeface="Helvetica" panose="020B0500000000000000" pitchFamily="34" charset="0"/>
@@ -6607,11 +6605,7 @@
           <a:p>
             <a:r>
               <a:rPr lang="de-DE" dirty="0" smtClean="0"/>
-              <a:t>Aufgabe </a:t>
-            </a:r>
-            <a:r>
-              <a:rPr lang="de-DE" dirty="0" smtClean="0"/>
-              <a:t>1</a:t>
+              <a:t>Aufgabe 1</a:t>
             </a:r>
             <a:endParaRPr lang="de-DE" dirty="0"/>
           </a:p>
@@ -6782,11 +6776,7 @@
           <a:p>
             <a:r>
               <a:rPr lang="de-DE" dirty="0" smtClean="0"/>
-              <a:t>Aufgabe </a:t>
-            </a:r>
-            <a:r>
-              <a:rPr lang="de-DE" dirty="0" smtClean="0"/>
-              <a:t>1a</a:t>
+              <a:t>Aufgabe 1a</a:t>
             </a:r>
             <a:endParaRPr lang="de-DE" dirty="0"/>
           </a:p>
@@ -7678,11 +7668,7 @@
           <a:p>
             <a:r>
               <a:rPr lang="de-DE" dirty="0" smtClean="0"/>
-              <a:t>Aufgabe </a:t>
-            </a:r>
-            <a:r>
-              <a:rPr lang="de-DE" dirty="0" smtClean="0"/>
-              <a:t>1a</a:t>
+              <a:t>Aufgabe 1a</a:t>
             </a:r>
             <a:endParaRPr lang="de-DE" dirty="0"/>
           </a:p>
@@ -7735,12 +7721,12 @@
           </a:p>
           <a:p>
             <a:r>
-              <a:rPr lang="en-US" sz="2800" dirty="0" err="1"/>
-              <a:t>Winns</a:t>
+              <a:rPr lang="en-US" sz="2800" dirty="0" smtClean="0"/>
+              <a:t>Wins </a:t>
             </a:r>
             <a:r>
               <a:rPr lang="en-US" sz="2800" dirty="0"/>
-              <a:t> of X (</a:t>
+              <a:t>of X (</a:t>
             </a:r>
             <a:r>
               <a:rPr lang="en-US" sz="2800" dirty="0" err="1"/>
@@ -7753,12 +7739,12 @@
           </a:p>
           <a:p>
             <a:r>
-              <a:rPr lang="en-US" sz="2800" dirty="0" err="1"/>
-              <a:t>Winns</a:t>
+              <a:rPr lang="en-US" sz="2800" dirty="0" smtClean="0"/>
+              <a:t>Wins </a:t>
             </a:r>
             <a:r>
               <a:rPr lang="en-US" sz="2800" dirty="0"/>
-              <a:t> of O (</a:t>
+              <a:t>of O (</a:t>
             </a:r>
             <a:r>
               <a:rPr lang="en-US" sz="2800" dirty="0" err="1"/>
@@ -7768,7 +7754,12 @@
               <a:rPr lang="en-US" sz="2800" dirty="0"/>
               <a:t>): 10543</a:t>
             </a:r>
-            <a:endParaRPr lang="en-US" sz="2800" dirty="0"/>
+          </a:p>
+          <a:p>
+            <a:pPr marL="0" indent="0">
+              <a:buNone/>
+            </a:pPr>
+            <a:endParaRPr lang="de-DE" sz="2800" dirty="0" smtClean="0"/>
           </a:p>
           <a:p>
             <a:pPr marL="0" indent="0">
@@ -7942,7 +7933,7 @@
             </a:r>
             <a:r>
               <a:rPr lang="de-DE" dirty="0" smtClean="0"/>
-              <a:t>1b</a:t>
+              <a:t>1b - Reaktiv</a:t>
             </a:r>
             <a:endParaRPr lang="de-DE" dirty="0"/>
           </a:p>
@@ -7958,7 +7949,12 @@
             <p:ph idx="1"/>
           </p:nvPr>
         </p:nvSpPr>
-        <p:spPr/>
+        <p:spPr>
+          <a:xfrm>
+            <a:off x="991518" y="1447800"/>
+            <a:ext cx="9058335" cy="4800599"/>
+          </a:xfrm>
+        </p:spPr>
         <p:txBody>
           <a:bodyPr/>
           <a:lstStyle/>
@@ -7968,54 +7964,92 @@
             </a:pPr>
             <a:r>
               <a:rPr lang="de-DE" sz="2800" dirty="0" smtClean="0"/>
-              <a:t>Gewinnverteilung bei 10.000 Spielen (Level 1):</a:t>
-            </a:r>
-          </a:p>
-          <a:p>
-            <a:r>
-              <a:rPr lang="de-DE" sz="2800" dirty="0" err="1"/>
-              <a:t>Draws</a:t>
-            </a:r>
-            <a:r>
-              <a:rPr lang="de-DE" sz="2800" dirty="0"/>
-              <a:t>: 9339</a:t>
-            </a:r>
-          </a:p>
-          <a:p>
-            <a:r>
-              <a:rPr lang="en-US" sz="2800" dirty="0" err="1"/>
-              <a:t>Winns</a:t>
-            </a:r>
-            <a:r>
-              <a:rPr lang="en-US" sz="2800" dirty="0"/>
-              <a:t> of X (</a:t>
-            </a:r>
-            <a:r>
-              <a:rPr lang="en-US" sz="2800" dirty="0" err="1"/>
-              <a:t>RuleBasedStrategy</a:t>
-            </a:r>
-            <a:r>
-              <a:rPr lang="en-US" sz="2800" dirty="0"/>
-              <a:t>): 88838</a:t>
-            </a:r>
-          </a:p>
-          <a:p>
-            <a:r>
-              <a:rPr lang="en-US" sz="2800" dirty="0" err="1"/>
-              <a:t>Winns</a:t>
-            </a:r>
-            <a:r>
-              <a:rPr lang="en-US" sz="2800" dirty="0"/>
-              <a:t> of O (</a:t>
-            </a:r>
-            <a:r>
-              <a:rPr lang="en-US" sz="2800" dirty="0" err="1"/>
-              <a:t>RandomStrategy</a:t>
-            </a:r>
-            <a:r>
-              <a:rPr lang="en-US" sz="2800" dirty="0"/>
-              <a:t>): 1823</a:t>
-            </a:r>
+              <a:t>Regeln:</a:t>
+            </a:r>
+          </a:p>
+          <a:p>
+            <a:pPr>
+              <a:buFontTx/>
+              <a:buChar char="-"/>
+            </a:pPr>
+            <a:r>
+              <a:rPr lang="de-DE" sz="2800" dirty="0" smtClean="0"/>
+              <a:t>Wenn ich gewinnen kann, tue ich das.</a:t>
+            </a:r>
+          </a:p>
+          <a:p>
+            <a:pPr>
+              <a:buFontTx/>
+              <a:buChar char="-"/>
+            </a:pPr>
+            <a:r>
+              <a:rPr lang="de-DE" sz="2800" dirty="0" smtClean="0"/>
+              <a:t>Wenn der Gegner gewinnen kann, verhindere ich das</a:t>
+            </a:r>
+            <a:r>
+              <a:rPr lang="en-US" sz="2800" dirty="0" smtClean="0"/>
+              <a:t>.</a:t>
+            </a:r>
+          </a:p>
+          <a:p>
+            <a:pPr>
+              <a:buFontTx/>
+              <a:buChar char="-"/>
+            </a:pPr>
+            <a:endParaRPr lang="en-US" sz="2800" dirty="0"/>
+          </a:p>
+          <a:p>
+            <a:pPr>
+              <a:buFontTx/>
+              <a:buChar char="-"/>
+            </a:pPr>
+            <a:r>
+              <a:rPr lang="en-US" sz="2800" dirty="0" err="1" smtClean="0"/>
+              <a:t>Erzeuge</a:t>
+            </a:r>
+            <a:r>
+              <a:rPr lang="en-US" sz="2800" dirty="0" smtClean="0"/>
+              <a:t> “</a:t>
+            </a:r>
+            <a:r>
+              <a:rPr lang="en-US" sz="2800" dirty="0" err="1" smtClean="0"/>
+              <a:t>Zwickmühlen</a:t>
+            </a:r>
+            <a:r>
+              <a:rPr lang="en-US" sz="2800" dirty="0" smtClean="0"/>
+              <a:t>”</a:t>
+            </a:r>
+            <a:endParaRPr lang="en-US" sz="2800" dirty="0" smtClean="0"/>
+          </a:p>
+          <a:p>
+            <a:pPr>
+              <a:buFontTx/>
+              <a:buChar char="-"/>
+            </a:pPr>
+            <a:endParaRPr lang="en-US" sz="2800" dirty="0"/>
+          </a:p>
+          <a:p>
+            <a:pPr>
+              <a:buFontTx/>
+              <a:buChar char="-"/>
+            </a:pPr>
+            <a:r>
+              <a:rPr lang="en-US" sz="2800" dirty="0" err="1" smtClean="0"/>
+              <a:t>Verhindere</a:t>
+            </a:r>
+            <a:r>
+              <a:rPr lang="en-US" sz="2800" dirty="0" smtClean="0"/>
+              <a:t> “</a:t>
+            </a:r>
+            <a:r>
+              <a:rPr lang="en-US" sz="2800" dirty="0" err="1" smtClean="0"/>
+              <a:t>Zwickmühlen</a:t>
+            </a:r>
+            <a:r>
+              <a:rPr lang="en-US" sz="2800" dirty="0" smtClean="0"/>
+              <a:t>”</a:t>
+            </a:r>
+            <a:endParaRPr lang="en-US" sz="2800" dirty="0" smtClean="0"/>
           </a:p>
         </p:txBody>
       </p:sp>
@@ -8179,11 +8213,7 @@
           <a:p>
             <a:r>
               <a:rPr lang="de-DE" dirty="0" smtClean="0"/>
-              <a:t>Aufgabe </a:t>
-            </a:r>
-            <a:r>
-              <a:rPr lang="de-DE" dirty="0" smtClean="0"/>
-              <a:t>1b</a:t>
+              <a:t>Aufgabe 1b</a:t>
             </a:r>
             <a:endParaRPr lang="de-DE" dirty="0"/>
           </a:p>
@@ -8209,7 +8239,15 @@
             </a:pPr>
             <a:r>
               <a:rPr lang="de-DE" sz="2800" dirty="0" smtClean="0"/>
-              <a:t>Gewinnverteilung bei 10.000 Spielen (Level 2):</a:t>
+              <a:t>Gewinnverteilung bei </a:t>
+            </a:r>
+            <a:r>
+              <a:rPr lang="de-DE" sz="2800" dirty="0" smtClean="0"/>
+              <a:t>100.000 </a:t>
+            </a:r>
+            <a:r>
+              <a:rPr lang="de-DE" sz="2800" dirty="0" smtClean="0"/>
+              <a:t>Spielen (Level 1):</a:t>
             </a:r>
           </a:p>
           <a:p>
@@ -8219,35 +8257,43 @@
             </a:r>
             <a:r>
               <a:rPr lang="de-DE" sz="2800" dirty="0"/>
-              <a:t>: 5392</a:t>
-            </a:r>
-          </a:p>
-          <a:p>
-            <a:r>
-              <a:rPr lang="en-US" sz="2800" dirty="0" err="1"/>
-              <a:t>Winns</a:t>
+              <a:t>: 9339</a:t>
+            </a:r>
+          </a:p>
+          <a:p>
+            <a:r>
+              <a:rPr lang="en-US" sz="2800" dirty="0" smtClean="0"/>
+              <a:t>Wins </a:t>
             </a:r>
             <a:r>
               <a:rPr lang="en-US" sz="2800" dirty="0"/>
-              <a:t> of X (</a:t>
-            </a:r>
-            <a:r>
-              <a:rPr lang="en-US" sz="2800" dirty="0" err="1"/>
-              <a:t>ReflexStrategyNormal</a:t>
+              <a:t>of X </a:t>
+            </a:r>
+            <a:r>
+              <a:rPr lang="en-US" sz="2800" dirty="0" smtClean="0"/>
+              <a:t>(</a:t>
+            </a:r>
+            <a:r>
+              <a:rPr lang="en-US" sz="2800" dirty="0" err="1" smtClean="0"/>
+              <a:t>ReflexStrategyEasy</a:t>
+            </a:r>
+            <a:r>
+              <a:rPr lang="en-US" sz="2800" dirty="0" smtClean="0"/>
+              <a:t>): </a:t>
             </a:r>
             <a:r>
               <a:rPr lang="en-US" sz="2800" dirty="0"/>
-              <a:t>): 93580</a:t>
-            </a:r>
-          </a:p>
-          <a:p>
-            <a:r>
-              <a:rPr lang="en-US" sz="2800" dirty="0" err="1"/>
-              <a:t>Winns</a:t>
+              <a:t>88838</a:t>
+            </a:r>
+          </a:p>
+          <a:p>
+            <a:r>
+              <a:rPr lang="en-US" sz="2800" dirty="0" smtClean="0"/>
+              <a:t>Wins </a:t>
             </a:r>
             <a:r>
               <a:rPr lang="en-US" sz="2800" dirty="0"/>
-              <a:t> of O (</a:t>
+              <a:t>of O (</a:t>
             </a:r>
             <a:r>
               <a:rPr lang="en-US" sz="2800" dirty="0" err="1"/>
@@ -8255,9 +8301,8 @@
             </a:r>
             <a:r>
               <a:rPr lang="en-US" sz="2800" dirty="0"/>
-              <a:t>): 1028</a:t>
-            </a:r>
-            <a:endParaRPr lang="de-DE" sz="2800" dirty="0"/>
+              <a:t>): 1823</a:t>
+            </a:r>
           </a:p>
         </p:txBody>
       </p:sp>
@@ -8370,7 +8415,7 @@
     </p:spTree>
     <p:extLst>
       <p:ext uri="{BB962C8B-B14F-4D97-AF65-F5344CB8AC3E}">
-        <p14:creationId xmlns:p14="http://schemas.microsoft.com/office/powerpoint/2010/main" val="3166959899"/>
+        <p14:creationId xmlns:p14="http://schemas.microsoft.com/office/powerpoint/2010/main" val="940565190"/>
       </p:ext>
     </p:extLst>
   </p:cSld>
@@ -8421,11 +8466,7 @@
           <a:p>
             <a:r>
               <a:rPr lang="de-DE" dirty="0" smtClean="0"/>
-              <a:t>Aufgabe </a:t>
-            </a:r>
-            <a:r>
-              <a:rPr lang="de-DE" dirty="0" smtClean="0"/>
-              <a:t>1b</a:t>
+              <a:t>Aufgabe 1b</a:t>
             </a:r>
             <a:endParaRPr lang="de-DE" dirty="0"/>
           </a:p>
@@ -8451,7 +8492,15 @@
             </a:pPr>
             <a:r>
               <a:rPr lang="de-DE" sz="2800" dirty="0" smtClean="0"/>
-              <a:t>Gewinnverteilung bei 10.000 Spielen (Level 3):</a:t>
+              <a:t>Gewinnverteilung bei </a:t>
+            </a:r>
+            <a:r>
+              <a:rPr lang="de-DE" sz="2800" dirty="0" smtClean="0"/>
+              <a:t>100.000 </a:t>
+            </a:r>
+            <a:r>
+              <a:rPr lang="de-DE" sz="2800" dirty="0" smtClean="0"/>
+              <a:t>Spielen (Level 2):</a:t>
             </a:r>
           </a:p>
           <a:p>
@@ -8461,35 +8510,35 @@
             </a:r>
             <a:r>
               <a:rPr lang="de-DE" sz="2800" dirty="0"/>
-              <a:t>: 5508</a:t>
-            </a:r>
-          </a:p>
-          <a:p>
+              <a:t>: 5392</a:t>
+            </a:r>
+          </a:p>
+          <a:p>
+            <a:r>
+              <a:rPr lang="en-US" sz="2800" dirty="0" smtClean="0"/>
+              <a:t>Wins </a:t>
+            </a:r>
+            <a:r>
+              <a:rPr lang="en-US" sz="2800" dirty="0"/>
+              <a:t>of X (</a:t>
+            </a:r>
             <a:r>
               <a:rPr lang="en-US" sz="2800" dirty="0" err="1"/>
-              <a:t>Winns</a:t>
+              <a:t>ReflexStrategyNormal</a:t>
             </a:r>
             <a:r>
               <a:rPr lang="en-US" sz="2800" dirty="0"/>
-              <a:t> of X (</a:t>
-            </a:r>
-            <a:r>
-              <a:rPr lang="en-US" sz="2800" dirty="0" err="1"/>
-              <a:t>ReflexStrategyHard</a:t>
+              <a:t>): 93580</a:t>
+            </a:r>
+          </a:p>
+          <a:p>
+            <a:r>
+              <a:rPr lang="en-US" sz="2800" dirty="0" smtClean="0"/>
+              <a:t>Wins </a:t>
             </a:r>
             <a:r>
               <a:rPr lang="en-US" sz="2800" dirty="0"/>
-              <a:t>): 93634</a:t>
-            </a:r>
-          </a:p>
-          <a:p>
-            <a:r>
-              <a:rPr lang="en-US" sz="2800" dirty="0" err="1"/>
-              <a:t>Winns</a:t>
-            </a:r>
-            <a:r>
-              <a:rPr lang="en-US" sz="2800" dirty="0"/>
-              <a:t> of O (</a:t>
+              <a:t>of O (</a:t>
             </a:r>
             <a:r>
               <a:rPr lang="en-US" sz="2800" dirty="0" err="1"/>
@@ -8497,7 +8546,7 @@
             </a:r>
             <a:r>
               <a:rPr lang="en-US" sz="2800" dirty="0"/>
-              <a:t>): 858</a:t>
+              <a:t>): 1028</a:t>
             </a:r>
             <a:endParaRPr lang="de-DE" sz="2800" dirty="0"/>
           </a:p>
@@ -8604,6 +8653,252 @@
             <a:fld id="{5C65B871-89DE-4E08-A5A0-E5FD7EC4AD4D}" type="slidenum">
               <a:rPr lang="de-DE" smtClean="0"/>
               <a:t>6</a:t>
+            </a:fld>
+            <a:endParaRPr lang="de-DE" dirty="0"/>
+          </a:p>
+        </p:txBody>
+      </p:sp>
+    </p:spTree>
+    <p:extLst>
+      <p:ext uri="{BB962C8B-B14F-4D97-AF65-F5344CB8AC3E}">
+        <p14:creationId xmlns:p14="http://schemas.microsoft.com/office/powerpoint/2010/main" val="3166959899"/>
+      </p:ext>
+    </p:extLst>
+  </p:cSld>
+  <p:clrMapOvr>
+    <a:masterClrMapping/>
+  </p:clrMapOvr>
+  <p:timing>
+    <p:tnLst>
+      <p:par>
+        <p:cTn id="1" dur="indefinite" restart="never" nodeType="tmRoot"/>
+      </p:par>
+    </p:tnLst>
+  </p:timing>
+</p:sld>
+</file>
+
+<file path=ppt/slides/slide7.xml><?xml version="1.0" encoding="utf-8"?>
+<p:sld xmlns:a="http://schemas.openxmlformats.org/drawingml/2006/main" xmlns:r="http://schemas.openxmlformats.org/officeDocument/2006/relationships" xmlns:p="http://schemas.openxmlformats.org/presentationml/2006/main">
+  <p:cSld>
+    <p:spTree>
+      <p:nvGrpSpPr>
+        <p:cNvPr id="1" name=""/>
+        <p:cNvGrpSpPr/>
+        <p:nvPr/>
+      </p:nvGrpSpPr>
+      <p:grpSpPr>
+        <a:xfrm>
+          <a:off x="0" y="0"/>
+          <a:ext cx="0" cy="0"/>
+          <a:chOff x="0" y="0"/>
+          <a:chExt cx="0" cy="0"/>
+        </a:xfrm>
+      </p:grpSpPr>
+      <p:sp>
+        <p:nvSpPr>
+          <p:cNvPr id="2" name="Titel 1"/>
+          <p:cNvSpPr>
+            <a:spLocks noGrp="1"/>
+          </p:cNvSpPr>
+          <p:nvPr>
+            <p:ph type="title"/>
+          </p:nvPr>
+        </p:nvSpPr>
+        <p:spPr/>
+        <p:txBody>
+          <a:bodyPr/>
+          <a:lstStyle/>
+          <a:p>
+            <a:r>
+              <a:rPr lang="de-DE" dirty="0" smtClean="0"/>
+              <a:t>Aufgabe 1b</a:t>
+            </a:r>
+            <a:endParaRPr lang="de-DE" dirty="0"/>
+          </a:p>
+        </p:txBody>
+      </p:sp>
+      <p:sp>
+        <p:nvSpPr>
+          <p:cNvPr id="3" name="Inhaltsplatzhalter 2"/>
+          <p:cNvSpPr>
+            <a:spLocks noGrp="1"/>
+          </p:cNvSpPr>
+          <p:nvPr>
+            <p:ph idx="1"/>
+          </p:nvPr>
+        </p:nvSpPr>
+        <p:spPr/>
+        <p:txBody>
+          <a:bodyPr/>
+          <a:lstStyle/>
+          <a:p>
+            <a:pPr marL="0" indent="0">
+              <a:buNone/>
+            </a:pPr>
+            <a:r>
+              <a:rPr lang="de-DE" sz="2800" dirty="0" smtClean="0"/>
+              <a:t>Gewinnverteilung bei </a:t>
+            </a:r>
+            <a:r>
+              <a:rPr lang="de-DE" sz="2800" dirty="0" smtClean="0"/>
+              <a:t>100.000 </a:t>
+            </a:r>
+            <a:r>
+              <a:rPr lang="de-DE" sz="2800" dirty="0" smtClean="0"/>
+              <a:t>Spielen (Level 3):</a:t>
+            </a:r>
+          </a:p>
+          <a:p>
+            <a:r>
+              <a:rPr lang="de-DE" sz="2800" dirty="0" err="1"/>
+              <a:t>Draws</a:t>
+            </a:r>
+            <a:r>
+              <a:rPr lang="de-DE" sz="2800" dirty="0"/>
+              <a:t>: 5508</a:t>
+            </a:r>
+          </a:p>
+          <a:p>
+            <a:r>
+              <a:rPr lang="en-US" sz="2800" dirty="0" smtClean="0"/>
+              <a:t>Wins </a:t>
+            </a:r>
+            <a:r>
+              <a:rPr lang="en-US" sz="2800" dirty="0"/>
+              <a:t>of X (</a:t>
+            </a:r>
+            <a:r>
+              <a:rPr lang="en-US" sz="2800" dirty="0" err="1"/>
+              <a:t>ReflexStrategyHard</a:t>
+            </a:r>
+            <a:r>
+              <a:rPr lang="en-US" sz="2800" dirty="0"/>
+              <a:t>): 93634</a:t>
+            </a:r>
+          </a:p>
+          <a:p>
+            <a:r>
+              <a:rPr lang="en-US" sz="2800" dirty="0" smtClean="0"/>
+              <a:t>Wins </a:t>
+            </a:r>
+            <a:r>
+              <a:rPr lang="en-US" sz="2800" dirty="0"/>
+              <a:t>of O (</a:t>
+            </a:r>
+            <a:r>
+              <a:rPr lang="en-US" sz="2800" dirty="0" err="1"/>
+              <a:t>RandomStrategy</a:t>
+            </a:r>
+            <a:r>
+              <a:rPr lang="en-US" sz="2800" dirty="0"/>
+              <a:t>): 858</a:t>
+            </a:r>
+            <a:endParaRPr lang="de-DE" sz="2800" dirty="0"/>
+          </a:p>
+        </p:txBody>
+      </p:sp>
+      <p:sp>
+        <p:nvSpPr>
+          <p:cNvPr id="4" name="Datumsplatzhalter 3"/>
+          <p:cNvSpPr>
+            <a:spLocks noGrp="1"/>
+          </p:cNvSpPr>
+          <p:nvPr>
+            <p:ph type="dt" sz="half" idx="10"/>
+          </p:nvPr>
+        </p:nvSpPr>
+        <p:spPr/>
+        <p:txBody>
+          <a:bodyPr/>
+          <a:lstStyle/>
+          <a:p>
+            <a:fld id="{62A8A28E-B5F5-41EE-B009-8D872471EF33}" type="datetime1">
+              <a:rPr lang="de-DE" smtClean="0"/>
+              <a:t>29.11.2016</a:t>
+            </a:fld>
+            <a:endParaRPr lang="de-DE"/>
+          </a:p>
+        </p:txBody>
+      </p:sp>
+      <p:sp>
+        <p:nvSpPr>
+          <p:cNvPr id="5" name="Fußzeilenplatzhalter 4"/>
+          <p:cNvSpPr>
+            <a:spLocks noGrp="1"/>
+          </p:cNvSpPr>
+          <p:nvPr>
+            <p:ph type="ftr" sz="quarter" idx="11"/>
+          </p:nvPr>
+        </p:nvSpPr>
+        <p:spPr/>
+        <p:txBody>
+          <a:bodyPr/>
+          <a:lstStyle/>
+          <a:p>
+            <a:r>
+              <a:rPr lang="de-DE" dirty="0" smtClean="0"/>
+              <a:t>Gruppe 3</a:t>
+            </a:r>
+            <a:br>
+              <a:rPr lang="de-DE" dirty="0" smtClean="0"/>
+            </a:br>
+            <a:r>
+              <a:rPr lang="de-DE" dirty="0" smtClean="0"/>
+              <a:t>(Martin </a:t>
+            </a:r>
+            <a:r>
+              <a:rPr lang="de-DE" dirty="0" err="1" smtClean="0"/>
+              <a:t>Schörner</a:t>
+            </a:r>
+            <a:r>
+              <a:rPr lang="de-DE" dirty="0" smtClean="0"/>
+              <a:t>,</a:t>
+            </a:r>
+            <a:br>
+              <a:rPr lang="de-DE" dirty="0" smtClean="0"/>
+            </a:br>
+            <a:r>
+              <a:rPr lang="de-DE" dirty="0" smtClean="0"/>
+              <a:t>Matthias </a:t>
+            </a:r>
+            <a:r>
+              <a:rPr lang="de-DE" dirty="0" err="1" smtClean="0"/>
+              <a:t>Gröbner</a:t>
+            </a:r>
+            <a:r>
+              <a:rPr lang="de-DE" dirty="0" smtClean="0"/>
+              <a:t>,</a:t>
+            </a:r>
+            <a:br>
+              <a:rPr lang="de-DE" dirty="0" smtClean="0"/>
+            </a:br>
+            <a:r>
+              <a:rPr lang="de-DE" dirty="0" smtClean="0"/>
+              <a:t>David Winter)</a:t>
+            </a:r>
+            <a:endParaRPr lang="de-DE" dirty="0"/>
+          </a:p>
+        </p:txBody>
+      </p:sp>
+      <p:sp>
+        <p:nvSpPr>
+          <p:cNvPr id="6" name="Foliennummernplatzhalter 5"/>
+          <p:cNvSpPr>
+            <a:spLocks noGrp="1"/>
+          </p:cNvSpPr>
+          <p:nvPr>
+            <p:ph type="sldNum" sz="quarter" idx="12"/>
+          </p:nvPr>
+        </p:nvSpPr>
+        <p:spPr/>
+        <p:txBody>
+          <a:bodyPr/>
+          <a:lstStyle/>
+          <a:p>
+            <a:fld id="{5C65B871-89DE-4E08-A5A0-E5FD7EC4AD4D}" type="slidenum">
+              <a:rPr lang="de-DE" smtClean="0"/>
+              <a:t>7</a:t>
             </a:fld>
             <a:endParaRPr lang="de-DE" dirty="0"/>
           </a:p>
@@ -8613,6 +8908,325 @@
     <p:extLst>
       <p:ext uri="{BB962C8B-B14F-4D97-AF65-F5344CB8AC3E}">
         <p14:creationId xmlns:p14="http://schemas.microsoft.com/office/powerpoint/2010/main" val="1956741068"/>
+      </p:ext>
+    </p:extLst>
+  </p:cSld>
+  <p:clrMapOvr>
+    <a:masterClrMapping/>
+  </p:clrMapOvr>
+  <p:timing>
+    <p:tnLst>
+      <p:par>
+        <p:cTn id="1" dur="indefinite" restart="never" nodeType="tmRoot"/>
+      </p:par>
+    </p:tnLst>
+  </p:timing>
+</p:sld>
+</file>
+
+<file path=ppt/slides/slide8.xml><?xml version="1.0" encoding="utf-8"?>
+<p:sld xmlns:a="http://schemas.openxmlformats.org/drawingml/2006/main" xmlns:r="http://schemas.openxmlformats.org/officeDocument/2006/relationships" xmlns:p="http://schemas.openxmlformats.org/presentationml/2006/main">
+  <p:cSld>
+    <p:spTree>
+      <p:nvGrpSpPr>
+        <p:cNvPr id="1" name=""/>
+        <p:cNvGrpSpPr/>
+        <p:nvPr/>
+      </p:nvGrpSpPr>
+      <p:grpSpPr>
+        <a:xfrm>
+          <a:off x="0" y="0"/>
+          <a:ext cx="0" cy="0"/>
+          <a:chOff x="0" y="0"/>
+          <a:chExt cx="0" cy="0"/>
+        </a:xfrm>
+      </p:grpSpPr>
+      <p:sp>
+        <p:nvSpPr>
+          <p:cNvPr id="2" name="Titel 1"/>
+          <p:cNvSpPr>
+            <a:spLocks noGrp="1"/>
+          </p:cNvSpPr>
+          <p:nvPr>
+            <p:ph type="title"/>
+          </p:nvPr>
+        </p:nvSpPr>
+        <p:spPr/>
+        <p:txBody>
+          <a:bodyPr/>
+          <a:lstStyle/>
+          <a:p>
+            <a:r>
+              <a:rPr lang="de-DE" sz="4400" dirty="0"/>
+              <a:t>Alpha/Beta &lt;-&gt; </a:t>
+            </a:r>
+            <a:r>
+              <a:rPr lang="de-DE" sz="4400" dirty="0" err="1"/>
+              <a:t>MinMax</a:t>
+            </a:r>
+            <a:endParaRPr lang="de-DE" dirty="0"/>
+          </a:p>
+        </p:txBody>
+      </p:sp>
+      <p:sp>
+        <p:nvSpPr>
+          <p:cNvPr id="3" name="Inhaltsplatzhalter 2"/>
+          <p:cNvSpPr>
+            <a:spLocks noGrp="1"/>
+          </p:cNvSpPr>
+          <p:nvPr>
+            <p:ph idx="1"/>
+          </p:nvPr>
+        </p:nvSpPr>
+        <p:spPr>
+          <a:xfrm>
+            <a:off x="550844" y="1447800"/>
+            <a:ext cx="9711258" cy="4800599"/>
+          </a:xfrm>
+        </p:spPr>
+        <p:txBody>
+          <a:bodyPr>
+            <a:normAutofit lnSpcReduction="10000"/>
+          </a:bodyPr>
+          <a:lstStyle/>
+          <a:p>
+            <a:pPr marL="0" indent="0">
+              <a:buNone/>
+            </a:pPr>
+            <a:r>
+              <a:rPr lang="de-DE" sz="2800" dirty="0" smtClean="0"/>
+              <a:t>Differenz (Knoten bei </a:t>
+            </a:r>
+            <a:r>
+              <a:rPr lang="de-DE" sz="2800" dirty="0" err="1" smtClean="0"/>
+              <a:t>MinMax</a:t>
+            </a:r>
+            <a:r>
+              <a:rPr lang="de-DE" sz="2800" dirty="0"/>
+              <a:t>)</a:t>
+            </a:r>
+            <a:endParaRPr lang="de-DE" sz="2800" dirty="0" smtClean="0"/>
+          </a:p>
+          <a:p>
+            <a:pPr marL="0" indent="0">
+              <a:buNone/>
+            </a:pPr>
+            <a:r>
+              <a:rPr lang="de-DE" sz="2800" dirty="0" smtClean="0"/>
+              <a:t>Tiefe </a:t>
+            </a:r>
+            <a:r>
+              <a:rPr lang="de-DE" sz="2800" dirty="0" smtClean="0"/>
+              <a:t>2: 	95 (285)</a:t>
+            </a:r>
+            <a:r>
+              <a:rPr lang="de-DE" sz="2800" dirty="0" smtClean="0"/>
+              <a:t>					-&gt; 33.33 %</a:t>
+            </a:r>
+          </a:p>
+          <a:p>
+            <a:pPr marL="0" indent="0">
+              <a:buNone/>
+            </a:pPr>
+            <a:r>
+              <a:rPr lang="de-DE" sz="2800" dirty="0"/>
+              <a:t>Tiefe </a:t>
+            </a:r>
+            <a:r>
+              <a:rPr lang="de-DE" sz="2800" dirty="0" smtClean="0"/>
+              <a:t>3: 	711 (1525) 				-&gt; 46,62 %</a:t>
+            </a:r>
+          </a:p>
+          <a:p>
+            <a:pPr marL="0" indent="0">
+              <a:buNone/>
+            </a:pPr>
+            <a:r>
+              <a:rPr lang="de-DE" sz="2800" dirty="0"/>
+              <a:t>Tiefe </a:t>
+            </a:r>
+            <a:r>
+              <a:rPr lang="de-DE" sz="2800" dirty="0" smtClean="0"/>
+              <a:t>4: 	5470 (7331) 			-&gt; 74,61 %</a:t>
+            </a:r>
+          </a:p>
+          <a:p>
+            <a:pPr marL="0" indent="0">
+              <a:buNone/>
+            </a:pPr>
+            <a:r>
+              <a:rPr lang="de-DE" sz="2800" dirty="0"/>
+              <a:t>Tiefe </a:t>
+            </a:r>
+            <a:r>
+              <a:rPr lang="de-DE" sz="2800" dirty="0" smtClean="0"/>
+              <a:t>5: 	23720 (30413)		-&gt; 77,99 %</a:t>
+            </a:r>
+          </a:p>
+          <a:p>
+            <a:pPr marL="0" indent="0">
+              <a:buNone/>
+            </a:pPr>
+            <a:r>
+              <a:rPr lang="de-DE" sz="2800" dirty="0"/>
+              <a:t>Tiefe </a:t>
+            </a:r>
+            <a:r>
+              <a:rPr lang="de-DE" sz="2800" dirty="0" smtClean="0"/>
+              <a:t>6: 	93113 (103881) 		-&gt; 89,63 %</a:t>
+            </a:r>
+          </a:p>
+          <a:p>
+            <a:pPr marL="0" indent="0">
+              <a:buNone/>
+            </a:pPr>
+            <a:r>
+              <a:rPr lang="de-DE" sz="2800" dirty="0"/>
+              <a:t>Tiefe </a:t>
+            </a:r>
+            <a:r>
+              <a:rPr lang="de-DE" sz="2800" dirty="0" smtClean="0"/>
+              <a:t>7: 	248528 (275887)		-&gt; 90,08 %</a:t>
+            </a:r>
+          </a:p>
+          <a:p>
+            <a:pPr marL="0" indent="0">
+              <a:buNone/>
+            </a:pPr>
+            <a:r>
+              <a:rPr lang="de-DE" sz="2800" dirty="0"/>
+              <a:t>Tiefe </a:t>
+            </a:r>
+            <a:r>
+              <a:rPr lang="de-DE" sz="2800" dirty="0" smtClean="0"/>
+              <a:t>8:	460964 (490317)		-&gt; 94,01 %</a:t>
+            </a:r>
+          </a:p>
+          <a:p>
+            <a:pPr marL="0" indent="0">
+              <a:buNone/>
+            </a:pPr>
+            <a:r>
+              <a:rPr lang="de-DE" sz="2800" dirty="0"/>
+              <a:t>Tiefe </a:t>
+            </a:r>
+            <a:r>
+              <a:rPr lang="de-DE" sz="2800" dirty="0" smtClean="0"/>
+              <a:t>9: 	584007 (618175)		-&gt; 94,47 %</a:t>
+            </a:r>
+          </a:p>
+        </p:txBody>
+      </p:sp>
+      <p:sp>
+        <p:nvSpPr>
+          <p:cNvPr id="4" name="Datumsplatzhalter 3"/>
+          <p:cNvSpPr>
+            <a:spLocks noGrp="1"/>
+          </p:cNvSpPr>
+          <p:nvPr>
+            <p:ph type="dt" sz="half" idx="10"/>
+          </p:nvPr>
+        </p:nvSpPr>
+        <p:spPr/>
+        <p:txBody>
+          <a:bodyPr/>
+          <a:lstStyle/>
+          <a:p>
+            <a:fld id="{62A8A28E-B5F5-41EE-B009-8D872471EF33}" type="datetime1">
+              <a:rPr lang="de-DE" smtClean="0"/>
+              <a:t>29.11.2016</a:t>
+            </a:fld>
+            <a:endParaRPr lang="de-DE"/>
+          </a:p>
+        </p:txBody>
+      </p:sp>
+      <p:sp>
+        <p:nvSpPr>
+          <p:cNvPr id="5" name="Fußzeilenplatzhalter 4"/>
+          <p:cNvSpPr>
+            <a:spLocks noGrp="1"/>
+          </p:cNvSpPr>
+          <p:nvPr>
+            <p:ph type="ftr" sz="quarter" idx="11"/>
+          </p:nvPr>
+        </p:nvSpPr>
+        <p:spPr/>
+        <p:txBody>
+          <a:bodyPr/>
+          <a:lstStyle/>
+          <a:p>
+            <a:r>
+              <a:rPr lang="de-DE" dirty="0" smtClean="0"/>
+              <a:t>Gruppe 3</a:t>
+            </a:r>
+            <a:br>
+              <a:rPr lang="de-DE" dirty="0" smtClean="0"/>
+            </a:br>
+            <a:r>
+              <a:rPr lang="de-DE" dirty="0" smtClean="0"/>
+              <a:t>(Martin </a:t>
+            </a:r>
+            <a:r>
+              <a:rPr lang="de-DE" dirty="0" err="1" smtClean="0"/>
+              <a:t>Schörner</a:t>
+            </a:r>
+            <a:r>
+              <a:rPr lang="de-DE" dirty="0" smtClean="0"/>
+              <a:t>,</a:t>
+            </a:r>
+            <a:br>
+              <a:rPr lang="de-DE" dirty="0" smtClean="0"/>
+            </a:br>
+            <a:r>
+              <a:rPr lang="de-DE" dirty="0" smtClean="0"/>
+              <a:t>Matthias </a:t>
+            </a:r>
+            <a:r>
+              <a:rPr lang="de-DE" dirty="0" err="1" smtClean="0"/>
+              <a:t>Gröbner</a:t>
+            </a:r>
+            <a:r>
+              <a:rPr lang="de-DE" dirty="0" smtClean="0"/>
+              <a:t>,</a:t>
+            </a:r>
+            <a:br>
+              <a:rPr lang="de-DE" dirty="0" smtClean="0"/>
+            </a:br>
+            <a:r>
+              <a:rPr lang="de-DE" dirty="0" smtClean="0"/>
+              <a:t>David Winter)</a:t>
+            </a:r>
+            <a:endParaRPr lang="de-DE" dirty="0"/>
+          </a:p>
+        </p:txBody>
+      </p:sp>
+      <p:sp>
+        <p:nvSpPr>
+          <p:cNvPr id="6" name="Foliennummernplatzhalter 5"/>
+          <p:cNvSpPr>
+            <a:spLocks noGrp="1"/>
+          </p:cNvSpPr>
+          <p:nvPr>
+            <p:ph type="sldNum" sz="quarter" idx="12"/>
+          </p:nvPr>
+        </p:nvSpPr>
+        <p:spPr/>
+        <p:txBody>
+          <a:bodyPr/>
+          <a:lstStyle/>
+          <a:p>
+            <a:fld id="{5C65B871-89DE-4E08-A5A0-E5FD7EC4AD4D}" type="slidenum">
+              <a:rPr lang="de-DE" smtClean="0"/>
+              <a:t>8</a:t>
+            </a:fld>
+            <a:endParaRPr lang="de-DE" dirty="0"/>
+          </a:p>
+        </p:txBody>
+      </p:sp>
+    </p:spTree>
+    <p:extLst>
+      <p:ext uri="{BB962C8B-B14F-4D97-AF65-F5344CB8AC3E}">
+        <p14:creationId xmlns:p14="http://schemas.microsoft.com/office/powerpoint/2010/main" val="3923879223"/>
       </p:ext>
     </p:extLst>
   </p:cSld>

</xml_diff>

<commit_message>
SOAS-6_1: small presentation change
</commit_message>
<xml_diff>
--- a/Blatt-06/Präsentation.pptx
+++ b/Blatt-06/Präsentation.pptx
@@ -335,11 +335,11 @@
           <c:showBubbleSize val="0"/>
         </c:dLbls>
         <c:smooth val="0"/>
-        <c:axId val="229656368"/>
-        <c:axId val="229656928"/>
+        <c:axId val="244573264"/>
+        <c:axId val="244573824"/>
       </c:lineChart>
       <c:catAx>
-        <c:axId val="229656368"/>
+        <c:axId val="244573264"/>
         <c:scaling>
           <c:orientation val="minMax"/>
         </c:scaling>
@@ -382,7 +382,7 @@
             <a:endParaRPr lang="de-DE"/>
           </a:p>
         </c:txPr>
-        <c:crossAx val="229656928"/>
+        <c:crossAx val="244573824"/>
         <c:crosses val="autoZero"/>
         <c:auto val="1"/>
         <c:lblAlgn val="ctr"/>
@@ -390,7 +390,7 @@
         <c:noMultiLvlLbl val="0"/>
       </c:catAx>
       <c:valAx>
-        <c:axId val="229656928"/>
+        <c:axId val="244573824"/>
         <c:scaling>
           <c:orientation val="minMax"/>
         </c:scaling>
@@ -488,7 +488,7 @@
             <a:endParaRPr lang="de-DE"/>
           </a:p>
         </c:txPr>
-        <c:crossAx val="229656368"/>
+        <c:crossAx val="244573264"/>
         <c:crosses val="autoZero"/>
         <c:crossBetween val="between"/>
       </c:valAx>
@@ -771,11 +771,11 @@
         </c:dLbls>
         <c:gapWidth val="50"/>
         <c:overlap val="-27"/>
-        <c:axId val="231484800"/>
-        <c:axId val="231485360"/>
+        <c:axId val="177184672"/>
+        <c:axId val="177186352"/>
       </c:barChart>
       <c:catAx>
-        <c:axId val="231484800"/>
+        <c:axId val="177184672"/>
         <c:scaling>
           <c:orientation val="minMax"/>
         </c:scaling>
@@ -818,7 +818,7 @@
             <a:endParaRPr lang="de-DE"/>
           </a:p>
         </c:txPr>
-        <c:crossAx val="231485360"/>
+        <c:crossAx val="177186352"/>
         <c:crosses val="autoZero"/>
         <c:auto val="1"/>
         <c:lblAlgn val="ctr"/>
@@ -826,7 +826,7 @@
         <c:noMultiLvlLbl val="0"/>
       </c:catAx>
       <c:valAx>
-        <c:axId val="231485360"/>
+        <c:axId val="177186352"/>
         <c:scaling>
           <c:orientation val="minMax"/>
         </c:scaling>
@@ -863,7 +863,7 @@
             <a:endParaRPr lang="de-DE"/>
           </a:p>
         </c:txPr>
-        <c:crossAx val="231484800"/>
+        <c:crossAx val="177184672"/>
         <c:crosses val="autoZero"/>
         <c:crossBetween val="between"/>
       </c:valAx>
@@ -1114,11 +1114,11 @@
         </c:dLbls>
         <c:gapWidth val="50"/>
         <c:overlap val="-27"/>
-        <c:axId val="233680416"/>
-        <c:axId val="233680976"/>
+        <c:axId val="177191392"/>
+        <c:axId val="177186912"/>
       </c:barChart>
       <c:catAx>
-        <c:axId val="233680416"/>
+        <c:axId val="177191392"/>
         <c:scaling>
           <c:orientation val="minMax"/>
         </c:scaling>
@@ -1161,7 +1161,7 @@
             <a:endParaRPr lang="de-DE"/>
           </a:p>
         </c:txPr>
-        <c:crossAx val="233680976"/>
+        <c:crossAx val="177186912"/>
         <c:crosses val="autoZero"/>
         <c:auto val="1"/>
         <c:lblAlgn val="ctr"/>
@@ -1169,7 +1169,7 @@
         <c:noMultiLvlLbl val="0"/>
       </c:catAx>
       <c:valAx>
-        <c:axId val="233680976"/>
+        <c:axId val="177186912"/>
         <c:scaling>
           <c:orientation val="minMax"/>
         </c:scaling>
@@ -1206,7 +1206,7 @@
             <a:endParaRPr lang="de-DE"/>
           </a:p>
         </c:txPr>
-        <c:crossAx val="233680416"/>
+        <c:crossAx val="177191392"/>
         <c:crosses val="autoZero"/>
         <c:crossBetween val="between"/>
       </c:valAx>
@@ -1457,11 +1457,11 @@
         </c:dLbls>
         <c:gapWidth val="50"/>
         <c:overlap val="-27"/>
-        <c:axId val="233683216"/>
-        <c:axId val="233683776"/>
+        <c:axId val="177188032"/>
+        <c:axId val="244566544"/>
       </c:barChart>
       <c:catAx>
-        <c:axId val="233683216"/>
+        <c:axId val="177188032"/>
         <c:scaling>
           <c:orientation val="minMax"/>
         </c:scaling>
@@ -1504,7 +1504,7 @@
             <a:endParaRPr lang="de-DE"/>
           </a:p>
         </c:txPr>
-        <c:crossAx val="233683776"/>
+        <c:crossAx val="244566544"/>
         <c:crosses val="autoZero"/>
         <c:auto val="1"/>
         <c:lblAlgn val="ctr"/>
@@ -1512,7 +1512,7 @@
         <c:noMultiLvlLbl val="0"/>
       </c:catAx>
       <c:valAx>
-        <c:axId val="233683776"/>
+        <c:axId val="244566544"/>
         <c:scaling>
           <c:orientation val="minMax"/>
         </c:scaling>
@@ -1549,7 +1549,7 @@
             <a:endParaRPr lang="de-DE"/>
           </a:p>
         </c:txPr>
-        <c:crossAx val="233683216"/>
+        <c:crossAx val="177188032"/>
         <c:crosses val="autoZero"/>
         <c:crossBetween val="between"/>
       </c:valAx>
@@ -1800,11 +1800,11 @@
         </c:dLbls>
         <c:gapWidth val="50"/>
         <c:overlap val="-27"/>
-        <c:axId val="233686016"/>
-        <c:axId val="233686576"/>
+        <c:axId val="244564864"/>
+        <c:axId val="248380320"/>
       </c:barChart>
       <c:catAx>
-        <c:axId val="233686016"/>
+        <c:axId val="244564864"/>
         <c:scaling>
           <c:orientation val="minMax"/>
         </c:scaling>
@@ -1847,7 +1847,7 @@
             <a:endParaRPr lang="de-DE"/>
           </a:p>
         </c:txPr>
-        <c:crossAx val="233686576"/>
+        <c:crossAx val="248380320"/>
         <c:crosses val="autoZero"/>
         <c:auto val="1"/>
         <c:lblAlgn val="ctr"/>
@@ -1855,7 +1855,7 @@
         <c:noMultiLvlLbl val="0"/>
       </c:catAx>
       <c:valAx>
-        <c:axId val="233686576"/>
+        <c:axId val="248380320"/>
         <c:scaling>
           <c:orientation val="minMax"/>
         </c:scaling>
@@ -1892,7 +1892,7 @@
             <a:endParaRPr lang="de-DE"/>
           </a:p>
         </c:txPr>
-        <c:crossAx val="233686016"/>
+        <c:crossAx val="244564864"/>
         <c:crosses val="autoZero"/>
         <c:crossBetween val="between"/>
       </c:valAx>
@@ -2147,11 +2147,11 @@
         </c:dLbls>
         <c:gapWidth val="50"/>
         <c:overlap val="-27"/>
-        <c:axId val="227323120"/>
-        <c:axId val="227324800"/>
+        <c:axId val="251286336"/>
+        <c:axId val="251286896"/>
       </c:barChart>
       <c:catAx>
-        <c:axId val="227323120"/>
+        <c:axId val="251286336"/>
         <c:scaling>
           <c:orientation val="minMax"/>
         </c:scaling>
@@ -2194,7 +2194,7 @@
             <a:endParaRPr lang="de-DE"/>
           </a:p>
         </c:txPr>
-        <c:crossAx val="227324800"/>
+        <c:crossAx val="251286896"/>
         <c:crosses val="autoZero"/>
         <c:auto val="1"/>
         <c:lblAlgn val="ctr"/>
@@ -2202,7 +2202,7 @@
         <c:noMultiLvlLbl val="0"/>
       </c:catAx>
       <c:valAx>
-        <c:axId val="227324800"/>
+        <c:axId val="251286896"/>
         <c:scaling>
           <c:orientation val="minMax"/>
         </c:scaling>
@@ -2239,7 +2239,7 @@
             <a:endParaRPr lang="de-DE"/>
           </a:p>
         </c:txPr>
-        <c:crossAx val="227323120"/>
+        <c:crossAx val="251286336"/>
         <c:crosses val="autoZero"/>
         <c:crossBetween val="between"/>
       </c:valAx>
@@ -2490,11 +2490,11 @@
         </c:dLbls>
         <c:gapWidth val="50"/>
         <c:overlap val="-27"/>
-        <c:axId val="234701328"/>
-        <c:axId val="234701888"/>
+        <c:axId val="251289136"/>
+        <c:axId val="251289696"/>
       </c:barChart>
       <c:catAx>
-        <c:axId val="234701328"/>
+        <c:axId val="251289136"/>
         <c:scaling>
           <c:orientation val="minMax"/>
         </c:scaling>
@@ -2537,7 +2537,7 @@
             <a:endParaRPr lang="de-DE"/>
           </a:p>
         </c:txPr>
-        <c:crossAx val="234701888"/>
+        <c:crossAx val="251289696"/>
         <c:crosses val="autoZero"/>
         <c:auto val="1"/>
         <c:lblAlgn val="ctr"/>
@@ -2545,7 +2545,7 @@
         <c:noMultiLvlLbl val="0"/>
       </c:catAx>
       <c:valAx>
-        <c:axId val="234701888"/>
+        <c:axId val="251289696"/>
         <c:scaling>
           <c:orientation val="minMax"/>
         </c:scaling>
@@ -2582,7 +2582,7 @@
             <a:endParaRPr lang="de-DE"/>
           </a:p>
         </c:txPr>
-        <c:crossAx val="234701328"/>
+        <c:crossAx val="251289136"/>
         <c:crosses val="autoZero"/>
         <c:crossBetween val="between"/>
       </c:valAx>
@@ -2833,11 +2833,11 @@
         </c:dLbls>
         <c:gapWidth val="50"/>
         <c:overlap val="-27"/>
-        <c:axId val="229662528"/>
-        <c:axId val="229657488"/>
+        <c:axId val="251291936"/>
+        <c:axId val="251292496"/>
       </c:barChart>
       <c:catAx>
-        <c:axId val="229662528"/>
+        <c:axId val="251291936"/>
         <c:scaling>
           <c:orientation val="minMax"/>
         </c:scaling>
@@ -2880,7 +2880,7 @@
             <a:endParaRPr lang="de-DE"/>
           </a:p>
         </c:txPr>
-        <c:crossAx val="229657488"/>
+        <c:crossAx val="251292496"/>
         <c:crosses val="autoZero"/>
         <c:auto val="1"/>
         <c:lblAlgn val="ctr"/>
@@ -2888,7 +2888,7 @@
         <c:noMultiLvlLbl val="0"/>
       </c:catAx>
       <c:valAx>
-        <c:axId val="229657488"/>
+        <c:axId val="251292496"/>
         <c:scaling>
           <c:orientation val="minMax"/>
         </c:scaling>
@@ -2925,7 +2925,7 @@
             <a:endParaRPr lang="de-DE"/>
           </a:p>
         </c:txPr>
-        <c:crossAx val="229662528"/>
+        <c:crossAx val="251291936"/>
         <c:crosses val="autoZero"/>
         <c:crossBetween val="between"/>
       </c:valAx>
@@ -3176,11 +3176,11 @@
         </c:dLbls>
         <c:gapWidth val="50"/>
         <c:overlap val="-27"/>
-        <c:axId val="234706368"/>
-        <c:axId val="234706928"/>
+        <c:axId val="251294736"/>
+        <c:axId val="251295296"/>
       </c:barChart>
       <c:catAx>
-        <c:axId val="234706368"/>
+        <c:axId val="251294736"/>
         <c:scaling>
           <c:orientation val="minMax"/>
         </c:scaling>
@@ -3223,7 +3223,7 @@
             <a:endParaRPr lang="de-DE"/>
           </a:p>
         </c:txPr>
-        <c:crossAx val="234706928"/>
+        <c:crossAx val="251295296"/>
         <c:crosses val="autoZero"/>
         <c:auto val="1"/>
         <c:lblAlgn val="ctr"/>
@@ -3231,7 +3231,7 @@
         <c:noMultiLvlLbl val="0"/>
       </c:catAx>
       <c:valAx>
-        <c:axId val="234706928"/>
+        <c:axId val="251295296"/>
         <c:scaling>
           <c:orientation val="minMax"/>
         </c:scaling>
@@ -3268,7 +3268,7 @@
             <a:endParaRPr lang="de-DE"/>
           </a:p>
         </c:txPr>
-        <c:crossAx val="234706368"/>
+        <c:crossAx val="251294736"/>
         <c:crosses val="autoZero"/>
         <c:crossBetween val="between"/>
       </c:valAx>
@@ -3519,11 +3519,11 @@
         </c:dLbls>
         <c:gapWidth val="50"/>
         <c:overlap val="-27"/>
-        <c:axId val="227322560"/>
-        <c:axId val="234708608"/>
+        <c:axId val="251297536"/>
+        <c:axId val="251298096"/>
       </c:barChart>
       <c:catAx>
-        <c:axId val="227322560"/>
+        <c:axId val="251297536"/>
         <c:scaling>
           <c:orientation val="minMax"/>
         </c:scaling>
@@ -3566,7 +3566,7 @@
             <a:endParaRPr lang="de-DE"/>
           </a:p>
         </c:txPr>
-        <c:crossAx val="234708608"/>
+        <c:crossAx val="251298096"/>
         <c:crosses val="autoZero"/>
         <c:auto val="1"/>
         <c:lblAlgn val="ctr"/>
@@ -3574,7 +3574,7 @@
         <c:noMultiLvlLbl val="0"/>
       </c:catAx>
       <c:valAx>
-        <c:axId val="234708608"/>
+        <c:axId val="251298096"/>
         <c:scaling>
           <c:orientation val="minMax"/>
         </c:scaling>
@@ -3611,7 +3611,7 @@
             <a:endParaRPr lang="de-DE"/>
           </a:p>
         </c:txPr>
-        <c:crossAx val="227322560"/>
+        <c:crossAx val="251297536"/>
         <c:crosses val="autoZero"/>
         <c:crossBetween val="between"/>
       </c:valAx>
@@ -3862,11 +3862,11 @@
         </c:dLbls>
         <c:gapWidth val="50"/>
         <c:overlap val="-27"/>
-        <c:axId val="234710848"/>
-        <c:axId val="234711408"/>
+        <c:axId val="251300336"/>
+        <c:axId val="250711328"/>
       </c:barChart>
       <c:catAx>
-        <c:axId val="234710848"/>
+        <c:axId val="251300336"/>
         <c:scaling>
           <c:orientation val="minMax"/>
         </c:scaling>
@@ -3909,7 +3909,7 @@
             <a:endParaRPr lang="de-DE"/>
           </a:p>
         </c:txPr>
-        <c:crossAx val="234711408"/>
+        <c:crossAx val="250711328"/>
         <c:crosses val="autoZero"/>
         <c:auto val="1"/>
         <c:lblAlgn val="ctr"/>
@@ -3917,7 +3917,7 @@
         <c:noMultiLvlLbl val="0"/>
       </c:catAx>
       <c:valAx>
-        <c:axId val="234711408"/>
+        <c:axId val="250711328"/>
         <c:scaling>
           <c:orientation val="minMax"/>
         </c:scaling>
@@ -3954,7 +3954,7 @@
             <a:endParaRPr lang="de-DE"/>
           </a:p>
         </c:txPr>
-        <c:crossAx val="234710848"/>
+        <c:crossAx val="251300336"/>
         <c:crosses val="autoZero"/>
         <c:crossBetween val="between"/>
       </c:valAx>
@@ -4205,11 +4205,11 @@
         </c:dLbls>
         <c:gapWidth val="50"/>
         <c:overlap val="-27"/>
-        <c:axId val="231668896"/>
-        <c:axId val="231669456"/>
+        <c:axId val="248496048"/>
+        <c:axId val="248496608"/>
       </c:barChart>
       <c:catAx>
-        <c:axId val="231668896"/>
+        <c:axId val="248496048"/>
         <c:scaling>
           <c:orientation val="minMax"/>
         </c:scaling>
@@ -4252,7 +4252,7 @@
             <a:endParaRPr lang="de-DE"/>
           </a:p>
         </c:txPr>
-        <c:crossAx val="231669456"/>
+        <c:crossAx val="248496608"/>
         <c:crosses val="autoZero"/>
         <c:auto val="1"/>
         <c:lblAlgn val="ctr"/>
@@ -4260,7 +4260,7 @@
         <c:noMultiLvlLbl val="0"/>
       </c:catAx>
       <c:valAx>
-        <c:axId val="231669456"/>
+        <c:axId val="248496608"/>
         <c:scaling>
           <c:orientation val="minMax"/>
         </c:scaling>
@@ -4297,7 +4297,7 @@
             <a:endParaRPr lang="de-DE"/>
           </a:p>
         </c:txPr>
-        <c:crossAx val="231668896"/>
+        <c:crossAx val="248496048"/>
         <c:crosses val="autoZero"/>
         <c:crossBetween val="between"/>
       </c:valAx>
@@ -4552,11 +4552,11 @@
         </c:dLbls>
         <c:gapWidth val="50"/>
         <c:overlap val="-27"/>
-        <c:axId val="234713648"/>
-        <c:axId val="234714208"/>
+        <c:axId val="250719168"/>
+        <c:axId val="250716928"/>
       </c:barChart>
       <c:catAx>
-        <c:axId val="234713648"/>
+        <c:axId val="250719168"/>
         <c:scaling>
           <c:orientation val="minMax"/>
         </c:scaling>
@@ -4599,7 +4599,7 @@
             <a:endParaRPr lang="de-DE"/>
           </a:p>
         </c:txPr>
-        <c:crossAx val="234714208"/>
+        <c:crossAx val="250716928"/>
         <c:crosses val="autoZero"/>
         <c:auto val="1"/>
         <c:lblAlgn val="ctr"/>
@@ -4607,7 +4607,7 @@
         <c:noMultiLvlLbl val="0"/>
       </c:catAx>
       <c:valAx>
-        <c:axId val="234714208"/>
+        <c:axId val="250716928"/>
         <c:scaling>
           <c:orientation val="minMax"/>
         </c:scaling>
@@ -4644,7 +4644,7 @@
             <a:endParaRPr lang="de-DE"/>
           </a:p>
         </c:txPr>
-        <c:crossAx val="234713648"/>
+        <c:crossAx val="250719168"/>
         <c:crosses val="autoZero"/>
         <c:crossBetween val="between"/>
       </c:valAx>
@@ -4895,11 +4895,11 @@
         </c:dLbls>
         <c:gapWidth val="50"/>
         <c:overlap val="-27"/>
-        <c:axId val="234716448"/>
-        <c:axId val="234717008"/>
+        <c:axId val="250718048"/>
+        <c:axId val="250721408"/>
       </c:barChart>
       <c:catAx>
-        <c:axId val="234716448"/>
+        <c:axId val="250718048"/>
         <c:scaling>
           <c:orientation val="minMax"/>
         </c:scaling>
@@ -4942,7 +4942,7 @@
             <a:endParaRPr lang="de-DE"/>
           </a:p>
         </c:txPr>
-        <c:crossAx val="234717008"/>
+        <c:crossAx val="250721408"/>
         <c:crosses val="autoZero"/>
         <c:auto val="1"/>
         <c:lblAlgn val="ctr"/>
@@ -4950,7 +4950,7 @@
         <c:noMultiLvlLbl val="0"/>
       </c:catAx>
       <c:valAx>
-        <c:axId val="234717008"/>
+        <c:axId val="250721408"/>
         <c:scaling>
           <c:orientation val="minMax"/>
         </c:scaling>
@@ -4987,7 +4987,7 @@
             <a:endParaRPr lang="de-DE"/>
           </a:p>
         </c:txPr>
-        <c:crossAx val="234716448"/>
+        <c:crossAx val="250718048"/>
         <c:crosses val="autoZero"/>
         <c:crossBetween val="between"/>
       </c:valAx>
@@ -5238,11 +5238,11 @@
         </c:dLbls>
         <c:gapWidth val="50"/>
         <c:overlap val="-27"/>
-        <c:axId val="234719248"/>
-        <c:axId val="234719808"/>
+        <c:axId val="250723648"/>
+        <c:axId val="250724208"/>
       </c:barChart>
       <c:catAx>
-        <c:axId val="234719248"/>
+        <c:axId val="250723648"/>
         <c:scaling>
           <c:orientation val="minMax"/>
         </c:scaling>
@@ -5285,7 +5285,7 @@
             <a:endParaRPr lang="de-DE"/>
           </a:p>
         </c:txPr>
-        <c:crossAx val="234719808"/>
+        <c:crossAx val="250724208"/>
         <c:crosses val="autoZero"/>
         <c:auto val="1"/>
         <c:lblAlgn val="ctr"/>
@@ -5293,7 +5293,7 @@
         <c:noMultiLvlLbl val="0"/>
       </c:catAx>
       <c:valAx>
-        <c:axId val="234719808"/>
+        <c:axId val="250724208"/>
         <c:scaling>
           <c:orientation val="minMax"/>
         </c:scaling>
@@ -5330,7 +5330,7 @@
             <a:endParaRPr lang="de-DE"/>
           </a:p>
         </c:txPr>
-        <c:crossAx val="234719248"/>
+        <c:crossAx val="250723648"/>
         <c:crosses val="autoZero"/>
         <c:crossBetween val="between"/>
       </c:valAx>
@@ -5581,11 +5581,11 @@
         </c:dLbls>
         <c:gapWidth val="50"/>
         <c:overlap val="-27"/>
-        <c:axId val="234722048"/>
-        <c:axId val="234722608"/>
+        <c:axId val="250726448"/>
+        <c:axId val="250727008"/>
       </c:barChart>
       <c:catAx>
-        <c:axId val="234722048"/>
+        <c:axId val="250726448"/>
         <c:scaling>
           <c:orientation val="minMax"/>
         </c:scaling>
@@ -5628,7 +5628,7 @@
             <a:endParaRPr lang="de-DE"/>
           </a:p>
         </c:txPr>
-        <c:crossAx val="234722608"/>
+        <c:crossAx val="250727008"/>
         <c:crosses val="autoZero"/>
         <c:auto val="1"/>
         <c:lblAlgn val="ctr"/>
@@ -5636,7 +5636,7 @@
         <c:noMultiLvlLbl val="0"/>
       </c:catAx>
       <c:valAx>
-        <c:axId val="234722608"/>
+        <c:axId val="250727008"/>
         <c:scaling>
           <c:orientation val="minMax"/>
         </c:scaling>
@@ -5673,7 +5673,7 @@
             <a:endParaRPr lang="de-DE"/>
           </a:p>
         </c:txPr>
-        <c:crossAx val="234722048"/>
+        <c:crossAx val="250726448"/>
         <c:crosses val="autoZero"/>
         <c:crossBetween val="between"/>
       </c:valAx>
@@ -5919,11 +5919,11 @@
         </c:dLbls>
         <c:gapWidth val="50"/>
         <c:overlap val="-27"/>
-        <c:axId val="234724848"/>
-        <c:axId val="234725408"/>
+        <c:axId val="250729248"/>
+        <c:axId val="250729808"/>
       </c:barChart>
       <c:catAx>
-        <c:axId val="234724848"/>
+        <c:axId val="250729248"/>
         <c:scaling>
           <c:orientation val="minMax"/>
         </c:scaling>
@@ -5966,7 +5966,7 @@
             <a:endParaRPr lang="de-DE"/>
           </a:p>
         </c:txPr>
-        <c:crossAx val="234725408"/>
+        <c:crossAx val="250729808"/>
         <c:crosses val="autoZero"/>
         <c:auto val="1"/>
         <c:lblAlgn val="ctr"/>
@@ -5974,7 +5974,7 @@
         <c:noMultiLvlLbl val="0"/>
       </c:catAx>
       <c:valAx>
-        <c:axId val="234725408"/>
+        <c:axId val="250729808"/>
         <c:scaling>
           <c:orientation val="minMax"/>
         </c:scaling>
@@ -6011,7 +6011,7 @@
             <a:endParaRPr lang="de-DE"/>
           </a:p>
         </c:txPr>
-        <c:crossAx val="234724848"/>
+        <c:crossAx val="250729248"/>
         <c:crosses val="autoZero"/>
         <c:crossBetween val="between"/>
       </c:valAx>
@@ -6262,11 +6262,11 @@
         </c:dLbls>
         <c:gapWidth val="50"/>
         <c:overlap val="-27"/>
-        <c:axId val="234727648"/>
-        <c:axId val="234728208"/>
+        <c:axId val="250732048"/>
+        <c:axId val="250732608"/>
       </c:barChart>
       <c:catAx>
-        <c:axId val="234727648"/>
+        <c:axId val="250732048"/>
         <c:scaling>
           <c:orientation val="minMax"/>
         </c:scaling>
@@ -6309,7 +6309,7 @@
             <a:endParaRPr lang="de-DE"/>
           </a:p>
         </c:txPr>
-        <c:crossAx val="234728208"/>
+        <c:crossAx val="250732608"/>
         <c:crosses val="autoZero"/>
         <c:auto val="1"/>
         <c:lblAlgn val="ctr"/>
@@ -6317,7 +6317,7 @@
         <c:noMultiLvlLbl val="0"/>
       </c:catAx>
       <c:valAx>
-        <c:axId val="234728208"/>
+        <c:axId val="250732608"/>
         <c:scaling>
           <c:orientation val="minMax"/>
         </c:scaling>
@@ -6354,7 +6354,7 @@
             <a:endParaRPr lang="de-DE"/>
           </a:p>
         </c:txPr>
-        <c:crossAx val="234727648"/>
+        <c:crossAx val="250732048"/>
         <c:crosses val="autoZero"/>
         <c:crossBetween val="between"/>
       </c:valAx>
@@ -6609,11 +6609,11 @@
         </c:dLbls>
         <c:gapWidth val="50"/>
         <c:overlap val="-27"/>
-        <c:axId val="234707488"/>
-        <c:axId val="234731008"/>
+        <c:axId val="250737088"/>
+        <c:axId val="250737648"/>
       </c:barChart>
       <c:catAx>
-        <c:axId val="234707488"/>
+        <c:axId val="250737088"/>
         <c:scaling>
           <c:orientation val="minMax"/>
         </c:scaling>
@@ -6656,7 +6656,7 @@
             <a:endParaRPr lang="de-DE"/>
           </a:p>
         </c:txPr>
-        <c:crossAx val="234731008"/>
+        <c:crossAx val="250737648"/>
         <c:crosses val="autoZero"/>
         <c:auto val="1"/>
         <c:lblAlgn val="ctr"/>
@@ -6664,7 +6664,7 @@
         <c:noMultiLvlLbl val="0"/>
       </c:catAx>
       <c:valAx>
-        <c:axId val="234731008"/>
+        <c:axId val="250737648"/>
         <c:scaling>
           <c:orientation val="minMax"/>
         </c:scaling>
@@ -6701,7 +6701,7 @@
             <a:endParaRPr lang="de-DE"/>
           </a:p>
         </c:txPr>
-        <c:crossAx val="234707488"/>
+        <c:crossAx val="250737088"/>
         <c:crosses val="autoZero"/>
         <c:crossBetween val="between"/>
       </c:valAx>
@@ -6952,11 +6952,11 @@
         </c:dLbls>
         <c:gapWidth val="50"/>
         <c:overlap val="-27"/>
-        <c:axId val="227041776"/>
-        <c:axId val="227039536"/>
+        <c:axId val="250735968"/>
+        <c:axId val="250739328"/>
       </c:barChart>
       <c:catAx>
-        <c:axId val="227041776"/>
+        <c:axId val="250735968"/>
         <c:scaling>
           <c:orientation val="minMax"/>
         </c:scaling>
@@ -6999,7 +6999,7 @@
             <a:endParaRPr lang="de-DE"/>
           </a:p>
         </c:txPr>
-        <c:crossAx val="227039536"/>
+        <c:crossAx val="250739328"/>
         <c:crosses val="autoZero"/>
         <c:auto val="1"/>
         <c:lblAlgn val="ctr"/>
@@ -7007,7 +7007,7 @@
         <c:noMultiLvlLbl val="0"/>
       </c:catAx>
       <c:valAx>
-        <c:axId val="227039536"/>
+        <c:axId val="250739328"/>
         <c:scaling>
           <c:orientation val="minMax"/>
         </c:scaling>
@@ -7044,7 +7044,7 @@
             <a:endParaRPr lang="de-DE"/>
           </a:p>
         </c:txPr>
-        <c:crossAx val="227041776"/>
+        <c:crossAx val="250735968"/>
         <c:crosses val="autoZero"/>
         <c:crossBetween val="between"/>
       </c:valAx>
@@ -7295,11 +7295,11 @@
         </c:dLbls>
         <c:gapWidth val="50"/>
         <c:overlap val="-27"/>
-        <c:axId val="227318080"/>
-        <c:axId val="227044576"/>
+        <c:axId val="250741568"/>
+        <c:axId val="250742128"/>
       </c:barChart>
       <c:catAx>
-        <c:axId val="227318080"/>
+        <c:axId val="250741568"/>
         <c:scaling>
           <c:orientation val="minMax"/>
         </c:scaling>
@@ -7342,7 +7342,7 @@
             <a:endParaRPr lang="de-DE"/>
           </a:p>
         </c:txPr>
-        <c:crossAx val="227044576"/>
+        <c:crossAx val="250742128"/>
         <c:crosses val="autoZero"/>
         <c:auto val="1"/>
         <c:lblAlgn val="ctr"/>
@@ -7350,7 +7350,7 @@
         <c:noMultiLvlLbl val="0"/>
       </c:catAx>
       <c:valAx>
-        <c:axId val="227044576"/>
+        <c:axId val="250742128"/>
         <c:scaling>
           <c:orientation val="minMax"/>
         </c:scaling>
@@ -7387,7 +7387,7 @@
             <a:endParaRPr lang="de-DE"/>
           </a:p>
         </c:txPr>
-        <c:crossAx val="227318080"/>
+        <c:crossAx val="250741568"/>
         <c:crosses val="autoZero"/>
         <c:crossBetween val="between"/>
       </c:valAx>
@@ -7638,11 +7638,11 @@
         </c:dLbls>
         <c:gapWidth val="50"/>
         <c:overlap val="-27"/>
-        <c:axId val="227046816"/>
-        <c:axId val="227047376"/>
+        <c:axId val="250720848"/>
+        <c:axId val="177187472"/>
       </c:barChart>
       <c:catAx>
-        <c:axId val="227046816"/>
+        <c:axId val="250720848"/>
         <c:scaling>
           <c:orientation val="minMax"/>
         </c:scaling>
@@ -7685,7 +7685,7 @@
             <a:endParaRPr lang="de-DE"/>
           </a:p>
         </c:txPr>
-        <c:crossAx val="227047376"/>
+        <c:crossAx val="177187472"/>
         <c:crosses val="autoZero"/>
         <c:auto val="1"/>
         <c:lblAlgn val="ctr"/>
@@ -7693,7 +7693,7 @@
         <c:noMultiLvlLbl val="0"/>
       </c:catAx>
       <c:valAx>
-        <c:axId val="227047376"/>
+        <c:axId val="177187472"/>
         <c:scaling>
           <c:orientation val="minMax"/>
         </c:scaling>
@@ -7730,7 +7730,7 @@
             <a:endParaRPr lang="de-DE"/>
           </a:p>
         </c:txPr>
-        <c:crossAx val="227046816"/>
+        <c:crossAx val="250720848"/>
         <c:crosses val="autoZero"/>
         <c:crossBetween val="between"/>
       </c:valAx>
@@ -7985,11 +7985,11 @@
         </c:dLbls>
         <c:gapWidth val="50"/>
         <c:overlap val="-27"/>
-        <c:axId val="231671696"/>
-        <c:axId val="231672256"/>
+        <c:axId val="248498848"/>
+        <c:axId val="248499408"/>
       </c:barChart>
       <c:catAx>
-        <c:axId val="231671696"/>
+        <c:axId val="248498848"/>
         <c:scaling>
           <c:orientation val="minMax"/>
         </c:scaling>
@@ -8032,7 +8032,7 @@
             <a:endParaRPr lang="de-DE"/>
           </a:p>
         </c:txPr>
-        <c:crossAx val="231672256"/>
+        <c:crossAx val="248499408"/>
         <c:crosses val="autoZero"/>
         <c:auto val="1"/>
         <c:lblAlgn val="ctr"/>
@@ -8040,7 +8040,7 @@
         <c:noMultiLvlLbl val="0"/>
       </c:catAx>
       <c:valAx>
-        <c:axId val="231672256"/>
+        <c:axId val="248499408"/>
         <c:scaling>
           <c:orientation val="minMax"/>
         </c:scaling>
@@ -8077,7 +8077,7 @@
             <a:endParaRPr lang="de-DE"/>
           </a:p>
         </c:txPr>
-        <c:crossAx val="231671696"/>
+        <c:crossAx val="248498848"/>
         <c:crosses val="autoZero"/>
         <c:crossBetween val="between"/>
       </c:valAx>
@@ -8323,11 +8323,11 @@
         </c:dLbls>
         <c:gapWidth val="50"/>
         <c:overlap val="-27"/>
-        <c:axId val="227049616"/>
-        <c:axId val="227050176"/>
+        <c:axId val="249613840"/>
+        <c:axId val="249616640"/>
       </c:barChart>
       <c:catAx>
-        <c:axId val="227049616"/>
+        <c:axId val="249613840"/>
         <c:scaling>
           <c:orientation val="minMax"/>
         </c:scaling>
@@ -8370,7 +8370,7 @@
             <a:endParaRPr lang="de-DE"/>
           </a:p>
         </c:txPr>
-        <c:crossAx val="227050176"/>
+        <c:crossAx val="249616640"/>
         <c:crosses val="autoZero"/>
         <c:auto val="1"/>
         <c:lblAlgn val="ctr"/>
@@ -8378,7 +8378,7 @@
         <c:noMultiLvlLbl val="0"/>
       </c:catAx>
       <c:valAx>
-        <c:axId val="227050176"/>
+        <c:axId val="249616640"/>
         <c:scaling>
           <c:orientation val="minMax"/>
         </c:scaling>
@@ -8415,7 +8415,7 @@
             <a:endParaRPr lang="de-DE"/>
           </a:p>
         </c:txPr>
-        <c:crossAx val="227049616"/>
+        <c:crossAx val="249613840"/>
         <c:crosses val="autoZero"/>
         <c:crossBetween val="between"/>
       </c:valAx>
@@ -8662,11 +8662,11 @@
         </c:dLbls>
         <c:gapWidth val="50"/>
         <c:overlap val="-27"/>
-        <c:axId val="227052416"/>
-        <c:axId val="227052976"/>
+        <c:axId val="249610480"/>
+        <c:axId val="249612160"/>
       </c:barChart>
       <c:catAx>
-        <c:axId val="227052416"/>
+        <c:axId val="249610480"/>
         <c:scaling>
           <c:orientation val="minMax"/>
         </c:scaling>
@@ -8709,7 +8709,7 @@
             <a:endParaRPr lang="de-DE"/>
           </a:p>
         </c:txPr>
-        <c:crossAx val="227052976"/>
+        <c:crossAx val="249612160"/>
         <c:crosses val="autoZero"/>
         <c:auto val="1"/>
         <c:lblAlgn val="ctr"/>
@@ -8717,7 +8717,7 @@
         <c:noMultiLvlLbl val="0"/>
       </c:catAx>
       <c:valAx>
-        <c:axId val="227052976"/>
+        <c:axId val="249612160"/>
         <c:scaling>
           <c:orientation val="minMax"/>
         </c:scaling>
@@ -8754,7 +8754,7 @@
             <a:endParaRPr lang="de-DE"/>
           </a:p>
         </c:txPr>
-        <c:crossAx val="227052416"/>
+        <c:crossAx val="249610480"/>
         <c:crosses val="autoZero"/>
         <c:crossBetween val="between"/>
       </c:valAx>
@@ -9005,11 +9005,11 @@
         </c:dLbls>
         <c:gapWidth val="50"/>
         <c:overlap val="-27"/>
-        <c:axId val="227055216"/>
-        <c:axId val="227055776"/>
+        <c:axId val="249621120"/>
+        <c:axId val="249617760"/>
       </c:barChart>
       <c:catAx>
-        <c:axId val="227055216"/>
+        <c:axId val="249621120"/>
         <c:scaling>
           <c:orientation val="minMax"/>
         </c:scaling>
@@ -9052,7 +9052,7 @@
             <a:endParaRPr lang="de-DE"/>
           </a:p>
         </c:txPr>
-        <c:crossAx val="227055776"/>
+        <c:crossAx val="249617760"/>
         <c:crosses val="autoZero"/>
         <c:auto val="1"/>
         <c:lblAlgn val="ctr"/>
@@ -9060,7 +9060,7 @@
         <c:noMultiLvlLbl val="0"/>
       </c:catAx>
       <c:valAx>
-        <c:axId val="227055776"/>
+        <c:axId val="249617760"/>
         <c:scaling>
           <c:orientation val="minMax"/>
         </c:scaling>
@@ -9097,7 +9097,7 @@
             <a:endParaRPr lang="de-DE"/>
           </a:p>
         </c:txPr>
-        <c:crossAx val="227055216"/>
+        <c:crossAx val="249621120"/>
         <c:crosses val="autoZero"/>
         <c:crossBetween val="between"/>
       </c:valAx>
@@ -9348,11 +9348,11 @@
         </c:dLbls>
         <c:gapWidth val="50"/>
         <c:overlap val="-27"/>
-        <c:axId val="227058016"/>
-        <c:axId val="227058576"/>
+        <c:axId val="249623360"/>
+        <c:axId val="250717488"/>
       </c:barChart>
       <c:catAx>
-        <c:axId val="227058016"/>
+        <c:axId val="249623360"/>
         <c:scaling>
           <c:orientation val="minMax"/>
         </c:scaling>
@@ -9395,7 +9395,7 @@
             <a:endParaRPr lang="de-DE"/>
           </a:p>
         </c:txPr>
-        <c:crossAx val="227058576"/>
+        <c:crossAx val="250717488"/>
         <c:crosses val="autoZero"/>
         <c:auto val="1"/>
         <c:lblAlgn val="ctr"/>
@@ -9403,7 +9403,7 @@
         <c:noMultiLvlLbl val="0"/>
       </c:catAx>
       <c:valAx>
-        <c:axId val="227058576"/>
+        <c:axId val="250717488"/>
         <c:scaling>
           <c:orientation val="minMax"/>
         </c:scaling>
@@ -9440,7 +9440,7 @@
             <a:endParaRPr lang="de-DE"/>
           </a:p>
         </c:txPr>
-        <c:crossAx val="227058016"/>
+        <c:crossAx val="249623360"/>
         <c:crosses val="autoZero"/>
         <c:crossBetween val="between"/>
       </c:valAx>
@@ -9691,11 +9691,11 @@
         </c:dLbls>
         <c:gapWidth val="50"/>
         <c:overlap val="-27"/>
-        <c:axId val="227060816"/>
-        <c:axId val="227061376"/>
+        <c:axId val="249618880"/>
+        <c:axId val="249620560"/>
       </c:barChart>
       <c:catAx>
-        <c:axId val="227060816"/>
+        <c:axId val="249618880"/>
         <c:scaling>
           <c:orientation val="minMax"/>
         </c:scaling>
@@ -9738,7 +9738,7 @@
             <a:endParaRPr lang="de-DE"/>
           </a:p>
         </c:txPr>
-        <c:crossAx val="227061376"/>
+        <c:crossAx val="249620560"/>
         <c:crosses val="autoZero"/>
         <c:auto val="1"/>
         <c:lblAlgn val="ctr"/>
@@ -9746,7 +9746,7 @@
         <c:noMultiLvlLbl val="0"/>
       </c:catAx>
       <c:valAx>
-        <c:axId val="227061376"/>
+        <c:axId val="249620560"/>
         <c:scaling>
           <c:orientation val="minMax"/>
         </c:scaling>
@@ -9783,7 +9783,7 @@
             <a:endParaRPr lang="de-DE"/>
           </a:p>
         </c:txPr>
-        <c:crossAx val="227060816"/>
+        <c:crossAx val="249618880"/>
         <c:crosses val="autoZero"/>
         <c:crossBetween val="between"/>
       </c:valAx>
@@ -10034,11 +10034,11 @@
         </c:dLbls>
         <c:gapWidth val="50"/>
         <c:overlap val="-27"/>
-        <c:axId val="227063616"/>
-        <c:axId val="227064176"/>
+        <c:axId val="249626720"/>
+        <c:axId val="249627280"/>
       </c:barChart>
       <c:catAx>
-        <c:axId val="227063616"/>
+        <c:axId val="249626720"/>
         <c:scaling>
           <c:orientation val="minMax"/>
         </c:scaling>
@@ -10081,7 +10081,7 @@
             <a:endParaRPr lang="de-DE"/>
           </a:p>
         </c:txPr>
-        <c:crossAx val="227064176"/>
+        <c:crossAx val="249627280"/>
         <c:crosses val="autoZero"/>
         <c:auto val="1"/>
         <c:lblAlgn val="ctr"/>
@@ -10089,7 +10089,7 @@
         <c:noMultiLvlLbl val="0"/>
       </c:catAx>
       <c:valAx>
-        <c:axId val="227064176"/>
+        <c:axId val="249627280"/>
         <c:scaling>
           <c:orientation val="minMax"/>
         </c:scaling>
@@ -10126,7 +10126,7 @@
             <a:endParaRPr lang="de-DE"/>
           </a:p>
         </c:txPr>
-        <c:crossAx val="227063616"/>
+        <c:crossAx val="249626720"/>
         <c:crosses val="autoZero"/>
         <c:crossBetween val="between"/>
       </c:valAx>
@@ -10372,11 +10372,11 @@
         </c:dLbls>
         <c:gapWidth val="50"/>
         <c:overlap val="-27"/>
-        <c:axId val="227066416"/>
-        <c:axId val="227066976"/>
+        <c:axId val="249629520"/>
+        <c:axId val="249630080"/>
       </c:barChart>
       <c:catAx>
-        <c:axId val="227066416"/>
+        <c:axId val="249629520"/>
         <c:scaling>
           <c:orientation val="minMax"/>
         </c:scaling>
@@ -10419,7 +10419,7 @@
             <a:endParaRPr lang="de-DE"/>
           </a:p>
         </c:txPr>
-        <c:crossAx val="227066976"/>
+        <c:crossAx val="249630080"/>
         <c:crosses val="autoZero"/>
         <c:auto val="1"/>
         <c:lblAlgn val="ctr"/>
@@ -10427,7 +10427,7 @@
         <c:noMultiLvlLbl val="0"/>
       </c:catAx>
       <c:valAx>
-        <c:axId val="227066976"/>
+        <c:axId val="249630080"/>
         <c:scaling>
           <c:orientation val="minMax"/>
         </c:scaling>
@@ -10464,7 +10464,7 @@
             <a:endParaRPr lang="de-DE"/>
           </a:p>
         </c:txPr>
-        <c:crossAx val="227066416"/>
+        <c:crossAx val="249629520"/>
         <c:crosses val="autoZero"/>
         <c:crossBetween val="between"/>
       </c:valAx>
@@ -10711,11 +10711,11 @@
         </c:dLbls>
         <c:gapWidth val="50"/>
         <c:overlap val="-27"/>
-        <c:axId val="227069216"/>
-        <c:axId val="227069776"/>
+        <c:axId val="249632320"/>
+        <c:axId val="249632880"/>
       </c:barChart>
       <c:catAx>
-        <c:axId val="227069216"/>
+        <c:axId val="249632320"/>
         <c:scaling>
           <c:orientation val="minMax"/>
         </c:scaling>
@@ -10758,7 +10758,7 @@
             <a:endParaRPr lang="de-DE"/>
           </a:p>
         </c:txPr>
-        <c:crossAx val="227069776"/>
+        <c:crossAx val="249632880"/>
         <c:crosses val="autoZero"/>
         <c:auto val="1"/>
         <c:lblAlgn val="ctr"/>
@@ -10766,7 +10766,7 @@
         <c:noMultiLvlLbl val="0"/>
       </c:catAx>
       <c:valAx>
-        <c:axId val="227069776"/>
+        <c:axId val="249632880"/>
         <c:scaling>
           <c:orientation val="minMax"/>
         </c:scaling>
@@ -10803,7 +10803,7 @@
             <a:endParaRPr lang="de-DE"/>
           </a:p>
         </c:txPr>
-        <c:crossAx val="227069216"/>
+        <c:crossAx val="249632320"/>
         <c:crosses val="autoZero"/>
         <c:crossBetween val="between"/>
       </c:valAx>
@@ -11054,11 +11054,11 @@
         </c:dLbls>
         <c:gapWidth val="50"/>
         <c:overlap val="-27"/>
-        <c:axId val="231674496"/>
-        <c:axId val="231675056"/>
+        <c:axId val="170012032"/>
+        <c:axId val="174618896"/>
       </c:barChart>
       <c:catAx>
-        <c:axId val="231674496"/>
+        <c:axId val="170012032"/>
         <c:scaling>
           <c:orientation val="minMax"/>
         </c:scaling>
@@ -11101,7 +11101,7 @@
             <a:endParaRPr lang="de-DE"/>
           </a:p>
         </c:txPr>
-        <c:crossAx val="231675056"/>
+        <c:crossAx val="174618896"/>
         <c:crosses val="autoZero"/>
         <c:auto val="1"/>
         <c:lblAlgn val="ctr"/>
@@ -11109,7 +11109,7 @@
         <c:noMultiLvlLbl val="0"/>
       </c:catAx>
       <c:valAx>
-        <c:axId val="231675056"/>
+        <c:axId val="174618896"/>
         <c:scaling>
           <c:orientation val="minMax"/>
         </c:scaling>
@@ -11146,7 +11146,7 @@
             <a:endParaRPr lang="de-DE"/>
           </a:p>
         </c:txPr>
-        <c:crossAx val="231674496"/>
+        <c:crossAx val="170012032"/>
         <c:crosses val="autoZero"/>
         <c:crossBetween val="between"/>
       </c:valAx>
@@ -11397,11 +11397,11 @@
         </c:dLbls>
         <c:gapWidth val="50"/>
         <c:overlap val="-27"/>
-        <c:axId val="231470800"/>
-        <c:axId val="231471360"/>
+        <c:axId val="248371920"/>
+        <c:axId val="248372480"/>
       </c:barChart>
       <c:catAx>
-        <c:axId val="231470800"/>
+        <c:axId val="248371920"/>
         <c:scaling>
           <c:orientation val="minMax"/>
         </c:scaling>
@@ -11444,7 +11444,7 @@
             <a:endParaRPr lang="de-DE"/>
           </a:p>
         </c:txPr>
-        <c:crossAx val="231471360"/>
+        <c:crossAx val="248372480"/>
         <c:crosses val="autoZero"/>
         <c:auto val="1"/>
         <c:lblAlgn val="ctr"/>
@@ -11452,7 +11452,7 @@
         <c:noMultiLvlLbl val="0"/>
       </c:catAx>
       <c:valAx>
-        <c:axId val="231471360"/>
+        <c:axId val="248372480"/>
         <c:scaling>
           <c:orientation val="minMax"/>
         </c:scaling>
@@ -11489,7 +11489,7 @@
             <a:endParaRPr lang="de-DE"/>
           </a:p>
         </c:txPr>
-        <c:crossAx val="231470800"/>
+        <c:crossAx val="248371920"/>
         <c:crosses val="autoZero"/>
         <c:crossBetween val="between"/>
       </c:valAx>
@@ -11740,11 +11740,11 @@
         </c:dLbls>
         <c:gapWidth val="50"/>
         <c:overlap val="-27"/>
-        <c:axId val="231473600"/>
-        <c:axId val="231474160"/>
+        <c:axId val="248374720"/>
+        <c:axId val="248375280"/>
       </c:barChart>
       <c:catAx>
-        <c:axId val="231473600"/>
+        <c:axId val="248374720"/>
         <c:scaling>
           <c:orientation val="minMax"/>
         </c:scaling>
@@ -11787,7 +11787,7 @@
             <a:endParaRPr lang="de-DE"/>
           </a:p>
         </c:txPr>
-        <c:crossAx val="231474160"/>
+        <c:crossAx val="248375280"/>
         <c:crosses val="autoZero"/>
         <c:auto val="1"/>
         <c:lblAlgn val="ctr"/>
@@ -11795,7 +11795,7 @@
         <c:noMultiLvlLbl val="0"/>
       </c:catAx>
       <c:valAx>
-        <c:axId val="231474160"/>
+        <c:axId val="248375280"/>
         <c:scaling>
           <c:orientation val="minMax"/>
         </c:scaling>
@@ -11832,7 +11832,7 @@
             <a:endParaRPr lang="de-DE"/>
           </a:p>
         </c:txPr>
-        <c:crossAx val="231473600"/>
+        <c:crossAx val="248374720"/>
         <c:crosses val="autoZero"/>
         <c:crossBetween val="between"/>
       </c:valAx>
@@ -12083,11 +12083,11 @@
         </c:dLbls>
         <c:gapWidth val="50"/>
         <c:overlap val="-27"/>
-        <c:axId val="231476400"/>
-        <c:axId val="231476960"/>
+        <c:axId val="248377520"/>
+        <c:axId val="248378080"/>
       </c:barChart>
       <c:catAx>
-        <c:axId val="231476400"/>
+        <c:axId val="248377520"/>
         <c:scaling>
           <c:orientation val="minMax"/>
         </c:scaling>
@@ -12130,7 +12130,7 @@
             <a:endParaRPr lang="de-DE"/>
           </a:p>
         </c:txPr>
-        <c:crossAx val="231476960"/>
+        <c:crossAx val="248378080"/>
         <c:crosses val="autoZero"/>
         <c:auto val="1"/>
         <c:lblAlgn val="ctr"/>
@@ -12138,7 +12138,7 @@
         <c:noMultiLvlLbl val="0"/>
       </c:catAx>
       <c:valAx>
-        <c:axId val="231476960"/>
+        <c:axId val="248378080"/>
         <c:scaling>
           <c:orientation val="minMax"/>
         </c:scaling>
@@ -12175,7 +12175,7 @@
             <a:endParaRPr lang="de-DE"/>
           </a:p>
         </c:txPr>
-        <c:crossAx val="231476400"/>
+        <c:crossAx val="248377520"/>
         <c:crosses val="autoZero"/>
         <c:crossBetween val="between"/>
       </c:valAx>
@@ -12426,11 +12426,11 @@
         </c:dLbls>
         <c:gapWidth val="50"/>
         <c:overlap val="-27"/>
-        <c:axId val="231479200"/>
-        <c:axId val="231479760"/>
+        <c:axId val="248382560"/>
+        <c:axId val="248383120"/>
       </c:barChart>
       <c:catAx>
-        <c:axId val="231479200"/>
+        <c:axId val="248382560"/>
         <c:scaling>
           <c:orientation val="minMax"/>
         </c:scaling>
@@ -12473,7 +12473,7 @@
             <a:endParaRPr lang="de-DE"/>
           </a:p>
         </c:txPr>
-        <c:crossAx val="231479760"/>
+        <c:crossAx val="248383120"/>
         <c:crosses val="autoZero"/>
         <c:auto val="1"/>
         <c:lblAlgn val="ctr"/>
@@ -12481,7 +12481,7 @@
         <c:noMultiLvlLbl val="0"/>
       </c:catAx>
       <c:valAx>
-        <c:axId val="231479760"/>
+        <c:axId val="248383120"/>
         <c:scaling>
           <c:orientation val="minMax"/>
         </c:scaling>
@@ -12518,7 +12518,7 @@
             <a:endParaRPr lang="de-DE"/>
           </a:p>
         </c:txPr>
-        <c:crossAx val="231479200"/>
+        <c:crossAx val="248382560"/>
         <c:crosses val="autoZero"/>
         <c:crossBetween val="between"/>
       </c:valAx>
@@ -12773,11 +12773,11 @@
         </c:dLbls>
         <c:gapWidth val="50"/>
         <c:overlap val="-27"/>
-        <c:axId val="231482000"/>
-        <c:axId val="231482560"/>
+        <c:axId val="248385360"/>
+        <c:axId val="248385920"/>
       </c:barChart>
       <c:catAx>
-        <c:axId val="231482000"/>
+        <c:axId val="248385360"/>
         <c:scaling>
           <c:orientation val="minMax"/>
         </c:scaling>
@@ -12820,7 +12820,7 @@
             <a:endParaRPr lang="de-DE"/>
           </a:p>
         </c:txPr>
-        <c:crossAx val="231482560"/>
+        <c:crossAx val="248385920"/>
         <c:crosses val="autoZero"/>
         <c:auto val="1"/>
         <c:lblAlgn val="ctr"/>
@@ -12828,7 +12828,7 @@
         <c:noMultiLvlLbl val="0"/>
       </c:catAx>
       <c:valAx>
-        <c:axId val="231482560"/>
+        <c:axId val="248385920"/>
         <c:scaling>
           <c:orientation val="minMax"/>
         </c:scaling>
@@ -12865,7 +12865,7 @@
             <a:endParaRPr lang="de-DE"/>
           </a:p>
         </c:txPr>
-        <c:crossAx val="231482000"/>
+        <c:crossAx val="248385360"/>
         <c:crosses val="autoZero"/>
         <c:crossBetween val="between"/>
       </c:valAx>
@@ -33090,7 +33090,7 @@
           <a:p>
             <a:fld id="{2F9ACA95-1F7E-40AB-98C2-525508467FA4}" type="datetimeFigureOut">
               <a:rPr lang="de-DE" smtClean="0"/>
-              <a:t>30.11.2016</a:t>
+              <a:t>01.12.2016</a:t>
             </a:fld>
             <a:endParaRPr lang="de-DE"/>
           </a:p>
@@ -33771,7 +33771,7 @@
           <a:p>
             <a:fld id="{FFB9B448-9D56-4847-9449-FEA23C208484}" type="datetime1">
               <a:rPr lang="de-DE" smtClean="0"/>
-              <a:t>30.11.2016</a:t>
+              <a:t>01.12.2016</a:t>
             </a:fld>
             <a:endParaRPr lang="de-DE"/>
           </a:p>
@@ -34056,7 +34056,7 @@
           <a:p>
             <a:fld id="{D5101F55-84DD-4CC8-9DC5-A961225D8AD0}" type="datetime1">
               <a:rPr lang="de-DE" smtClean="0"/>
-              <a:t>30.11.2016</a:t>
+              <a:t>01.12.2016</a:t>
             </a:fld>
             <a:endParaRPr lang="de-DE"/>
           </a:p>
@@ -34250,7 +34250,7 @@
           <a:p>
             <a:fld id="{1DF941D6-187C-4382-AA25-C433F49CFDE9}" type="datetime1">
               <a:rPr lang="de-DE" smtClean="0"/>
-              <a:t>30.11.2016</a:t>
+              <a:t>01.12.2016</a:t>
             </a:fld>
             <a:endParaRPr lang="de-DE"/>
           </a:p>
@@ -34523,7 +34523,7 @@
           <a:p>
             <a:fld id="{D7C252ED-C230-4A26-B3C4-0B552D630415}" type="datetime1">
               <a:rPr lang="de-DE" smtClean="0"/>
-              <a:t>30.11.2016</a:t>
+              <a:t>01.12.2016</a:t>
             </a:fld>
             <a:endParaRPr lang="de-DE"/>
           </a:p>
@@ -34864,7 +34864,7 @@
           <a:p>
             <a:fld id="{66EDD134-AFB6-44CF-BF5E-9AA63954F15F}" type="datetime1">
               <a:rPr lang="de-DE" smtClean="0"/>
-              <a:t>30.11.2016</a:t>
+              <a:t>01.12.2016</a:t>
             </a:fld>
             <a:endParaRPr lang="de-DE"/>
           </a:p>
@@ -35487,7 +35487,7 @@
           <a:p>
             <a:fld id="{15B35619-9EBD-4CE2-B9AB-29B9A9708D56}" type="datetime1">
               <a:rPr lang="de-DE" smtClean="0"/>
-              <a:t>30.11.2016</a:t>
+              <a:t>01.12.2016</a:t>
             </a:fld>
             <a:endParaRPr lang="de-DE"/>
           </a:p>
@@ -36347,7 +36347,7 @@
           <a:p>
             <a:fld id="{F779AAE1-DA64-4553-8450-F76990E95D17}" type="datetime1">
               <a:rPr lang="de-DE" smtClean="0"/>
-              <a:t>30.11.2016</a:t>
+              <a:t>01.12.2016</a:t>
             </a:fld>
             <a:endParaRPr lang="de-DE"/>
           </a:p>
@@ -36517,7 +36517,7 @@
           <a:p>
             <a:fld id="{C070D5ED-9C58-444B-A9F3-09364A72AAA6}" type="datetime1">
               <a:rPr lang="de-DE" smtClean="0"/>
-              <a:t>30.11.2016</a:t>
+              <a:t>01.12.2016</a:t>
             </a:fld>
             <a:endParaRPr lang="de-DE"/>
           </a:p>
@@ -36697,7 +36697,7 @@
           <a:p>
             <a:fld id="{9CC4B844-5603-498E-8854-01FDF44E05A3}" type="datetime1">
               <a:rPr lang="de-DE" smtClean="0"/>
-              <a:t>30.11.2016</a:t>
+              <a:t>01.12.2016</a:t>
             </a:fld>
             <a:endParaRPr lang="de-DE"/>
           </a:p>
@@ -36914,7 +36914,7 @@
           <a:p>
             <a:fld id="{62A8A28E-B5F5-41EE-B009-8D872471EF33}" type="datetime1">
               <a:rPr lang="de-DE" smtClean="0"/>
-              <a:t>30.11.2016</a:t>
+              <a:t>01.12.2016</a:t>
             </a:fld>
             <a:endParaRPr lang="de-DE"/>
           </a:p>
@@ -37207,7 +37207,7 @@
           <a:p>
             <a:fld id="{C668A2FC-1D94-4AFD-B13A-264307E66F0E}" type="datetime1">
               <a:rPr lang="de-DE" smtClean="0"/>
-              <a:t>30.11.2016</a:t>
+              <a:t>01.12.2016</a:t>
             </a:fld>
             <a:endParaRPr lang="de-DE"/>
           </a:p>
@@ -37499,7 +37499,7 @@
           <a:p>
             <a:fld id="{2392C0AE-0F7D-4F53-A2FC-117257E6363C}" type="datetime1">
               <a:rPr lang="de-DE" smtClean="0"/>
-              <a:t>30.11.2016</a:t>
+              <a:t>01.12.2016</a:t>
             </a:fld>
             <a:endParaRPr lang="de-DE"/>
           </a:p>
@@ -37943,7 +37943,7 @@
           <a:p>
             <a:fld id="{024A5A3D-FE15-4E66-B8EF-993BEB944775}" type="datetime1">
               <a:rPr lang="de-DE" smtClean="0"/>
-              <a:t>30.11.2016</a:t>
+              <a:t>01.12.2016</a:t>
             </a:fld>
             <a:endParaRPr lang="de-DE"/>
           </a:p>
@@ -38061,7 +38061,7 @@
           <a:p>
             <a:fld id="{00286FA3-E64C-4EE7-A4EB-8F83E8E9A7CE}" type="datetime1">
               <a:rPr lang="de-DE" smtClean="0"/>
-              <a:t>30.11.2016</a:t>
+              <a:t>01.12.2016</a:t>
             </a:fld>
             <a:endParaRPr lang="de-DE"/>
           </a:p>
@@ -38156,7 +38156,7 @@
           <a:p>
             <a:fld id="{0815E655-9175-41F2-86F9-456F81B03D6B}" type="datetime1">
               <a:rPr lang="de-DE" smtClean="0"/>
-              <a:t>30.11.2016</a:t>
+              <a:t>01.12.2016</a:t>
             </a:fld>
             <a:endParaRPr lang="de-DE"/>
           </a:p>
@@ -38435,7 +38435,7 @@
           <a:p>
             <a:fld id="{6109BDD6-B3C4-4BA6-9B0A-C065E0514132}" type="datetime1">
               <a:rPr lang="de-DE" smtClean="0"/>
-              <a:t>30.11.2016</a:t>
+              <a:t>01.12.2016</a:t>
             </a:fld>
             <a:endParaRPr lang="de-DE"/>
           </a:p>
@@ -38710,7 +38710,7 @@
           <a:p>
             <a:fld id="{1350D439-E1FF-4A10-8D0F-32AF8651CAFC}" type="datetime1">
               <a:rPr lang="de-DE" smtClean="0"/>
-              <a:t>30.11.2016</a:t>
+              <a:t>01.12.2016</a:t>
             </a:fld>
             <a:endParaRPr lang="de-DE"/>
           </a:p>
@@ -39139,7 +39139,7 @@
           <a:p>
             <a:fld id="{3B8CB95F-FF94-40FD-9011-74B5D39A5779}" type="datetime1">
               <a:rPr lang="de-DE" smtClean="0"/>
-              <a:t>30.11.2016</a:t>
+              <a:t>01.12.2016</a:t>
             </a:fld>
             <a:endParaRPr lang="de-DE"/>
           </a:p>
@@ -39733,7 +39733,7 @@
           <a:p>
             <a:fld id="{BCC8CF4D-1F15-45F0-B9F6-88473EBEFC5A}" type="datetime1">
               <a:rPr lang="de-DE" smtClean="0"/>
-              <a:t>30.11.2016</a:t>
+              <a:t>01.12.2016</a:t>
             </a:fld>
             <a:endParaRPr lang="de-DE"/>
           </a:p>
@@ -39881,11 +39881,7 @@
           <a:p>
             <a:r>
               <a:rPr lang="de-DE" dirty="0" smtClean="0"/>
-              <a:t>Aufgabe </a:t>
-            </a:r>
-            <a:r>
-              <a:rPr lang="de-DE" dirty="0" smtClean="0"/>
-              <a:t>1e – Heuristiken</a:t>
+              <a:t>Aufgabe 1e – Heuristiken</a:t>
             </a:r>
             <a:endParaRPr lang="de-DE" dirty="0"/>
           </a:p>
@@ -39908,7 +39904,7 @@
           <a:p>
             <a:fld id="{62A8A28E-B5F5-41EE-B009-8D872471EF33}" type="datetime1">
               <a:rPr lang="de-DE" smtClean="0"/>
-              <a:t>30.11.2016</a:t>
+              <a:t>01.12.2016</a:t>
             </a:fld>
             <a:endParaRPr lang="de-DE"/>
           </a:p>
@@ -40039,7 +40035,6 @@
               <a:rPr lang="de-DE" sz="2800" dirty="0" smtClean="0"/>
               <a:t>: siehe Folie 7</a:t>
             </a:r>
-            <a:endParaRPr lang="de-DE" sz="2800" dirty="0" smtClean="0"/>
           </a:p>
           <a:p>
             <a:r>
@@ -40169,7 +40164,7 @@
           <a:p>
             <a:fld id="{62A8A28E-B5F5-41EE-B009-8D872471EF33}" type="datetime1">
               <a:rPr lang="de-DE" smtClean="0"/>
-              <a:t>30.11.2016</a:t>
+              <a:t>01.12.2016</a:t>
             </a:fld>
             <a:endParaRPr lang="de-DE"/>
           </a:p>
@@ -40444,7 +40439,7 @@
           <a:p>
             <a:fld id="{62A8A28E-B5F5-41EE-B009-8D872471EF33}" type="datetime1">
               <a:rPr lang="de-DE" smtClean="0"/>
-              <a:t>30.11.2016</a:t>
+              <a:t>01.12.2016</a:t>
             </a:fld>
             <a:endParaRPr lang="de-DE"/>
           </a:p>
@@ -40719,7 +40714,7 @@
           <a:p>
             <a:fld id="{62A8A28E-B5F5-41EE-B009-8D872471EF33}" type="datetime1">
               <a:rPr lang="de-DE" smtClean="0"/>
-              <a:t>30.11.2016</a:t>
+              <a:t>01.12.2016</a:t>
             </a:fld>
             <a:endParaRPr lang="de-DE"/>
           </a:p>
@@ -40994,7 +40989,7 @@
           <a:p>
             <a:fld id="{62A8A28E-B5F5-41EE-B009-8D872471EF33}" type="datetime1">
               <a:rPr lang="de-DE" smtClean="0"/>
-              <a:t>30.11.2016</a:t>
+              <a:t>01.12.2016</a:t>
             </a:fld>
             <a:endParaRPr lang="de-DE"/>
           </a:p>
@@ -41269,7 +41264,7 @@
           <a:p>
             <a:fld id="{62A8A28E-B5F5-41EE-B009-8D872471EF33}" type="datetime1">
               <a:rPr lang="de-DE" smtClean="0"/>
-              <a:t>30.11.2016</a:t>
+              <a:t>01.12.2016</a:t>
             </a:fld>
             <a:endParaRPr lang="de-DE"/>
           </a:p>
@@ -41604,7 +41599,7 @@
           <a:p>
             <a:fld id="{62A8A28E-B5F5-41EE-B009-8D872471EF33}" type="datetime1">
               <a:rPr lang="de-DE" smtClean="0"/>
-              <a:t>30.11.2016</a:t>
+              <a:t>01.12.2016</a:t>
             </a:fld>
             <a:endParaRPr lang="de-DE"/>
           </a:p>
@@ -41940,17 +41935,8 @@
             </a:pPr>
             <a:r>
               <a:rPr lang="de-DE" sz="1600" dirty="0" smtClean="0"/>
-              <a:t>Minimax </a:t>
-            </a:r>
-            <a:r>
-              <a:rPr lang="de-DE" sz="1600" dirty="0" smtClean="0"/>
-              <a:t>bzw. </a:t>
-            </a:r>
-            <a:r>
-              <a:rPr lang="de-DE" sz="1600" dirty="0" smtClean="0"/>
-              <a:t>Alpha-Beta Algorithmus:</a:t>
-            </a:r>
-            <a:endParaRPr lang="de-DE" sz="1600" dirty="0" smtClean="0"/>
+              <a:t>Minimax bzw. Alpha-Beta Algorithmus:</a:t>
+            </a:r>
           </a:p>
           <a:p>
             <a:pPr marL="0" indent="0">
@@ -41980,7 +41966,7 @@
           <a:p>
             <a:fld id="{62A8A28E-B5F5-41EE-B009-8D872471EF33}" type="datetime1">
               <a:rPr lang="de-DE" smtClean="0"/>
-              <a:t>30.11.2016</a:t>
+              <a:t>01.12.2016</a:t>
             </a:fld>
             <a:endParaRPr lang="de-DE"/>
           </a:p>
@@ -42133,7 +42119,7 @@
           <a:p>
             <a:fld id="{62A8A28E-B5F5-41EE-B009-8D872471EF33}" type="datetime1">
               <a:rPr lang="de-DE" smtClean="0"/>
-              <a:t>30.11.2016</a:t>
+              <a:t>01.12.2016</a:t>
             </a:fld>
             <a:endParaRPr lang="de-DE"/>
           </a:p>
@@ -42286,11 +42272,7 @@
           <a:p>
             <a:r>
               <a:rPr lang="de-DE" dirty="0" smtClean="0"/>
-              <a:t>Aufgabe </a:t>
-            </a:r>
-            <a:r>
-              <a:rPr lang="de-DE" dirty="0" smtClean="0"/>
-              <a:t>1a – zufälliger Agent</a:t>
+              <a:t>Aufgabe 1a – zufälliger Agent</a:t>
             </a:r>
             <a:endParaRPr lang="de-DE" dirty="0"/>
           </a:p>
@@ -42313,7 +42295,7 @@
           <a:p>
             <a:fld id="{62A8A28E-B5F5-41EE-B009-8D872471EF33}" type="datetime1">
               <a:rPr lang="de-DE" smtClean="0"/>
-              <a:t>30.11.2016</a:t>
+              <a:t>01.12.2016</a:t>
             </a:fld>
             <a:endParaRPr lang="de-DE"/>
           </a:p>
@@ -43255,11 +43237,7 @@
             </a:r>
             <a:r>
               <a:rPr lang="en-US" sz="2800" dirty="0" smtClean="0"/>
-              <a:t> </a:t>
-            </a:r>
-            <a:r>
-              <a:rPr lang="en-US" sz="2800" dirty="0" smtClean="0"/>
-              <a:t>“</a:t>
+              <a:t> “</a:t>
             </a:r>
             <a:r>
               <a:rPr lang="en-US" sz="2800" dirty="0" err="1" smtClean="0"/>
@@ -43285,11 +43263,7 @@
             </a:r>
             <a:r>
               <a:rPr lang="en-US" sz="2800" dirty="0" smtClean="0"/>
-              <a:t> </a:t>
-            </a:r>
-            <a:r>
-              <a:rPr lang="en-US" sz="2800" dirty="0" smtClean="0"/>
-              <a:t>“</a:t>
+              <a:t> “</a:t>
             </a:r>
             <a:r>
               <a:rPr lang="en-US" sz="2800" dirty="0" err="1" smtClean="0"/>
@@ -43393,7 +43367,7 @@
           <a:p>
             <a:fld id="{62A8A28E-B5F5-41EE-B009-8D872471EF33}" type="datetime1">
               <a:rPr lang="de-DE" smtClean="0"/>
-              <a:t>30.11.2016</a:t>
+              <a:t>01.12.2016</a:t>
             </a:fld>
             <a:endParaRPr lang="de-DE"/>
           </a:p>
@@ -43559,7 +43533,7 @@
           <a:p>
             <a:fld id="{62A8A28E-B5F5-41EE-B009-8D872471EF33}" type="datetime1">
               <a:rPr lang="de-DE" smtClean="0"/>
-              <a:t>30.11.2016</a:t>
+              <a:t>01.12.2016</a:t>
             </a:fld>
             <a:endParaRPr lang="de-DE"/>
           </a:p>
@@ -44838,7 +44812,7 @@
           <a:p>
             <a:fld id="{62A8A28E-B5F5-41EE-B009-8D872471EF33}" type="datetime1">
               <a:rPr lang="de-DE" smtClean="0"/>
-              <a:t>30.11.2016</a:t>
+              <a:t>01.12.2016</a:t>
             </a:fld>
             <a:endParaRPr lang="de-DE"/>
           </a:p>
@@ -45819,11 +45793,11 @@
   <p:clrMapOvr>
     <a:masterClrMapping/>
   </p:clrMapOvr>
-  <mc:AlternateContent xmlns:mc="http://schemas.openxmlformats.org/markup-compatibility/2006">
-    <mc:Choice xmlns:p14="http://schemas.microsoft.com/office/powerpoint/2010/main" Requires="p14">
+  <mc:AlternateContent xmlns:mc="http://schemas.openxmlformats.org/markup-compatibility/2006" xmlns:p14="http://schemas.microsoft.com/office/powerpoint/2010/main">
+    <mc:Choice Requires="p14">
       <p:transition spd="slow" p14:dur="2000"/>
     </mc:Choice>
-    <mc:Fallback>
+    <mc:Fallback xmlns="">
       <p:transition spd="slow"/>
     </mc:Fallback>
   </mc:AlternateContent>
@@ -45871,11 +45845,7 @@
           <a:p>
             <a:r>
               <a:rPr lang="de-DE" dirty="0" smtClean="0"/>
-              <a:t>Aufgabe </a:t>
-            </a:r>
-            <a:r>
-              <a:rPr lang="de-DE" dirty="0" smtClean="0"/>
-              <a:t>1c – Minimax</a:t>
+              <a:t>Aufgabe 1c – Minimax</a:t>
             </a:r>
             <a:endParaRPr lang="de-DE" dirty="0"/>
           </a:p>
@@ -45898,7 +45868,7 @@
           <a:p>
             <a:fld id="{62A8A28E-B5F5-41EE-B009-8D872471EF33}" type="datetime1">
               <a:rPr lang="de-DE" smtClean="0"/>
-              <a:t>30.11.2016</a:t>
+              <a:t>01.12.2016</a:t>
             </a:fld>
             <a:endParaRPr lang="de-DE"/>
           </a:p>
@@ -47093,7 +47063,7 @@
           <a:p>
             <a:fld id="{62A8A28E-B5F5-41EE-B009-8D872471EF33}" type="datetime1">
               <a:rPr lang="de-DE" smtClean="0"/>
-              <a:t>30.11.2016</a:t>
+              <a:t>01.12.2016</a:t>
             </a:fld>
             <a:endParaRPr lang="de-DE"/>
           </a:p>
@@ -47200,7 +47170,7 @@
         </p:spPr>
         <p:txBody>
           <a:bodyPr>
-            <a:normAutofit/>
+            <a:normAutofit lnSpcReduction="10000"/>
           </a:bodyPr>
           <a:lstStyle/>
           <a:p>
@@ -47208,7 +47178,7 @@
               <a:buNone/>
             </a:pPr>
             <a:r>
-              <a:rPr lang="de-DE" sz="2800" dirty="0" smtClean="0">
+              <a:rPr lang="de-DE" sz="2800" dirty="0">
                 <a:solidFill>
                   <a:srgbClr val="FFFF00"/>
                 </a:solidFill>
@@ -47216,251 +47186,261 @@
               <a:t>Score</a:t>
             </a:r>
             <a:r>
+              <a:rPr lang="de-DE" sz="2800" dirty="0"/>
+              <a:t> Berechnung </a:t>
+            </a:r>
+            <a:r>
               <a:rPr lang="de-DE" sz="2800" dirty="0" smtClean="0"/>
-              <a:t> </a:t>
-            </a:r>
-            <a:r>
-              <a:rPr lang="de-DE" sz="2800" dirty="0" smtClean="0"/>
-              <a:t>Berechnung (Heuristisch):</a:t>
-            </a:r>
-            <a:endParaRPr lang="de-DE" sz="2800" dirty="0" smtClean="0"/>
+              <a:t>(Einfach):</a:t>
+            </a:r>
+            <a:endParaRPr lang="de-DE" sz="2800" dirty="0"/>
           </a:p>
           <a:p>
             <a:r>
-              <a:rPr lang="en-US" sz="2800" dirty="0" smtClean="0"/>
-              <a:t>+</a:t>
-            </a:r>
-            <a:r>
-              <a:rPr lang="en-US" sz="2800" dirty="0"/>
-              <a:t>100 </a:t>
-            </a:r>
-            <a:r>
-              <a:rPr lang="en-US" sz="2800" dirty="0" err="1" smtClean="0"/>
-              <a:t>für</a:t>
-            </a:r>
-            <a:r>
-              <a:rPr lang="en-US" sz="2800" dirty="0" smtClean="0"/>
-              <a:t> </a:t>
-            </a:r>
-            <a:r>
-              <a:rPr lang="en-US" sz="2800" dirty="0" smtClean="0"/>
-              <a:t>3 in </a:t>
-            </a:r>
-            <a:r>
-              <a:rPr lang="en-US" sz="2800" dirty="0" err="1" smtClean="0"/>
-              <a:t>einer</a:t>
-            </a:r>
-            <a:r>
-              <a:rPr lang="en-US" sz="2800" dirty="0" smtClean="0"/>
-              <a:t> </a:t>
-            </a:r>
-            <a:r>
-              <a:rPr lang="en-US" sz="2800" dirty="0" err="1" smtClean="0"/>
-              <a:t>Reihe</a:t>
-            </a:r>
-            <a:r>
-              <a:rPr lang="en-US" sz="2800" dirty="0" smtClean="0"/>
-              <a:t> = </a:t>
-            </a:r>
-            <a:r>
-              <a:rPr lang="en-US" sz="2800" dirty="0" err="1" smtClean="0"/>
-              <a:t>Sieg</a:t>
-            </a:r>
-            <a:endParaRPr lang="en-US" sz="2800" dirty="0" smtClean="0"/>
+              <a:rPr lang="de-DE" sz="2800" dirty="0"/>
+              <a:t>+1 für Sieg , -1 für Niederlage, Sonst </a:t>
+            </a:r>
+            <a:r>
+              <a:rPr lang="de-DE" sz="2800" dirty="0" smtClean="0"/>
+              <a:t>0</a:t>
+            </a:r>
           </a:p>
           <a:p>
-            <a:r>
-              <a:rPr lang="en-US" sz="2800" dirty="0" smtClean="0"/>
-              <a:t>+</a:t>
-            </a:r>
-            <a:r>
-              <a:rPr lang="en-US" sz="2800" dirty="0"/>
-              <a:t>10 </a:t>
-            </a:r>
-            <a:r>
-              <a:rPr lang="en-US" sz="2800" dirty="0" err="1"/>
-              <a:t>für</a:t>
-            </a:r>
-            <a:r>
-              <a:rPr lang="en-US" sz="2800" dirty="0"/>
-              <a:t> </a:t>
-            </a:r>
-            <a:r>
-              <a:rPr lang="en-US" sz="2800" dirty="0" smtClean="0"/>
-              <a:t>2 </a:t>
-            </a:r>
-            <a:r>
-              <a:rPr lang="en-US" sz="2800" dirty="0"/>
-              <a:t>in </a:t>
-            </a:r>
-            <a:r>
-              <a:rPr lang="en-US" sz="2800" dirty="0" err="1"/>
-              <a:t>einer</a:t>
-            </a:r>
-            <a:r>
-              <a:rPr lang="en-US" sz="2800" dirty="0"/>
-              <a:t> </a:t>
-            </a:r>
-            <a:r>
-              <a:rPr lang="en-US" sz="2800" dirty="0" err="1" smtClean="0"/>
-              <a:t>Reihe</a:t>
-            </a:r>
-            <a:r>
-              <a:rPr lang="en-US" sz="2800" dirty="0" smtClean="0"/>
-              <a:t> (</a:t>
-            </a:r>
-            <a:r>
-              <a:rPr lang="en-US" sz="2800" dirty="0" err="1" smtClean="0"/>
-              <a:t>ein</a:t>
-            </a:r>
-            <a:r>
-              <a:rPr lang="en-US" sz="2800" dirty="0" smtClean="0"/>
-              <a:t> </a:t>
-            </a:r>
-            <a:r>
-              <a:rPr lang="en-US" sz="2800" dirty="0" err="1" smtClean="0"/>
-              <a:t>leeres</a:t>
-            </a:r>
-            <a:r>
-              <a:rPr lang="en-US" sz="2800" dirty="0" smtClean="0"/>
-              <a:t> Feld)</a:t>
-            </a:r>
-            <a:endParaRPr lang="en-US" sz="2800" dirty="0"/>
-          </a:p>
-          <a:p>
-            <a:r>
-              <a:rPr lang="en-US" sz="2800" dirty="0"/>
-              <a:t>+1 </a:t>
-            </a:r>
-            <a:r>
-              <a:rPr lang="en-US" sz="2800" dirty="0" err="1"/>
-              <a:t>für</a:t>
-            </a:r>
-            <a:r>
-              <a:rPr lang="en-US" sz="2800" dirty="0"/>
-              <a:t> </a:t>
-            </a:r>
-            <a:r>
-              <a:rPr lang="en-US" sz="2800" dirty="0" smtClean="0"/>
-              <a:t>1 in </a:t>
-            </a:r>
-            <a:r>
-              <a:rPr lang="en-US" sz="2800" dirty="0" err="1"/>
-              <a:t>einer</a:t>
-            </a:r>
-            <a:r>
-              <a:rPr lang="en-US" sz="2800" dirty="0"/>
-              <a:t> </a:t>
-            </a:r>
-            <a:r>
-              <a:rPr lang="en-US" sz="2800" dirty="0" err="1" smtClean="0"/>
-              <a:t>Reihe</a:t>
-            </a:r>
-            <a:r>
-              <a:rPr lang="en-US" sz="2800" dirty="0" smtClean="0"/>
-              <a:t> (</a:t>
-            </a:r>
-            <a:r>
-              <a:rPr lang="en-US" sz="2800" dirty="0" err="1" smtClean="0"/>
-              <a:t>zwei</a:t>
-            </a:r>
-            <a:r>
-              <a:rPr lang="en-US" sz="2800" dirty="0" smtClean="0"/>
-              <a:t> </a:t>
-            </a:r>
-            <a:r>
-              <a:rPr lang="en-US" sz="2800" dirty="0" err="1" smtClean="0"/>
-              <a:t>leere</a:t>
-            </a:r>
-            <a:r>
-              <a:rPr lang="en-US" sz="2800" dirty="0" smtClean="0"/>
-              <a:t> Felder)</a:t>
-            </a:r>
-          </a:p>
-          <a:p>
-            <a:r>
-              <a:rPr lang="en-US" sz="2800" dirty="0" err="1" smtClean="0"/>
-              <a:t>Sonst</a:t>
-            </a:r>
-            <a:r>
-              <a:rPr lang="en-US" sz="2800" dirty="0" smtClean="0"/>
-              <a:t> 0 (</a:t>
-            </a:r>
-            <a:r>
-              <a:rPr lang="en-US" sz="2800" dirty="0" err="1" smtClean="0"/>
-              <a:t>leere</a:t>
-            </a:r>
-            <a:r>
-              <a:rPr lang="en-US" sz="2800" dirty="0" smtClean="0"/>
-              <a:t> </a:t>
-            </a:r>
-            <a:r>
-              <a:rPr lang="en-US" sz="2800" dirty="0" err="1" smtClean="0"/>
-              <a:t>oder</a:t>
-            </a:r>
-            <a:r>
-              <a:rPr lang="en-US" sz="2800" dirty="0" smtClean="0"/>
-              <a:t> </a:t>
-            </a:r>
-            <a:r>
-              <a:rPr lang="en-US" sz="2800" dirty="0" err="1" smtClean="0"/>
-              <a:t>nicht</a:t>
-            </a:r>
-            <a:r>
-              <a:rPr lang="en-US" sz="2800" dirty="0" smtClean="0"/>
-              <a:t> </a:t>
-            </a:r>
-            <a:r>
-              <a:rPr lang="en-US" sz="2800" dirty="0" err="1" smtClean="0"/>
-              <a:t>gewinnbare</a:t>
-            </a:r>
-            <a:r>
-              <a:rPr lang="en-US" sz="2800" dirty="0" smtClean="0"/>
-              <a:t> </a:t>
-            </a:r>
-            <a:r>
-              <a:rPr lang="en-US" sz="2800" dirty="0" err="1" smtClean="0"/>
-              <a:t>Reihe</a:t>
-            </a:r>
-            <a:r>
-              <a:rPr lang="en-US" sz="2800" dirty="0" smtClean="0"/>
-              <a:t>)</a:t>
-            </a:r>
-            <a:endParaRPr lang="en-US" sz="2800" dirty="0"/>
-          </a:p>
-          <a:p>
-            <a:r>
-              <a:rPr lang="de-DE" sz="2800" dirty="0" smtClean="0"/>
-              <a:t>Negative </a:t>
-            </a:r>
-            <a:r>
-              <a:rPr lang="de-DE" sz="2800" dirty="0" err="1" smtClean="0"/>
-              <a:t>Scores</a:t>
-            </a:r>
-            <a:r>
-              <a:rPr lang="de-DE" sz="2800" dirty="0" smtClean="0"/>
-              <a:t> für </a:t>
-            </a:r>
-            <a:r>
-              <a:rPr lang="de-DE" sz="2800" dirty="0" smtClean="0"/>
-              <a:t>Gegner</a:t>
-            </a:r>
+            <a:endParaRPr lang="de-DE" sz="2800" dirty="0"/>
           </a:p>
           <a:p>
             <a:pPr marL="0" indent="0">
               <a:buNone/>
             </a:pPr>
             <a:r>
+              <a:rPr lang="de-DE" sz="2800" dirty="0" smtClean="0">
+                <a:solidFill>
+                  <a:srgbClr val="FFFF00"/>
+                </a:solidFill>
+              </a:rPr>
+              <a:t>Score</a:t>
+            </a:r>
+            <a:r>
               <a:rPr lang="de-DE" sz="2800" dirty="0" smtClean="0"/>
-              <a:t>Einfach:</a:t>
+              <a:t> </a:t>
+            </a:r>
+            <a:r>
+              <a:rPr lang="de-DE" sz="2800" dirty="0" smtClean="0"/>
+              <a:t>Berechnung (Heuristisch):</a:t>
             </a:r>
           </a:p>
           <a:p>
             <a:r>
+              <a:rPr lang="en-US" sz="2800" dirty="0" smtClean="0"/>
+              <a:t>+</a:t>
+            </a:r>
+            <a:r>
+              <a:rPr lang="en-US" sz="2800" dirty="0"/>
+              <a:t>100 </a:t>
+            </a:r>
+            <a:r>
+              <a:rPr lang="en-US" sz="2800" dirty="0" err="1" smtClean="0"/>
+              <a:t>für</a:t>
+            </a:r>
+            <a:r>
+              <a:rPr lang="en-US" sz="2800" dirty="0" smtClean="0"/>
+              <a:t> 3 in </a:t>
+            </a:r>
+            <a:r>
+              <a:rPr lang="en-US" sz="2800" dirty="0" err="1" smtClean="0"/>
+              <a:t>einer</a:t>
+            </a:r>
+            <a:r>
+              <a:rPr lang="en-US" sz="2800" dirty="0" smtClean="0"/>
+              <a:t> </a:t>
+            </a:r>
+            <a:r>
+              <a:rPr lang="en-US" sz="2800" dirty="0" err="1" smtClean="0"/>
+              <a:t>Reihe</a:t>
+            </a:r>
+            <a:r>
+              <a:rPr lang="en-US" sz="2800" dirty="0" smtClean="0"/>
+              <a:t> = </a:t>
+            </a:r>
+            <a:r>
+              <a:rPr lang="en-US" sz="2800" dirty="0" err="1" smtClean="0"/>
+              <a:t>Sieg</a:t>
+            </a:r>
+            <a:endParaRPr lang="en-US" sz="2800" dirty="0" smtClean="0"/>
+          </a:p>
+          <a:p>
+            <a:r>
+              <a:rPr lang="en-US" sz="2800" dirty="0" smtClean="0"/>
+              <a:t>+</a:t>
+            </a:r>
+            <a:r>
+              <a:rPr lang="en-US" sz="2800" dirty="0"/>
+              <a:t>10 </a:t>
+            </a:r>
+            <a:r>
+              <a:rPr lang="en-US" sz="2800" dirty="0" err="1"/>
+              <a:t>für</a:t>
+            </a:r>
+            <a:r>
+              <a:rPr lang="en-US" sz="2800" dirty="0"/>
+              <a:t> </a:t>
+            </a:r>
+            <a:r>
+              <a:rPr lang="en-US" sz="2800" dirty="0" smtClean="0"/>
+              <a:t>2 </a:t>
+            </a:r>
+            <a:r>
+              <a:rPr lang="en-US" sz="2800" dirty="0"/>
+              <a:t>in </a:t>
+            </a:r>
+            <a:r>
+              <a:rPr lang="en-US" sz="2800" dirty="0" err="1"/>
+              <a:t>einer</a:t>
+            </a:r>
+            <a:r>
+              <a:rPr lang="en-US" sz="2800" dirty="0"/>
+              <a:t> </a:t>
+            </a:r>
+            <a:r>
+              <a:rPr lang="en-US" sz="2800" dirty="0" err="1" smtClean="0"/>
+              <a:t>Reihe</a:t>
+            </a:r>
+            <a:r>
+              <a:rPr lang="en-US" sz="2800" dirty="0" smtClean="0"/>
+              <a:t> (</a:t>
+            </a:r>
+            <a:r>
+              <a:rPr lang="en-US" sz="2800" dirty="0" err="1" smtClean="0"/>
+              <a:t>ein</a:t>
+            </a:r>
+            <a:r>
+              <a:rPr lang="en-US" sz="2800" dirty="0" smtClean="0"/>
+              <a:t> </a:t>
+            </a:r>
+            <a:r>
+              <a:rPr lang="en-US" sz="2800" dirty="0" err="1" smtClean="0"/>
+              <a:t>leeres</a:t>
+            </a:r>
+            <a:r>
+              <a:rPr lang="en-US" sz="2800" dirty="0" smtClean="0"/>
+              <a:t> Feld)</a:t>
+            </a:r>
+            <a:endParaRPr lang="en-US" sz="2800" dirty="0"/>
+          </a:p>
+          <a:p>
+            <a:r>
+              <a:rPr lang="en-US" sz="2800" dirty="0"/>
+              <a:t>+1 </a:t>
+            </a:r>
+            <a:r>
+              <a:rPr lang="en-US" sz="2800" dirty="0" err="1"/>
+              <a:t>für</a:t>
+            </a:r>
+            <a:r>
+              <a:rPr lang="en-US" sz="2800" dirty="0"/>
+              <a:t> </a:t>
+            </a:r>
+            <a:r>
+              <a:rPr lang="en-US" sz="2800" dirty="0" smtClean="0"/>
+              <a:t>1 in </a:t>
+            </a:r>
+            <a:r>
+              <a:rPr lang="en-US" sz="2800" dirty="0" err="1"/>
+              <a:t>einer</a:t>
+            </a:r>
+            <a:r>
+              <a:rPr lang="en-US" sz="2800" dirty="0"/>
+              <a:t> </a:t>
+            </a:r>
+            <a:r>
+              <a:rPr lang="en-US" sz="2800" dirty="0" err="1" smtClean="0"/>
+              <a:t>Reihe</a:t>
+            </a:r>
+            <a:r>
+              <a:rPr lang="en-US" sz="2800" dirty="0" smtClean="0"/>
+              <a:t> (</a:t>
+            </a:r>
+            <a:r>
+              <a:rPr lang="en-US" sz="2800" dirty="0" err="1" smtClean="0"/>
+              <a:t>zwei</a:t>
+            </a:r>
+            <a:r>
+              <a:rPr lang="en-US" sz="2800" dirty="0" smtClean="0"/>
+              <a:t> </a:t>
+            </a:r>
+            <a:r>
+              <a:rPr lang="en-US" sz="2800" dirty="0" err="1" smtClean="0"/>
+              <a:t>leere</a:t>
+            </a:r>
+            <a:r>
+              <a:rPr lang="en-US" sz="2800" dirty="0" smtClean="0"/>
+              <a:t> Felder)</a:t>
+            </a:r>
+          </a:p>
+          <a:p>
+            <a:r>
+              <a:rPr lang="en-US" sz="2800" dirty="0" err="1" smtClean="0"/>
+              <a:t>Sonst</a:t>
+            </a:r>
+            <a:r>
+              <a:rPr lang="en-US" sz="2800" dirty="0" smtClean="0"/>
+              <a:t> 0 (</a:t>
+            </a:r>
+            <a:r>
+              <a:rPr lang="en-US" sz="2800" dirty="0" err="1" smtClean="0"/>
+              <a:t>leere</a:t>
+            </a:r>
+            <a:r>
+              <a:rPr lang="en-US" sz="2800" dirty="0" smtClean="0"/>
+              <a:t> </a:t>
+            </a:r>
+            <a:r>
+              <a:rPr lang="en-US" sz="2800" dirty="0" err="1" smtClean="0"/>
+              <a:t>oder</a:t>
+            </a:r>
+            <a:r>
+              <a:rPr lang="en-US" sz="2800" dirty="0" smtClean="0"/>
+              <a:t> </a:t>
+            </a:r>
+            <a:r>
+              <a:rPr lang="en-US" sz="2800" dirty="0" err="1" smtClean="0"/>
+              <a:t>nicht</a:t>
+            </a:r>
+            <a:r>
+              <a:rPr lang="en-US" sz="2800" dirty="0" smtClean="0"/>
+              <a:t> </a:t>
+            </a:r>
+            <a:r>
+              <a:rPr lang="en-US" sz="2800" dirty="0" err="1" smtClean="0"/>
+              <a:t>gewinnbare</a:t>
+            </a:r>
+            <a:r>
+              <a:rPr lang="en-US" sz="2800" dirty="0" smtClean="0"/>
+              <a:t> </a:t>
+            </a:r>
+            <a:r>
+              <a:rPr lang="en-US" sz="2800" dirty="0" err="1" smtClean="0"/>
+              <a:t>Reihe</a:t>
+            </a:r>
+            <a:r>
+              <a:rPr lang="en-US" sz="2800" dirty="0" smtClean="0"/>
+              <a:t>)</a:t>
+            </a:r>
+            <a:endParaRPr lang="en-US" sz="2800" dirty="0"/>
+          </a:p>
+          <a:p>
+            <a:r>
               <a:rPr lang="de-DE" sz="2800" dirty="0" smtClean="0"/>
-              <a:t>+1 für Sieg , -1 für Niederlage, Sonst 0</a:t>
-            </a:r>
-            <a:endParaRPr lang="de-DE" sz="2800" dirty="0" smtClean="0"/>
+              <a:t>Negative </a:t>
+            </a:r>
+            <a:r>
+              <a:rPr lang="de-DE" sz="2800" dirty="0" err="1" smtClean="0"/>
+              <a:t>Scores</a:t>
+            </a:r>
+            <a:r>
+              <a:rPr lang="de-DE" sz="2800" dirty="0" smtClean="0"/>
+              <a:t> für Gegner</a:t>
+            </a:r>
           </a:p>
           <a:p>
             <a:pPr marL="0" indent="0">
@@ -47531,11 +47511,7 @@
           <a:p>
             <a:r>
               <a:rPr lang="de-DE" dirty="0" smtClean="0"/>
-              <a:t>Aufgabe </a:t>
-            </a:r>
-            <a:r>
-              <a:rPr lang="de-DE" dirty="0" smtClean="0"/>
-              <a:t>1d – Alpha-Beta</a:t>
+              <a:t>Aufgabe 1d – Alpha-Beta</a:t>
             </a:r>
             <a:endParaRPr lang="de-DE" dirty="0"/>
           </a:p>
@@ -47558,7 +47534,7 @@
           <a:p>
             <a:fld id="{62A8A28E-B5F5-41EE-B009-8D872471EF33}" type="datetime1">
               <a:rPr lang="de-DE" smtClean="0"/>
-              <a:t>30.11.2016</a:t>
+              <a:t>01.12.2016</a:t>
             </a:fld>
             <a:endParaRPr lang="de-DE"/>
           </a:p>
@@ -49124,7 +49100,7 @@
           <a:p>
             <a:fld id="{62A8A28E-B5F5-41EE-B009-8D872471EF33}" type="datetime1">
               <a:rPr lang="de-DE" smtClean="0"/>
-              <a:t>30.11.2016</a:t>
+              <a:t>01.12.2016</a:t>
             </a:fld>
             <a:endParaRPr lang="de-DE"/>
           </a:p>
@@ -49464,7 +49440,15 @@
           <a:p>
             <a:r>
               <a:rPr lang="de-DE" sz="2800" dirty="0" smtClean="0"/>
-              <a:t>Laufzeit wird steigender Suchtiefe deutlich verbessert</a:t>
+              <a:t>Laufzeit </a:t>
+            </a:r>
+            <a:r>
+              <a:rPr lang="de-DE" sz="2800" dirty="0" smtClean="0"/>
+              <a:t>wird mit </a:t>
+            </a:r>
+            <a:r>
+              <a:rPr lang="de-DE" sz="2800" dirty="0" smtClean="0"/>
+              <a:t>steigender Suchtiefe deutlich verbessert</a:t>
             </a:r>
           </a:p>
           <a:p>

</xml_diff>

<commit_message>
SOAS-6_1: final code + presentation
</commit_message>
<xml_diff>
--- a/Blatt-06/Präsentation.pptx
+++ b/Blatt-06/Präsentation.pptx
@@ -298,28 +298,28 @@
                 <c:formatCode>General</c:formatCode>
                 <c:ptCount val="8"/>
                 <c:pt idx="0">
-                  <c:v>33.33</c:v>
+                  <c:v>16.664999999999999</c:v>
                 </c:pt>
                 <c:pt idx="1">
-                  <c:v>46.62</c:v>
+                  <c:v>23.31</c:v>
                 </c:pt>
                 <c:pt idx="2">
-                  <c:v>74.61</c:v>
+                  <c:v>37.305</c:v>
                 </c:pt>
                 <c:pt idx="3">
-                  <c:v>77.989999999999995</c:v>
+                  <c:v>38.994999999999997</c:v>
                 </c:pt>
                 <c:pt idx="4">
-                  <c:v>89.63</c:v>
+                  <c:v>44.814999999999998</c:v>
                 </c:pt>
                 <c:pt idx="5">
-                  <c:v>90.08</c:v>
+                  <c:v>45.04</c:v>
                 </c:pt>
                 <c:pt idx="6">
-                  <c:v>94.01</c:v>
+                  <c:v>47.005000000000003</c:v>
                 </c:pt>
                 <c:pt idx="7">
-                  <c:v>94.47</c:v>
+                  <c:v>47.234999999999999</c:v>
                 </c:pt>
               </c:numCache>
             </c:numRef>
@@ -335,11 +335,11 @@
           <c:showBubbleSize val="0"/>
         </c:dLbls>
         <c:smooth val="0"/>
-        <c:axId val="244573264"/>
-        <c:axId val="244573824"/>
+        <c:axId val="222850496"/>
+        <c:axId val="222851056"/>
       </c:lineChart>
       <c:catAx>
-        <c:axId val="244573264"/>
+        <c:axId val="222850496"/>
         <c:scaling>
           <c:orientation val="minMax"/>
         </c:scaling>
@@ -382,7 +382,7 @@
             <a:endParaRPr lang="de-DE"/>
           </a:p>
         </c:txPr>
-        <c:crossAx val="244573824"/>
+        <c:crossAx val="222851056"/>
         <c:crosses val="autoZero"/>
         <c:auto val="1"/>
         <c:lblAlgn val="ctr"/>
@@ -390,7 +390,7 @@
         <c:noMultiLvlLbl val="0"/>
       </c:catAx>
       <c:valAx>
-        <c:axId val="244573824"/>
+        <c:axId val="222851056"/>
         <c:scaling>
           <c:orientation val="minMax"/>
         </c:scaling>
@@ -488,7 +488,7 @@
             <a:endParaRPr lang="de-DE"/>
           </a:p>
         </c:txPr>
-        <c:crossAx val="244573264"/>
+        <c:crossAx val="222850496"/>
         <c:crosses val="autoZero"/>
         <c:crossBetween val="between"/>
       </c:valAx>
@@ -771,11 +771,11 @@
         </c:dLbls>
         <c:gapWidth val="50"/>
         <c:overlap val="-27"/>
-        <c:axId val="177184672"/>
-        <c:axId val="177186352"/>
+        <c:axId val="73426128"/>
+        <c:axId val="73426688"/>
       </c:barChart>
       <c:catAx>
-        <c:axId val="177184672"/>
+        <c:axId val="73426128"/>
         <c:scaling>
           <c:orientation val="minMax"/>
         </c:scaling>
@@ -818,7 +818,7 @@
             <a:endParaRPr lang="de-DE"/>
           </a:p>
         </c:txPr>
-        <c:crossAx val="177186352"/>
+        <c:crossAx val="73426688"/>
         <c:crosses val="autoZero"/>
         <c:auto val="1"/>
         <c:lblAlgn val="ctr"/>
@@ -826,7 +826,7 @@
         <c:noMultiLvlLbl val="0"/>
       </c:catAx>
       <c:valAx>
-        <c:axId val="177186352"/>
+        <c:axId val="73426688"/>
         <c:scaling>
           <c:orientation val="minMax"/>
         </c:scaling>
@@ -863,7 +863,7 @@
             <a:endParaRPr lang="de-DE"/>
           </a:p>
         </c:txPr>
-        <c:crossAx val="177184672"/>
+        <c:crossAx val="73426128"/>
         <c:crosses val="autoZero"/>
         <c:crossBetween val="between"/>
       </c:valAx>
@@ -1114,11 +1114,11 @@
         </c:dLbls>
         <c:gapWidth val="50"/>
         <c:overlap val="-27"/>
-        <c:axId val="177191392"/>
-        <c:axId val="177186912"/>
+        <c:axId val="73428928"/>
+        <c:axId val="73429488"/>
       </c:barChart>
       <c:catAx>
-        <c:axId val="177191392"/>
+        <c:axId val="73428928"/>
         <c:scaling>
           <c:orientation val="minMax"/>
         </c:scaling>
@@ -1161,7 +1161,7 @@
             <a:endParaRPr lang="de-DE"/>
           </a:p>
         </c:txPr>
-        <c:crossAx val="177186912"/>
+        <c:crossAx val="73429488"/>
         <c:crosses val="autoZero"/>
         <c:auto val="1"/>
         <c:lblAlgn val="ctr"/>
@@ -1169,7 +1169,7 @@
         <c:noMultiLvlLbl val="0"/>
       </c:catAx>
       <c:valAx>
-        <c:axId val="177186912"/>
+        <c:axId val="73429488"/>
         <c:scaling>
           <c:orientation val="minMax"/>
         </c:scaling>
@@ -1206,7 +1206,7 @@
             <a:endParaRPr lang="de-DE"/>
           </a:p>
         </c:txPr>
-        <c:crossAx val="177191392"/>
+        <c:crossAx val="73428928"/>
         <c:crosses val="autoZero"/>
         <c:crossBetween val="between"/>
       </c:valAx>
@@ -1457,11 +1457,11 @@
         </c:dLbls>
         <c:gapWidth val="50"/>
         <c:overlap val="-27"/>
-        <c:axId val="177188032"/>
-        <c:axId val="244566544"/>
+        <c:axId val="73431728"/>
+        <c:axId val="73432288"/>
       </c:barChart>
       <c:catAx>
-        <c:axId val="177188032"/>
+        <c:axId val="73431728"/>
         <c:scaling>
           <c:orientation val="minMax"/>
         </c:scaling>
@@ -1504,7 +1504,7 @@
             <a:endParaRPr lang="de-DE"/>
           </a:p>
         </c:txPr>
-        <c:crossAx val="244566544"/>
+        <c:crossAx val="73432288"/>
         <c:crosses val="autoZero"/>
         <c:auto val="1"/>
         <c:lblAlgn val="ctr"/>
@@ -1512,7 +1512,7 @@
         <c:noMultiLvlLbl val="0"/>
       </c:catAx>
       <c:valAx>
-        <c:axId val="244566544"/>
+        <c:axId val="73432288"/>
         <c:scaling>
           <c:orientation val="minMax"/>
         </c:scaling>
@@ -1549,7 +1549,7 @@
             <a:endParaRPr lang="de-DE"/>
           </a:p>
         </c:txPr>
-        <c:crossAx val="177188032"/>
+        <c:crossAx val="73431728"/>
         <c:crosses val="autoZero"/>
         <c:crossBetween val="between"/>
       </c:valAx>
@@ -1800,11 +1800,11 @@
         </c:dLbls>
         <c:gapWidth val="50"/>
         <c:overlap val="-27"/>
-        <c:axId val="244564864"/>
-        <c:axId val="248380320"/>
+        <c:axId val="228173536"/>
+        <c:axId val="228174096"/>
       </c:barChart>
       <c:catAx>
-        <c:axId val="244564864"/>
+        <c:axId val="228173536"/>
         <c:scaling>
           <c:orientation val="minMax"/>
         </c:scaling>
@@ -1847,7 +1847,7 @@
             <a:endParaRPr lang="de-DE"/>
           </a:p>
         </c:txPr>
-        <c:crossAx val="248380320"/>
+        <c:crossAx val="228174096"/>
         <c:crosses val="autoZero"/>
         <c:auto val="1"/>
         <c:lblAlgn val="ctr"/>
@@ -1855,7 +1855,7 @@
         <c:noMultiLvlLbl val="0"/>
       </c:catAx>
       <c:valAx>
-        <c:axId val="248380320"/>
+        <c:axId val="228174096"/>
         <c:scaling>
           <c:orientation val="minMax"/>
         </c:scaling>
@@ -1892,7 +1892,7 @@
             <a:endParaRPr lang="de-DE"/>
           </a:p>
         </c:txPr>
-        <c:crossAx val="244564864"/>
+        <c:crossAx val="228173536"/>
         <c:crosses val="autoZero"/>
         <c:crossBetween val="between"/>
       </c:valAx>
@@ -2147,11 +2147,11 @@
         </c:dLbls>
         <c:gapWidth val="50"/>
         <c:overlap val="-27"/>
-        <c:axId val="251286336"/>
-        <c:axId val="251286896"/>
+        <c:axId val="228176336"/>
+        <c:axId val="228176896"/>
       </c:barChart>
       <c:catAx>
-        <c:axId val="251286336"/>
+        <c:axId val="228176336"/>
         <c:scaling>
           <c:orientation val="minMax"/>
         </c:scaling>
@@ -2194,7 +2194,7 @@
             <a:endParaRPr lang="de-DE"/>
           </a:p>
         </c:txPr>
-        <c:crossAx val="251286896"/>
+        <c:crossAx val="228176896"/>
         <c:crosses val="autoZero"/>
         <c:auto val="1"/>
         <c:lblAlgn val="ctr"/>
@@ -2202,7 +2202,7 @@
         <c:noMultiLvlLbl val="0"/>
       </c:catAx>
       <c:valAx>
-        <c:axId val="251286896"/>
+        <c:axId val="228176896"/>
         <c:scaling>
           <c:orientation val="minMax"/>
         </c:scaling>
@@ -2239,7 +2239,7 @@
             <a:endParaRPr lang="de-DE"/>
           </a:p>
         </c:txPr>
-        <c:crossAx val="251286336"/>
+        <c:crossAx val="228176336"/>
         <c:crosses val="autoZero"/>
         <c:crossBetween val="between"/>
       </c:valAx>
@@ -2490,11 +2490,11 @@
         </c:dLbls>
         <c:gapWidth val="50"/>
         <c:overlap val="-27"/>
-        <c:axId val="251289136"/>
-        <c:axId val="251289696"/>
+        <c:axId val="228179136"/>
+        <c:axId val="228179696"/>
       </c:barChart>
       <c:catAx>
-        <c:axId val="251289136"/>
+        <c:axId val="228179136"/>
         <c:scaling>
           <c:orientation val="minMax"/>
         </c:scaling>
@@ -2537,7 +2537,7 @@
             <a:endParaRPr lang="de-DE"/>
           </a:p>
         </c:txPr>
-        <c:crossAx val="251289696"/>
+        <c:crossAx val="228179696"/>
         <c:crosses val="autoZero"/>
         <c:auto val="1"/>
         <c:lblAlgn val="ctr"/>
@@ -2545,7 +2545,7 @@
         <c:noMultiLvlLbl val="0"/>
       </c:catAx>
       <c:valAx>
-        <c:axId val="251289696"/>
+        <c:axId val="228179696"/>
         <c:scaling>
           <c:orientation val="minMax"/>
         </c:scaling>
@@ -2582,7 +2582,7 @@
             <a:endParaRPr lang="de-DE"/>
           </a:p>
         </c:txPr>
-        <c:crossAx val="251289136"/>
+        <c:crossAx val="228179136"/>
         <c:crosses val="autoZero"/>
         <c:crossBetween val="between"/>
       </c:valAx>
@@ -2833,11 +2833,11 @@
         </c:dLbls>
         <c:gapWidth val="50"/>
         <c:overlap val="-27"/>
-        <c:axId val="251291936"/>
-        <c:axId val="251292496"/>
+        <c:axId val="228181936"/>
+        <c:axId val="228182496"/>
       </c:barChart>
       <c:catAx>
-        <c:axId val="251291936"/>
+        <c:axId val="228181936"/>
         <c:scaling>
           <c:orientation val="minMax"/>
         </c:scaling>
@@ -2880,7 +2880,7 @@
             <a:endParaRPr lang="de-DE"/>
           </a:p>
         </c:txPr>
-        <c:crossAx val="251292496"/>
+        <c:crossAx val="228182496"/>
         <c:crosses val="autoZero"/>
         <c:auto val="1"/>
         <c:lblAlgn val="ctr"/>
@@ -2888,7 +2888,7 @@
         <c:noMultiLvlLbl val="0"/>
       </c:catAx>
       <c:valAx>
-        <c:axId val="251292496"/>
+        <c:axId val="228182496"/>
         <c:scaling>
           <c:orientation val="minMax"/>
         </c:scaling>
@@ -2925,7 +2925,7 @@
             <a:endParaRPr lang="de-DE"/>
           </a:p>
         </c:txPr>
-        <c:crossAx val="251291936"/>
+        <c:crossAx val="228181936"/>
         <c:crosses val="autoZero"/>
         <c:crossBetween val="between"/>
       </c:valAx>
@@ -3176,11 +3176,11 @@
         </c:dLbls>
         <c:gapWidth val="50"/>
         <c:overlap val="-27"/>
-        <c:axId val="251294736"/>
-        <c:axId val="251295296"/>
+        <c:axId val="228184736"/>
+        <c:axId val="228185296"/>
       </c:barChart>
       <c:catAx>
-        <c:axId val="251294736"/>
+        <c:axId val="228184736"/>
         <c:scaling>
           <c:orientation val="minMax"/>
         </c:scaling>
@@ -3223,7 +3223,7 @@
             <a:endParaRPr lang="de-DE"/>
           </a:p>
         </c:txPr>
-        <c:crossAx val="251295296"/>
+        <c:crossAx val="228185296"/>
         <c:crosses val="autoZero"/>
         <c:auto val="1"/>
         <c:lblAlgn val="ctr"/>
@@ -3231,7 +3231,7 @@
         <c:noMultiLvlLbl val="0"/>
       </c:catAx>
       <c:valAx>
-        <c:axId val="251295296"/>
+        <c:axId val="228185296"/>
         <c:scaling>
           <c:orientation val="minMax"/>
         </c:scaling>
@@ -3268,7 +3268,7 @@
             <a:endParaRPr lang="de-DE"/>
           </a:p>
         </c:txPr>
-        <c:crossAx val="251294736"/>
+        <c:crossAx val="228184736"/>
         <c:crosses val="autoZero"/>
         <c:crossBetween val="between"/>
       </c:valAx>
@@ -3519,11 +3519,11 @@
         </c:dLbls>
         <c:gapWidth val="50"/>
         <c:overlap val="-27"/>
-        <c:axId val="251297536"/>
-        <c:axId val="251298096"/>
+        <c:axId val="228187536"/>
+        <c:axId val="228188096"/>
       </c:barChart>
       <c:catAx>
-        <c:axId val="251297536"/>
+        <c:axId val="228187536"/>
         <c:scaling>
           <c:orientation val="minMax"/>
         </c:scaling>
@@ -3566,7 +3566,7 @@
             <a:endParaRPr lang="de-DE"/>
           </a:p>
         </c:txPr>
-        <c:crossAx val="251298096"/>
+        <c:crossAx val="228188096"/>
         <c:crosses val="autoZero"/>
         <c:auto val="1"/>
         <c:lblAlgn val="ctr"/>
@@ -3574,7 +3574,7 @@
         <c:noMultiLvlLbl val="0"/>
       </c:catAx>
       <c:valAx>
-        <c:axId val="251298096"/>
+        <c:axId val="228188096"/>
         <c:scaling>
           <c:orientation val="minMax"/>
         </c:scaling>
@@ -3611,7 +3611,7 @@
             <a:endParaRPr lang="de-DE"/>
           </a:p>
         </c:txPr>
-        <c:crossAx val="251297536"/>
+        <c:crossAx val="228187536"/>
         <c:crosses val="autoZero"/>
         <c:crossBetween val="between"/>
       </c:valAx>
@@ -3862,11 +3862,11 @@
         </c:dLbls>
         <c:gapWidth val="50"/>
         <c:overlap val="-27"/>
-        <c:axId val="251300336"/>
-        <c:axId val="250711328"/>
+        <c:axId val="228543616"/>
+        <c:axId val="228544176"/>
       </c:barChart>
       <c:catAx>
-        <c:axId val="251300336"/>
+        <c:axId val="228543616"/>
         <c:scaling>
           <c:orientation val="minMax"/>
         </c:scaling>
@@ -3909,7 +3909,7 @@
             <a:endParaRPr lang="de-DE"/>
           </a:p>
         </c:txPr>
-        <c:crossAx val="250711328"/>
+        <c:crossAx val="228544176"/>
         <c:crosses val="autoZero"/>
         <c:auto val="1"/>
         <c:lblAlgn val="ctr"/>
@@ -3917,7 +3917,7 @@
         <c:noMultiLvlLbl val="0"/>
       </c:catAx>
       <c:valAx>
-        <c:axId val="250711328"/>
+        <c:axId val="228544176"/>
         <c:scaling>
           <c:orientation val="minMax"/>
         </c:scaling>
@@ -3954,7 +3954,7 @@
             <a:endParaRPr lang="de-DE"/>
           </a:p>
         </c:txPr>
-        <c:crossAx val="251300336"/>
+        <c:crossAx val="228543616"/>
         <c:crosses val="autoZero"/>
         <c:crossBetween val="between"/>
       </c:valAx>
@@ -4205,11 +4205,11 @@
         </c:dLbls>
         <c:gapWidth val="50"/>
         <c:overlap val="-27"/>
-        <c:axId val="248496048"/>
-        <c:axId val="248496608"/>
+        <c:axId val="152207888"/>
+        <c:axId val="226491920"/>
       </c:barChart>
       <c:catAx>
-        <c:axId val="248496048"/>
+        <c:axId val="152207888"/>
         <c:scaling>
           <c:orientation val="minMax"/>
         </c:scaling>
@@ -4252,7 +4252,7 @@
             <a:endParaRPr lang="de-DE"/>
           </a:p>
         </c:txPr>
-        <c:crossAx val="248496608"/>
+        <c:crossAx val="226491920"/>
         <c:crosses val="autoZero"/>
         <c:auto val="1"/>
         <c:lblAlgn val="ctr"/>
@@ -4260,7 +4260,7 @@
         <c:noMultiLvlLbl val="0"/>
       </c:catAx>
       <c:valAx>
-        <c:axId val="248496608"/>
+        <c:axId val="226491920"/>
         <c:scaling>
           <c:orientation val="minMax"/>
         </c:scaling>
@@ -4297,7 +4297,7 @@
             <a:endParaRPr lang="de-DE"/>
           </a:p>
         </c:txPr>
-        <c:crossAx val="248496048"/>
+        <c:crossAx val="152207888"/>
         <c:crosses val="autoZero"/>
         <c:crossBetween val="between"/>
       </c:valAx>
@@ -4552,11 +4552,11 @@
         </c:dLbls>
         <c:gapWidth val="50"/>
         <c:overlap val="-27"/>
-        <c:axId val="250719168"/>
-        <c:axId val="250716928"/>
+        <c:axId val="228549776"/>
+        <c:axId val="228550336"/>
       </c:barChart>
       <c:catAx>
-        <c:axId val="250719168"/>
+        <c:axId val="228549776"/>
         <c:scaling>
           <c:orientation val="minMax"/>
         </c:scaling>
@@ -4599,7 +4599,7 @@
             <a:endParaRPr lang="de-DE"/>
           </a:p>
         </c:txPr>
-        <c:crossAx val="250716928"/>
+        <c:crossAx val="228550336"/>
         <c:crosses val="autoZero"/>
         <c:auto val="1"/>
         <c:lblAlgn val="ctr"/>
@@ -4607,7 +4607,7 @@
         <c:noMultiLvlLbl val="0"/>
       </c:catAx>
       <c:valAx>
-        <c:axId val="250716928"/>
+        <c:axId val="228550336"/>
         <c:scaling>
           <c:orientation val="minMax"/>
         </c:scaling>
@@ -4644,7 +4644,7 @@
             <a:endParaRPr lang="de-DE"/>
           </a:p>
         </c:txPr>
-        <c:crossAx val="250719168"/>
+        <c:crossAx val="228549776"/>
         <c:crosses val="autoZero"/>
         <c:crossBetween val="between"/>
       </c:valAx>
@@ -4895,11 +4895,11 @@
         </c:dLbls>
         <c:gapWidth val="50"/>
         <c:overlap val="-27"/>
-        <c:axId val="250718048"/>
-        <c:axId val="250721408"/>
+        <c:axId val="228549216"/>
+        <c:axId val="228555376"/>
       </c:barChart>
       <c:catAx>
-        <c:axId val="250718048"/>
+        <c:axId val="228549216"/>
         <c:scaling>
           <c:orientation val="minMax"/>
         </c:scaling>
@@ -4942,7 +4942,7 @@
             <a:endParaRPr lang="de-DE"/>
           </a:p>
         </c:txPr>
-        <c:crossAx val="250721408"/>
+        <c:crossAx val="228555376"/>
         <c:crosses val="autoZero"/>
         <c:auto val="1"/>
         <c:lblAlgn val="ctr"/>
@@ -4950,7 +4950,7 @@
         <c:noMultiLvlLbl val="0"/>
       </c:catAx>
       <c:valAx>
-        <c:axId val="250721408"/>
+        <c:axId val="228555376"/>
         <c:scaling>
           <c:orientation val="minMax"/>
         </c:scaling>
@@ -4987,7 +4987,7 @@
             <a:endParaRPr lang="de-DE"/>
           </a:p>
         </c:txPr>
-        <c:crossAx val="250718048"/>
+        <c:crossAx val="228549216"/>
         <c:crosses val="autoZero"/>
         <c:crossBetween val="between"/>
       </c:valAx>
@@ -5238,11 +5238,11 @@
         </c:dLbls>
         <c:gapWidth val="50"/>
         <c:overlap val="-27"/>
-        <c:axId val="250723648"/>
-        <c:axId val="250724208"/>
+        <c:axId val="228557056"/>
+        <c:axId val="228557616"/>
       </c:barChart>
       <c:catAx>
-        <c:axId val="250723648"/>
+        <c:axId val="228557056"/>
         <c:scaling>
           <c:orientation val="minMax"/>
         </c:scaling>
@@ -5285,7 +5285,7 @@
             <a:endParaRPr lang="de-DE"/>
           </a:p>
         </c:txPr>
-        <c:crossAx val="250724208"/>
+        <c:crossAx val="228557616"/>
         <c:crosses val="autoZero"/>
         <c:auto val="1"/>
         <c:lblAlgn val="ctr"/>
@@ -5293,7 +5293,7 @@
         <c:noMultiLvlLbl val="0"/>
       </c:catAx>
       <c:valAx>
-        <c:axId val="250724208"/>
+        <c:axId val="228557616"/>
         <c:scaling>
           <c:orientation val="minMax"/>
         </c:scaling>
@@ -5330,7 +5330,7 @@
             <a:endParaRPr lang="de-DE"/>
           </a:p>
         </c:txPr>
-        <c:crossAx val="250723648"/>
+        <c:crossAx val="228557056"/>
         <c:crosses val="autoZero"/>
         <c:crossBetween val="between"/>
       </c:valAx>
@@ -5581,11 +5581,11 @@
         </c:dLbls>
         <c:gapWidth val="50"/>
         <c:overlap val="-27"/>
-        <c:axId val="250726448"/>
-        <c:axId val="250727008"/>
+        <c:axId val="228554256"/>
+        <c:axId val="228550896"/>
       </c:barChart>
       <c:catAx>
-        <c:axId val="250726448"/>
+        <c:axId val="228554256"/>
         <c:scaling>
           <c:orientation val="minMax"/>
         </c:scaling>
@@ -5628,7 +5628,7 @@
             <a:endParaRPr lang="de-DE"/>
           </a:p>
         </c:txPr>
-        <c:crossAx val="250727008"/>
+        <c:crossAx val="228550896"/>
         <c:crosses val="autoZero"/>
         <c:auto val="1"/>
         <c:lblAlgn val="ctr"/>
@@ -5636,7 +5636,7 @@
         <c:noMultiLvlLbl val="0"/>
       </c:catAx>
       <c:valAx>
-        <c:axId val="250727008"/>
+        <c:axId val="228550896"/>
         <c:scaling>
           <c:orientation val="minMax"/>
         </c:scaling>
@@ -5673,7 +5673,7 @@
             <a:endParaRPr lang="de-DE"/>
           </a:p>
         </c:txPr>
-        <c:crossAx val="250726448"/>
+        <c:crossAx val="228554256"/>
         <c:crosses val="autoZero"/>
         <c:crossBetween val="between"/>
       </c:valAx>
@@ -5919,11 +5919,11 @@
         </c:dLbls>
         <c:gapWidth val="50"/>
         <c:overlap val="-27"/>
-        <c:axId val="250729248"/>
-        <c:axId val="250729808"/>
+        <c:axId val="228561536"/>
+        <c:axId val="228562096"/>
       </c:barChart>
       <c:catAx>
-        <c:axId val="250729248"/>
+        <c:axId val="228561536"/>
         <c:scaling>
           <c:orientation val="minMax"/>
         </c:scaling>
@@ -5966,7 +5966,7 @@
             <a:endParaRPr lang="de-DE"/>
           </a:p>
         </c:txPr>
-        <c:crossAx val="250729808"/>
+        <c:crossAx val="228562096"/>
         <c:crosses val="autoZero"/>
         <c:auto val="1"/>
         <c:lblAlgn val="ctr"/>
@@ -5974,7 +5974,7 @@
         <c:noMultiLvlLbl val="0"/>
       </c:catAx>
       <c:valAx>
-        <c:axId val="250729808"/>
+        <c:axId val="228562096"/>
         <c:scaling>
           <c:orientation val="minMax"/>
         </c:scaling>
@@ -6011,7 +6011,7 @@
             <a:endParaRPr lang="de-DE"/>
           </a:p>
         </c:txPr>
-        <c:crossAx val="250729248"/>
+        <c:crossAx val="228561536"/>
         <c:crosses val="autoZero"/>
         <c:crossBetween val="between"/>
       </c:valAx>
@@ -6262,11 +6262,11 @@
         </c:dLbls>
         <c:gapWidth val="50"/>
         <c:overlap val="-27"/>
-        <c:axId val="250732048"/>
-        <c:axId val="250732608"/>
+        <c:axId val="228564336"/>
+        <c:axId val="228564896"/>
       </c:barChart>
       <c:catAx>
-        <c:axId val="250732048"/>
+        <c:axId val="228564336"/>
         <c:scaling>
           <c:orientation val="minMax"/>
         </c:scaling>
@@ -6309,7 +6309,7 @@
             <a:endParaRPr lang="de-DE"/>
           </a:p>
         </c:txPr>
-        <c:crossAx val="250732608"/>
+        <c:crossAx val="228564896"/>
         <c:crosses val="autoZero"/>
         <c:auto val="1"/>
         <c:lblAlgn val="ctr"/>
@@ -6317,7 +6317,7 @@
         <c:noMultiLvlLbl val="0"/>
       </c:catAx>
       <c:valAx>
-        <c:axId val="250732608"/>
+        <c:axId val="228564896"/>
         <c:scaling>
           <c:orientation val="minMax"/>
         </c:scaling>
@@ -6354,7 +6354,7 @@
             <a:endParaRPr lang="de-DE"/>
           </a:p>
         </c:txPr>
-        <c:crossAx val="250732048"/>
+        <c:crossAx val="228564336"/>
         <c:crosses val="autoZero"/>
         <c:crossBetween val="between"/>
       </c:valAx>
@@ -6609,11 +6609,11 @@
         </c:dLbls>
         <c:gapWidth val="50"/>
         <c:overlap val="-27"/>
-        <c:axId val="250737088"/>
-        <c:axId val="250737648"/>
+        <c:axId val="228567136"/>
+        <c:axId val="228567696"/>
       </c:barChart>
       <c:catAx>
-        <c:axId val="250737088"/>
+        <c:axId val="228567136"/>
         <c:scaling>
           <c:orientation val="minMax"/>
         </c:scaling>
@@ -6656,7 +6656,7 @@
             <a:endParaRPr lang="de-DE"/>
           </a:p>
         </c:txPr>
-        <c:crossAx val="250737648"/>
+        <c:crossAx val="228567696"/>
         <c:crosses val="autoZero"/>
         <c:auto val="1"/>
         <c:lblAlgn val="ctr"/>
@@ -6664,7 +6664,7 @@
         <c:noMultiLvlLbl val="0"/>
       </c:catAx>
       <c:valAx>
-        <c:axId val="250737648"/>
+        <c:axId val="228567696"/>
         <c:scaling>
           <c:orientation val="minMax"/>
         </c:scaling>
@@ -6701,7 +6701,7 @@
             <a:endParaRPr lang="de-DE"/>
           </a:p>
         </c:txPr>
-        <c:crossAx val="250737088"/>
+        <c:crossAx val="228567136"/>
         <c:crosses val="autoZero"/>
         <c:crossBetween val="between"/>
       </c:valAx>
@@ -6952,11 +6952,11 @@
         </c:dLbls>
         <c:gapWidth val="50"/>
         <c:overlap val="-27"/>
-        <c:axId val="250735968"/>
-        <c:axId val="250739328"/>
+        <c:axId val="228569936"/>
+        <c:axId val="228570496"/>
       </c:barChart>
       <c:catAx>
-        <c:axId val="250735968"/>
+        <c:axId val="228569936"/>
         <c:scaling>
           <c:orientation val="minMax"/>
         </c:scaling>
@@ -6999,7 +6999,7 @@
             <a:endParaRPr lang="de-DE"/>
           </a:p>
         </c:txPr>
-        <c:crossAx val="250739328"/>
+        <c:crossAx val="228570496"/>
         <c:crosses val="autoZero"/>
         <c:auto val="1"/>
         <c:lblAlgn val="ctr"/>
@@ -7007,7 +7007,7 @@
         <c:noMultiLvlLbl val="0"/>
       </c:catAx>
       <c:valAx>
-        <c:axId val="250739328"/>
+        <c:axId val="228570496"/>
         <c:scaling>
           <c:orientation val="minMax"/>
         </c:scaling>
@@ -7044,7 +7044,7 @@
             <a:endParaRPr lang="de-DE"/>
           </a:p>
         </c:txPr>
-        <c:crossAx val="250735968"/>
+        <c:crossAx val="228569936"/>
         <c:crosses val="autoZero"/>
         <c:crossBetween val="between"/>
       </c:valAx>
@@ -7295,11 +7295,11 @@
         </c:dLbls>
         <c:gapWidth val="50"/>
         <c:overlap val="-27"/>
-        <c:axId val="250741568"/>
-        <c:axId val="250742128"/>
+        <c:axId val="228572736"/>
+        <c:axId val="228573296"/>
       </c:barChart>
       <c:catAx>
-        <c:axId val="250741568"/>
+        <c:axId val="228572736"/>
         <c:scaling>
           <c:orientation val="minMax"/>
         </c:scaling>
@@ -7342,7 +7342,7 @@
             <a:endParaRPr lang="de-DE"/>
           </a:p>
         </c:txPr>
-        <c:crossAx val="250742128"/>
+        <c:crossAx val="228573296"/>
         <c:crosses val="autoZero"/>
         <c:auto val="1"/>
         <c:lblAlgn val="ctr"/>
@@ -7350,7 +7350,7 @@
         <c:noMultiLvlLbl val="0"/>
       </c:catAx>
       <c:valAx>
-        <c:axId val="250742128"/>
+        <c:axId val="228573296"/>
         <c:scaling>
           <c:orientation val="minMax"/>
         </c:scaling>
@@ -7387,7 +7387,7 @@
             <a:endParaRPr lang="de-DE"/>
           </a:p>
         </c:txPr>
-        <c:crossAx val="250741568"/>
+        <c:crossAx val="228572736"/>
         <c:crosses val="autoZero"/>
         <c:crossBetween val="between"/>
       </c:valAx>
@@ -7638,11 +7638,11 @@
         </c:dLbls>
         <c:gapWidth val="50"/>
         <c:overlap val="-27"/>
-        <c:axId val="250720848"/>
-        <c:axId val="177187472"/>
+        <c:axId val="227501968"/>
+        <c:axId val="227501408"/>
       </c:barChart>
       <c:catAx>
-        <c:axId val="250720848"/>
+        <c:axId val="227501968"/>
         <c:scaling>
           <c:orientation val="minMax"/>
         </c:scaling>
@@ -7685,7 +7685,7 @@
             <a:endParaRPr lang="de-DE"/>
           </a:p>
         </c:txPr>
-        <c:crossAx val="177187472"/>
+        <c:crossAx val="227501408"/>
         <c:crosses val="autoZero"/>
         <c:auto val="1"/>
         <c:lblAlgn val="ctr"/>
@@ -7693,7 +7693,7 @@
         <c:noMultiLvlLbl val="0"/>
       </c:catAx>
       <c:valAx>
-        <c:axId val="177187472"/>
+        <c:axId val="227501408"/>
         <c:scaling>
           <c:orientation val="minMax"/>
         </c:scaling>
@@ -7730,7 +7730,7 @@
             <a:endParaRPr lang="de-DE"/>
           </a:p>
         </c:txPr>
-        <c:crossAx val="250720848"/>
+        <c:crossAx val="227501968"/>
         <c:crosses val="autoZero"/>
         <c:crossBetween val="between"/>
       </c:valAx>
@@ -7985,11 +7985,11 @@
         </c:dLbls>
         <c:gapWidth val="50"/>
         <c:overlap val="-27"/>
-        <c:axId val="248498848"/>
-        <c:axId val="248499408"/>
+        <c:axId val="226494160"/>
+        <c:axId val="226494720"/>
       </c:barChart>
       <c:catAx>
-        <c:axId val="248498848"/>
+        <c:axId val="226494160"/>
         <c:scaling>
           <c:orientation val="minMax"/>
         </c:scaling>
@@ -8032,7 +8032,7 @@
             <a:endParaRPr lang="de-DE"/>
           </a:p>
         </c:txPr>
-        <c:crossAx val="248499408"/>
+        <c:crossAx val="226494720"/>
         <c:crosses val="autoZero"/>
         <c:auto val="1"/>
         <c:lblAlgn val="ctr"/>
@@ -8040,7 +8040,7 @@
         <c:noMultiLvlLbl val="0"/>
       </c:catAx>
       <c:valAx>
-        <c:axId val="248499408"/>
+        <c:axId val="226494720"/>
         <c:scaling>
           <c:orientation val="minMax"/>
         </c:scaling>
@@ -8077,7 +8077,7 @@
             <a:endParaRPr lang="de-DE"/>
           </a:p>
         </c:txPr>
-        <c:crossAx val="248498848"/>
+        <c:crossAx val="226494160"/>
         <c:crosses val="autoZero"/>
         <c:crossBetween val="between"/>
       </c:valAx>
@@ -8323,11 +8323,11 @@
         </c:dLbls>
         <c:gapWidth val="50"/>
         <c:overlap val="-27"/>
-        <c:axId val="249613840"/>
-        <c:axId val="249616640"/>
+        <c:axId val="229930640"/>
+        <c:axId val="229931200"/>
       </c:barChart>
       <c:catAx>
-        <c:axId val="249613840"/>
+        <c:axId val="229930640"/>
         <c:scaling>
           <c:orientation val="minMax"/>
         </c:scaling>
@@ -8370,7 +8370,7 @@
             <a:endParaRPr lang="de-DE"/>
           </a:p>
         </c:txPr>
-        <c:crossAx val="249616640"/>
+        <c:crossAx val="229931200"/>
         <c:crosses val="autoZero"/>
         <c:auto val="1"/>
         <c:lblAlgn val="ctr"/>
@@ -8378,7 +8378,7 @@
         <c:noMultiLvlLbl val="0"/>
       </c:catAx>
       <c:valAx>
-        <c:axId val="249616640"/>
+        <c:axId val="229931200"/>
         <c:scaling>
           <c:orientation val="minMax"/>
         </c:scaling>
@@ -8415,7 +8415,7 @@
             <a:endParaRPr lang="de-DE"/>
           </a:p>
         </c:txPr>
-        <c:crossAx val="249613840"/>
+        <c:crossAx val="229930640"/>
         <c:crosses val="autoZero"/>
         <c:crossBetween val="between"/>
       </c:valAx>
@@ -8662,11 +8662,11 @@
         </c:dLbls>
         <c:gapWidth val="50"/>
         <c:overlap val="-27"/>
-        <c:axId val="249610480"/>
-        <c:axId val="249612160"/>
+        <c:axId val="229933440"/>
+        <c:axId val="229934000"/>
       </c:barChart>
       <c:catAx>
-        <c:axId val="249610480"/>
+        <c:axId val="229933440"/>
         <c:scaling>
           <c:orientation val="minMax"/>
         </c:scaling>
@@ -8709,7 +8709,7 @@
             <a:endParaRPr lang="de-DE"/>
           </a:p>
         </c:txPr>
-        <c:crossAx val="249612160"/>
+        <c:crossAx val="229934000"/>
         <c:crosses val="autoZero"/>
         <c:auto val="1"/>
         <c:lblAlgn val="ctr"/>
@@ -8717,7 +8717,7 @@
         <c:noMultiLvlLbl val="0"/>
       </c:catAx>
       <c:valAx>
-        <c:axId val="249612160"/>
+        <c:axId val="229934000"/>
         <c:scaling>
           <c:orientation val="minMax"/>
         </c:scaling>
@@ -8754,7 +8754,7 @@
             <a:endParaRPr lang="de-DE"/>
           </a:p>
         </c:txPr>
-        <c:crossAx val="249610480"/>
+        <c:crossAx val="229933440"/>
         <c:crosses val="autoZero"/>
         <c:crossBetween val="between"/>
       </c:valAx>
@@ -9005,11 +9005,11 @@
         </c:dLbls>
         <c:gapWidth val="50"/>
         <c:overlap val="-27"/>
-        <c:axId val="249621120"/>
-        <c:axId val="249617760"/>
+        <c:axId val="229942960"/>
+        <c:axId val="229937920"/>
       </c:barChart>
       <c:catAx>
-        <c:axId val="249621120"/>
+        <c:axId val="229942960"/>
         <c:scaling>
           <c:orientation val="minMax"/>
         </c:scaling>
@@ -9052,7 +9052,7 @@
             <a:endParaRPr lang="de-DE"/>
           </a:p>
         </c:txPr>
-        <c:crossAx val="249617760"/>
+        <c:crossAx val="229937920"/>
         <c:crosses val="autoZero"/>
         <c:auto val="1"/>
         <c:lblAlgn val="ctr"/>
@@ -9060,7 +9060,7 @@
         <c:noMultiLvlLbl val="0"/>
       </c:catAx>
       <c:valAx>
-        <c:axId val="249617760"/>
+        <c:axId val="229937920"/>
         <c:scaling>
           <c:orientation val="minMax"/>
         </c:scaling>
@@ -9097,7 +9097,7 @@
             <a:endParaRPr lang="de-DE"/>
           </a:p>
         </c:txPr>
-        <c:crossAx val="249621120"/>
+        <c:crossAx val="229942960"/>
         <c:crosses val="autoZero"/>
         <c:crossBetween val="between"/>
       </c:valAx>
@@ -9348,11 +9348,11 @@
         </c:dLbls>
         <c:gapWidth val="50"/>
         <c:overlap val="-27"/>
-        <c:axId val="249623360"/>
-        <c:axId val="250717488"/>
+        <c:axId val="228552016"/>
+        <c:axId val="228552576"/>
       </c:barChart>
       <c:catAx>
-        <c:axId val="249623360"/>
+        <c:axId val="228552016"/>
         <c:scaling>
           <c:orientation val="minMax"/>
         </c:scaling>
@@ -9395,7 +9395,7 @@
             <a:endParaRPr lang="de-DE"/>
           </a:p>
         </c:txPr>
-        <c:crossAx val="250717488"/>
+        <c:crossAx val="228552576"/>
         <c:crosses val="autoZero"/>
         <c:auto val="1"/>
         <c:lblAlgn val="ctr"/>
@@ -9403,7 +9403,7 @@
         <c:noMultiLvlLbl val="0"/>
       </c:catAx>
       <c:valAx>
-        <c:axId val="250717488"/>
+        <c:axId val="228552576"/>
         <c:scaling>
           <c:orientation val="minMax"/>
         </c:scaling>
@@ -9440,7 +9440,7 @@
             <a:endParaRPr lang="de-DE"/>
           </a:p>
         </c:txPr>
-        <c:crossAx val="249623360"/>
+        <c:crossAx val="228552016"/>
         <c:crosses val="autoZero"/>
         <c:crossBetween val="between"/>
       </c:valAx>
@@ -9653,7 +9653,7 @@
                   <c:v>Reflex(2)</c:v>
                 </c:pt>
                 <c:pt idx="1">
-                  <c:v>Alpha(3)</c:v>
+                  <c:v>Alpha(4)</c:v>
                 </c:pt>
                 <c:pt idx="2">
                   <c:v>Draw</c:v>
@@ -9691,11 +9691,11 @@
         </c:dLbls>
         <c:gapWidth val="50"/>
         <c:overlap val="-27"/>
-        <c:axId val="249618880"/>
-        <c:axId val="249620560"/>
+        <c:axId val="229936800"/>
+        <c:axId val="229937360"/>
       </c:barChart>
       <c:catAx>
-        <c:axId val="249618880"/>
+        <c:axId val="229936800"/>
         <c:scaling>
           <c:orientation val="minMax"/>
         </c:scaling>
@@ -9738,7 +9738,7 @@
             <a:endParaRPr lang="de-DE"/>
           </a:p>
         </c:txPr>
-        <c:crossAx val="249620560"/>
+        <c:crossAx val="229937360"/>
         <c:crosses val="autoZero"/>
         <c:auto val="1"/>
         <c:lblAlgn val="ctr"/>
@@ -9746,7 +9746,7 @@
         <c:noMultiLvlLbl val="0"/>
       </c:catAx>
       <c:valAx>
-        <c:axId val="249620560"/>
+        <c:axId val="229937360"/>
         <c:scaling>
           <c:orientation val="minMax"/>
         </c:scaling>
@@ -9783,7 +9783,7 @@
             <a:endParaRPr lang="de-DE"/>
           </a:p>
         </c:txPr>
-        <c:crossAx val="249618880"/>
+        <c:crossAx val="229936800"/>
         <c:crosses val="autoZero"/>
         <c:crossBetween val="between"/>
       </c:valAx>
@@ -9996,7 +9996,7 @@
                   <c:v>Reflex(2)</c:v>
                 </c:pt>
                 <c:pt idx="1">
-                  <c:v>Alpha(3)</c:v>
+                  <c:v>Alpha(4)</c:v>
                 </c:pt>
                 <c:pt idx="2">
                   <c:v>Draw</c:v>
@@ -10034,11 +10034,11 @@
         </c:dLbls>
         <c:gapWidth val="50"/>
         <c:overlap val="-27"/>
-        <c:axId val="249626720"/>
-        <c:axId val="249627280"/>
+        <c:axId val="227504208"/>
+        <c:axId val="230519792"/>
       </c:barChart>
       <c:catAx>
-        <c:axId val="249626720"/>
+        <c:axId val="227504208"/>
         <c:scaling>
           <c:orientation val="minMax"/>
         </c:scaling>
@@ -10081,7 +10081,7 @@
             <a:endParaRPr lang="de-DE"/>
           </a:p>
         </c:txPr>
-        <c:crossAx val="249627280"/>
+        <c:crossAx val="230519792"/>
         <c:crosses val="autoZero"/>
         <c:auto val="1"/>
         <c:lblAlgn val="ctr"/>
@@ -10089,7 +10089,7 @@
         <c:noMultiLvlLbl val="0"/>
       </c:catAx>
       <c:valAx>
-        <c:axId val="249627280"/>
+        <c:axId val="230519792"/>
         <c:scaling>
           <c:orientation val="minMax"/>
         </c:scaling>
@@ -10126,7 +10126,7 @@
             <a:endParaRPr lang="de-DE"/>
           </a:p>
         </c:txPr>
-        <c:crossAx val="249626720"/>
+        <c:crossAx val="227504208"/>
         <c:crosses val="autoZero"/>
         <c:crossBetween val="between"/>
       </c:valAx>
@@ -10372,11 +10372,11 @@
         </c:dLbls>
         <c:gapWidth val="50"/>
         <c:overlap val="-27"/>
-        <c:axId val="249629520"/>
-        <c:axId val="249630080"/>
+        <c:axId val="230522032"/>
+        <c:axId val="230522592"/>
       </c:barChart>
       <c:catAx>
-        <c:axId val="249629520"/>
+        <c:axId val="230522032"/>
         <c:scaling>
           <c:orientation val="minMax"/>
         </c:scaling>
@@ -10419,7 +10419,7 @@
             <a:endParaRPr lang="de-DE"/>
           </a:p>
         </c:txPr>
-        <c:crossAx val="249630080"/>
+        <c:crossAx val="230522592"/>
         <c:crosses val="autoZero"/>
         <c:auto val="1"/>
         <c:lblAlgn val="ctr"/>
@@ -10427,7 +10427,7 @@
         <c:noMultiLvlLbl val="0"/>
       </c:catAx>
       <c:valAx>
-        <c:axId val="249630080"/>
+        <c:axId val="230522592"/>
         <c:scaling>
           <c:orientation val="minMax"/>
         </c:scaling>
@@ -10464,7 +10464,7 @@
             <a:endParaRPr lang="de-DE"/>
           </a:p>
         </c:txPr>
-        <c:crossAx val="249629520"/>
+        <c:crossAx val="230522032"/>
         <c:crosses val="autoZero"/>
         <c:crossBetween val="between"/>
       </c:valAx>
@@ -10711,11 +10711,11 @@
         </c:dLbls>
         <c:gapWidth val="50"/>
         <c:overlap val="-27"/>
-        <c:axId val="249632320"/>
-        <c:axId val="249632880"/>
+        <c:axId val="230524832"/>
+        <c:axId val="230525392"/>
       </c:barChart>
       <c:catAx>
-        <c:axId val="249632320"/>
+        <c:axId val="230524832"/>
         <c:scaling>
           <c:orientation val="minMax"/>
         </c:scaling>
@@ -10758,7 +10758,7 @@
             <a:endParaRPr lang="de-DE"/>
           </a:p>
         </c:txPr>
-        <c:crossAx val="249632880"/>
+        <c:crossAx val="230525392"/>
         <c:crosses val="autoZero"/>
         <c:auto val="1"/>
         <c:lblAlgn val="ctr"/>
@@ -10766,7 +10766,7 @@
         <c:noMultiLvlLbl val="0"/>
       </c:catAx>
       <c:valAx>
-        <c:axId val="249632880"/>
+        <c:axId val="230525392"/>
         <c:scaling>
           <c:orientation val="minMax"/>
         </c:scaling>
@@ -10803,7 +10803,7 @@
             <a:endParaRPr lang="de-DE"/>
           </a:p>
         </c:txPr>
-        <c:crossAx val="249632320"/>
+        <c:crossAx val="230524832"/>
         <c:crosses val="autoZero"/>
         <c:crossBetween val="between"/>
       </c:valAx>
@@ -11054,11 +11054,11 @@
         </c:dLbls>
         <c:gapWidth val="50"/>
         <c:overlap val="-27"/>
-        <c:axId val="170012032"/>
-        <c:axId val="174618896"/>
+        <c:axId val="226496960"/>
+        <c:axId val="226497520"/>
       </c:barChart>
       <c:catAx>
-        <c:axId val="170012032"/>
+        <c:axId val="226496960"/>
         <c:scaling>
           <c:orientation val="minMax"/>
         </c:scaling>
@@ -11101,7 +11101,7 @@
             <a:endParaRPr lang="de-DE"/>
           </a:p>
         </c:txPr>
-        <c:crossAx val="174618896"/>
+        <c:crossAx val="226497520"/>
         <c:crosses val="autoZero"/>
         <c:auto val="1"/>
         <c:lblAlgn val="ctr"/>
@@ -11109,7 +11109,7 @@
         <c:noMultiLvlLbl val="0"/>
       </c:catAx>
       <c:valAx>
-        <c:axId val="174618896"/>
+        <c:axId val="226497520"/>
         <c:scaling>
           <c:orientation val="minMax"/>
         </c:scaling>
@@ -11146,7 +11146,7 @@
             <a:endParaRPr lang="de-DE"/>
           </a:p>
         </c:txPr>
-        <c:crossAx val="170012032"/>
+        <c:crossAx val="226496960"/>
         <c:crosses val="autoZero"/>
         <c:crossBetween val="between"/>
       </c:valAx>
@@ -11397,11 +11397,11 @@
         </c:dLbls>
         <c:gapWidth val="50"/>
         <c:overlap val="-27"/>
-        <c:axId val="248371920"/>
-        <c:axId val="248372480"/>
+        <c:axId val="227488528"/>
+        <c:axId val="227489088"/>
       </c:barChart>
       <c:catAx>
-        <c:axId val="248371920"/>
+        <c:axId val="227488528"/>
         <c:scaling>
           <c:orientation val="minMax"/>
         </c:scaling>
@@ -11444,7 +11444,7 @@
             <a:endParaRPr lang="de-DE"/>
           </a:p>
         </c:txPr>
-        <c:crossAx val="248372480"/>
+        <c:crossAx val="227489088"/>
         <c:crosses val="autoZero"/>
         <c:auto val="1"/>
         <c:lblAlgn val="ctr"/>
@@ -11452,7 +11452,7 @@
         <c:noMultiLvlLbl val="0"/>
       </c:catAx>
       <c:valAx>
-        <c:axId val="248372480"/>
+        <c:axId val="227489088"/>
         <c:scaling>
           <c:orientation val="minMax"/>
         </c:scaling>
@@ -11489,7 +11489,7 @@
             <a:endParaRPr lang="de-DE"/>
           </a:p>
         </c:txPr>
-        <c:crossAx val="248371920"/>
+        <c:crossAx val="227488528"/>
         <c:crosses val="autoZero"/>
         <c:crossBetween val="between"/>
       </c:valAx>
@@ -11740,11 +11740,11 @@
         </c:dLbls>
         <c:gapWidth val="50"/>
         <c:overlap val="-27"/>
-        <c:axId val="248374720"/>
-        <c:axId val="248375280"/>
+        <c:axId val="227491328"/>
+        <c:axId val="227491888"/>
       </c:barChart>
       <c:catAx>
-        <c:axId val="248374720"/>
+        <c:axId val="227491328"/>
         <c:scaling>
           <c:orientation val="minMax"/>
         </c:scaling>
@@ -11787,7 +11787,7 @@
             <a:endParaRPr lang="de-DE"/>
           </a:p>
         </c:txPr>
-        <c:crossAx val="248375280"/>
+        <c:crossAx val="227491888"/>
         <c:crosses val="autoZero"/>
         <c:auto val="1"/>
         <c:lblAlgn val="ctr"/>
@@ -11795,7 +11795,7 @@
         <c:noMultiLvlLbl val="0"/>
       </c:catAx>
       <c:valAx>
-        <c:axId val="248375280"/>
+        <c:axId val="227491888"/>
         <c:scaling>
           <c:orientation val="minMax"/>
         </c:scaling>
@@ -11832,7 +11832,7 @@
             <a:endParaRPr lang="de-DE"/>
           </a:p>
         </c:txPr>
-        <c:crossAx val="248374720"/>
+        <c:crossAx val="227491328"/>
         <c:crosses val="autoZero"/>
         <c:crossBetween val="between"/>
       </c:valAx>
@@ -12083,11 +12083,11 @@
         </c:dLbls>
         <c:gapWidth val="50"/>
         <c:overlap val="-27"/>
-        <c:axId val="248377520"/>
-        <c:axId val="248378080"/>
+        <c:axId val="227494128"/>
+        <c:axId val="227494688"/>
       </c:barChart>
       <c:catAx>
-        <c:axId val="248377520"/>
+        <c:axId val="227494128"/>
         <c:scaling>
           <c:orientation val="minMax"/>
         </c:scaling>
@@ -12130,7 +12130,7 @@
             <a:endParaRPr lang="de-DE"/>
           </a:p>
         </c:txPr>
-        <c:crossAx val="248378080"/>
+        <c:crossAx val="227494688"/>
         <c:crosses val="autoZero"/>
         <c:auto val="1"/>
         <c:lblAlgn val="ctr"/>
@@ -12138,7 +12138,7 @@
         <c:noMultiLvlLbl val="0"/>
       </c:catAx>
       <c:valAx>
-        <c:axId val="248378080"/>
+        <c:axId val="227494688"/>
         <c:scaling>
           <c:orientation val="minMax"/>
         </c:scaling>
@@ -12175,7 +12175,7 @@
             <a:endParaRPr lang="de-DE"/>
           </a:p>
         </c:txPr>
-        <c:crossAx val="248377520"/>
+        <c:crossAx val="227494128"/>
         <c:crosses val="autoZero"/>
         <c:crossBetween val="between"/>
       </c:valAx>
@@ -12426,11 +12426,11 @@
         </c:dLbls>
         <c:gapWidth val="50"/>
         <c:overlap val="-27"/>
-        <c:axId val="248382560"/>
-        <c:axId val="248383120"/>
+        <c:axId val="151872432"/>
+        <c:axId val="151872992"/>
       </c:barChart>
       <c:catAx>
-        <c:axId val="248382560"/>
+        <c:axId val="151872432"/>
         <c:scaling>
           <c:orientation val="minMax"/>
         </c:scaling>
@@ -12473,7 +12473,7 @@
             <a:endParaRPr lang="de-DE"/>
           </a:p>
         </c:txPr>
-        <c:crossAx val="248383120"/>
+        <c:crossAx val="151872992"/>
         <c:crosses val="autoZero"/>
         <c:auto val="1"/>
         <c:lblAlgn val="ctr"/>
@@ -12481,7 +12481,7 @@
         <c:noMultiLvlLbl val="0"/>
       </c:catAx>
       <c:valAx>
-        <c:axId val="248383120"/>
+        <c:axId val="151872992"/>
         <c:scaling>
           <c:orientation val="minMax"/>
         </c:scaling>
@@ -12518,7 +12518,7 @@
             <a:endParaRPr lang="de-DE"/>
           </a:p>
         </c:txPr>
-        <c:crossAx val="248382560"/>
+        <c:crossAx val="151872432"/>
         <c:crosses val="autoZero"/>
         <c:crossBetween val="between"/>
       </c:valAx>
@@ -12773,11 +12773,11 @@
         </c:dLbls>
         <c:gapWidth val="50"/>
         <c:overlap val="-27"/>
-        <c:axId val="248385360"/>
-        <c:axId val="248385920"/>
+        <c:axId val="151875232"/>
+        <c:axId val="151875792"/>
       </c:barChart>
       <c:catAx>
-        <c:axId val="248385360"/>
+        <c:axId val="151875232"/>
         <c:scaling>
           <c:orientation val="minMax"/>
         </c:scaling>
@@ -12820,7 +12820,7 @@
             <a:endParaRPr lang="de-DE"/>
           </a:p>
         </c:txPr>
-        <c:crossAx val="248385920"/>
+        <c:crossAx val="151875792"/>
         <c:crosses val="autoZero"/>
         <c:auto val="1"/>
         <c:lblAlgn val="ctr"/>
@@ -12828,7 +12828,7 @@
         <c:noMultiLvlLbl val="0"/>
       </c:catAx>
       <c:valAx>
-        <c:axId val="248385920"/>
+        <c:axId val="151875792"/>
         <c:scaling>
           <c:orientation val="minMax"/>
         </c:scaling>
@@ -12865,7 +12865,7 @@
             <a:endParaRPr lang="de-DE"/>
           </a:p>
         </c:txPr>
-        <c:crossAx val="248385360"/>
+        <c:crossAx val="151875232"/>
         <c:crosses val="autoZero"/>
         <c:crossBetween val="between"/>
       </c:valAx>
@@ -33090,7 +33090,7 @@
           <a:p>
             <a:fld id="{2F9ACA95-1F7E-40AB-98C2-525508467FA4}" type="datetimeFigureOut">
               <a:rPr lang="de-DE" smtClean="0"/>
-              <a:t>01.12.2016</a:t>
+              <a:t>02.12.2016</a:t>
             </a:fld>
             <a:endParaRPr lang="de-DE"/>
           </a:p>
@@ -33771,7 +33771,7 @@
           <a:p>
             <a:fld id="{FFB9B448-9D56-4847-9449-FEA23C208484}" type="datetime1">
               <a:rPr lang="de-DE" smtClean="0"/>
-              <a:t>01.12.2016</a:t>
+              <a:t>02.12.2016</a:t>
             </a:fld>
             <a:endParaRPr lang="de-DE"/>
           </a:p>
@@ -34056,7 +34056,7 @@
           <a:p>
             <a:fld id="{D5101F55-84DD-4CC8-9DC5-A961225D8AD0}" type="datetime1">
               <a:rPr lang="de-DE" smtClean="0"/>
-              <a:t>01.12.2016</a:t>
+              <a:t>02.12.2016</a:t>
             </a:fld>
             <a:endParaRPr lang="de-DE"/>
           </a:p>
@@ -34250,7 +34250,7 @@
           <a:p>
             <a:fld id="{1DF941D6-187C-4382-AA25-C433F49CFDE9}" type="datetime1">
               <a:rPr lang="de-DE" smtClean="0"/>
-              <a:t>01.12.2016</a:t>
+              <a:t>02.12.2016</a:t>
             </a:fld>
             <a:endParaRPr lang="de-DE"/>
           </a:p>
@@ -34523,7 +34523,7 @@
           <a:p>
             <a:fld id="{D7C252ED-C230-4A26-B3C4-0B552D630415}" type="datetime1">
               <a:rPr lang="de-DE" smtClean="0"/>
-              <a:t>01.12.2016</a:t>
+              <a:t>02.12.2016</a:t>
             </a:fld>
             <a:endParaRPr lang="de-DE"/>
           </a:p>
@@ -34864,7 +34864,7 @@
           <a:p>
             <a:fld id="{66EDD134-AFB6-44CF-BF5E-9AA63954F15F}" type="datetime1">
               <a:rPr lang="de-DE" smtClean="0"/>
-              <a:t>01.12.2016</a:t>
+              <a:t>02.12.2016</a:t>
             </a:fld>
             <a:endParaRPr lang="de-DE"/>
           </a:p>
@@ -35487,7 +35487,7 @@
           <a:p>
             <a:fld id="{15B35619-9EBD-4CE2-B9AB-29B9A9708D56}" type="datetime1">
               <a:rPr lang="de-DE" smtClean="0"/>
-              <a:t>01.12.2016</a:t>
+              <a:t>02.12.2016</a:t>
             </a:fld>
             <a:endParaRPr lang="de-DE"/>
           </a:p>
@@ -36347,7 +36347,7 @@
           <a:p>
             <a:fld id="{F779AAE1-DA64-4553-8450-F76990E95D17}" type="datetime1">
               <a:rPr lang="de-DE" smtClean="0"/>
-              <a:t>01.12.2016</a:t>
+              <a:t>02.12.2016</a:t>
             </a:fld>
             <a:endParaRPr lang="de-DE"/>
           </a:p>
@@ -36517,7 +36517,7 @@
           <a:p>
             <a:fld id="{C070D5ED-9C58-444B-A9F3-09364A72AAA6}" type="datetime1">
               <a:rPr lang="de-DE" smtClean="0"/>
-              <a:t>01.12.2016</a:t>
+              <a:t>02.12.2016</a:t>
             </a:fld>
             <a:endParaRPr lang="de-DE"/>
           </a:p>
@@ -36697,7 +36697,7 @@
           <a:p>
             <a:fld id="{9CC4B844-5603-498E-8854-01FDF44E05A3}" type="datetime1">
               <a:rPr lang="de-DE" smtClean="0"/>
-              <a:t>01.12.2016</a:t>
+              <a:t>02.12.2016</a:t>
             </a:fld>
             <a:endParaRPr lang="de-DE"/>
           </a:p>
@@ -36914,7 +36914,7 @@
           <a:p>
             <a:fld id="{62A8A28E-B5F5-41EE-B009-8D872471EF33}" type="datetime1">
               <a:rPr lang="de-DE" smtClean="0"/>
-              <a:t>01.12.2016</a:t>
+              <a:t>02.12.2016</a:t>
             </a:fld>
             <a:endParaRPr lang="de-DE"/>
           </a:p>
@@ -37207,7 +37207,7 @@
           <a:p>
             <a:fld id="{C668A2FC-1D94-4AFD-B13A-264307E66F0E}" type="datetime1">
               <a:rPr lang="de-DE" smtClean="0"/>
-              <a:t>01.12.2016</a:t>
+              <a:t>02.12.2016</a:t>
             </a:fld>
             <a:endParaRPr lang="de-DE"/>
           </a:p>
@@ -37499,7 +37499,7 @@
           <a:p>
             <a:fld id="{2392C0AE-0F7D-4F53-A2FC-117257E6363C}" type="datetime1">
               <a:rPr lang="de-DE" smtClean="0"/>
-              <a:t>01.12.2016</a:t>
+              <a:t>02.12.2016</a:t>
             </a:fld>
             <a:endParaRPr lang="de-DE"/>
           </a:p>
@@ -37943,7 +37943,7 @@
           <a:p>
             <a:fld id="{024A5A3D-FE15-4E66-B8EF-993BEB944775}" type="datetime1">
               <a:rPr lang="de-DE" smtClean="0"/>
-              <a:t>01.12.2016</a:t>
+              <a:t>02.12.2016</a:t>
             </a:fld>
             <a:endParaRPr lang="de-DE"/>
           </a:p>
@@ -38061,7 +38061,7 @@
           <a:p>
             <a:fld id="{00286FA3-E64C-4EE7-A4EB-8F83E8E9A7CE}" type="datetime1">
               <a:rPr lang="de-DE" smtClean="0"/>
-              <a:t>01.12.2016</a:t>
+              <a:t>02.12.2016</a:t>
             </a:fld>
             <a:endParaRPr lang="de-DE"/>
           </a:p>
@@ -38156,7 +38156,7 @@
           <a:p>
             <a:fld id="{0815E655-9175-41F2-86F9-456F81B03D6B}" type="datetime1">
               <a:rPr lang="de-DE" smtClean="0"/>
-              <a:t>01.12.2016</a:t>
+              <a:t>02.12.2016</a:t>
             </a:fld>
             <a:endParaRPr lang="de-DE"/>
           </a:p>
@@ -38435,7 +38435,7 @@
           <a:p>
             <a:fld id="{6109BDD6-B3C4-4BA6-9B0A-C065E0514132}" type="datetime1">
               <a:rPr lang="de-DE" smtClean="0"/>
-              <a:t>01.12.2016</a:t>
+              <a:t>02.12.2016</a:t>
             </a:fld>
             <a:endParaRPr lang="de-DE"/>
           </a:p>
@@ -38710,7 +38710,7 @@
           <a:p>
             <a:fld id="{1350D439-E1FF-4A10-8D0F-32AF8651CAFC}" type="datetime1">
               <a:rPr lang="de-DE" smtClean="0"/>
-              <a:t>01.12.2016</a:t>
+              <a:t>02.12.2016</a:t>
             </a:fld>
             <a:endParaRPr lang="de-DE"/>
           </a:p>
@@ -39139,7 +39139,7 @@
           <a:p>
             <a:fld id="{3B8CB95F-FF94-40FD-9011-74B5D39A5779}" type="datetime1">
               <a:rPr lang="de-DE" smtClean="0"/>
-              <a:t>01.12.2016</a:t>
+              <a:t>02.12.2016</a:t>
             </a:fld>
             <a:endParaRPr lang="de-DE"/>
           </a:p>
@@ -39710,7 +39710,19 @@
           <a:p>
             <a:r>
               <a:rPr lang="de-DE" dirty="0" smtClean="0"/>
-              <a:t>Aufgabe 1</a:t>
+              <a:t>Aufgabe 1 – Tic </a:t>
+            </a:r>
+            <a:r>
+              <a:rPr lang="de-DE" dirty="0" err="1" smtClean="0"/>
+              <a:t>tac</a:t>
+            </a:r>
+            <a:r>
+              <a:rPr lang="de-DE" dirty="0" smtClean="0"/>
+              <a:t> </a:t>
+            </a:r>
+            <a:r>
+              <a:rPr lang="de-DE" dirty="0" err="1" smtClean="0"/>
+              <a:t>toe</a:t>
             </a:r>
             <a:endParaRPr lang="de-DE" dirty="0"/>
           </a:p>
@@ -39733,7 +39745,7 @@
           <a:p>
             <a:fld id="{BCC8CF4D-1F15-45F0-B9F6-88473EBEFC5A}" type="datetime1">
               <a:rPr lang="de-DE" smtClean="0"/>
-              <a:t>01.12.2016</a:t>
+              <a:t>02.12.2016</a:t>
             </a:fld>
             <a:endParaRPr lang="de-DE"/>
           </a:p>
@@ -39904,7 +39916,7 @@
           <a:p>
             <a:fld id="{62A8A28E-B5F5-41EE-B009-8D872471EF33}" type="datetime1">
               <a:rPr lang="de-DE" smtClean="0"/>
-              <a:t>01.12.2016</a:t>
+              <a:t>02.12.2016</a:t>
             </a:fld>
             <a:endParaRPr lang="de-DE"/>
           </a:p>
@@ -40164,7 +40176,7 @@
           <a:p>
             <a:fld id="{62A8A28E-B5F5-41EE-B009-8D872471EF33}" type="datetime1">
               <a:rPr lang="de-DE" smtClean="0"/>
-              <a:t>01.12.2016</a:t>
+              <a:t>02.12.2016</a:t>
             </a:fld>
             <a:endParaRPr lang="de-DE"/>
           </a:p>
@@ -40379,6 +40391,13 @@
   <p:clrMapOvr>
     <a:masterClrMapping/>
   </p:clrMapOvr>
+  <p:timing>
+    <p:tnLst>
+      <p:par>
+        <p:cTn id="1" dur="indefinite" restart="never" nodeType="tmRoot"/>
+      </p:par>
+    </p:tnLst>
+  </p:timing>
 </p:sld>
 </file>
 
@@ -40439,7 +40458,7 @@
           <a:p>
             <a:fld id="{62A8A28E-B5F5-41EE-B009-8D872471EF33}" type="datetime1">
               <a:rPr lang="de-DE" smtClean="0"/>
-              <a:t>01.12.2016</a:t>
+              <a:t>02.12.2016</a:t>
             </a:fld>
             <a:endParaRPr lang="de-DE"/>
           </a:p>
@@ -40654,6 +40673,13 @@
   <p:clrMapOvr>
     <a:masterClrMapping/>
   </p:clrMapOvr>
+  <p:timing>
+    <p:tnLst>
+      <p:par>
+        <p:cTn id="1" dur="indefinite" restart="never" nodeType="tmRoot"/>
+      </p:par>
+    </p:tnLst>
+  </p:timing>
 </p:sld>
 </file>
 
@@ -40714,7 +40740,7 @@
           <a:p>
             <a:fld id="{62A8A28E-B5F5-41EE-B009-8D872471EF33}" type="datetime1">
               <a:rPr lang="de-DE" smtClean="0"/>
-              <a:t>01.12.2016</a:t>
+              <a:t>02.12.2016</a:t>
             </a:fld>
             <a:endParaRPr lang="de-DE"/>
           </a:p>
@@ -40929,6 +40955,13 @@
   <p:clrMapOvr>
     <a:masterClrMapping/>
   </p:clrMapOvr>
+  <p:timing>
+    <p:tnLst>
+      <p:par>
+        <p:cTn id="1" dur="indefinite" restart="never" nodeType="tmRoot"/>
+      </p:par>
+    </p:tnLst>
+  </p:timing>
 </p:sld>
 </file>
 
@@ -40989,7 +41022,7 @@
           <a:p>
             <a:fld id="{62A8A28E-B5F5-41EE-B009-8D872471EF33}" type="datetime1">
               <a:rPr lang="de-DE" smtClean="0"/>
-              <a:t>01.12.2016</a:t>
+              <a:t>02.12.2016</a:t>
             </a:fld>
             <a:endParaRPr lang="de-DE"/>
           </a:p>
@@ -41204,6 +41237,13 @@
   <p:clrMapOvr>
     <a:masterClrMapping/>
   </p:clrMapOvr>
+  <p:timing>
+    <p:tnLst>
+      <p:par>
+        <p:cTn id="1" dur="indefinite" restart="never" nodeType="tmRoot"/>
+      </p:par>
+    </p:tnLst>
+  </p:timing>
 </p:sld>
 </file>
 
@@ -41264,7 +41304,7 @@
           <a:p>
             <a:fld id="{62A8A28E-B5F5-41EE-B009-8D872471EF33}" type="datetime1">
               <a:rPr lang="de-DE" smtClean="0"/>
-              <a:t>01.12.2016</a:t>
+              <a:t>02.12.2016</a:t>
             </a:fld>
             <a:endParaRPr lang="de-DE"/>
           </a:p>
@@ -41539,6 +41579,13 @@
   <p:clrMapOvr>
     <a:masterClrMapping/>
   </p:clrMapOvr>
+  <p:timing>
+    <p:tnLst>
+      <p:par>
+        <p:cTn id="1" dur="indefinite" restart="never" nodeType="tmRoot"/>
+      </p:par>
+    </p:tnLst>
+  </p:timing>
 </p:sld>
 </file>
 
@@ -41599,7 +41646,7 @@
           <a:p>
             <a:fld id="{62A8A28E-B5F5-41EE-B009-8D872471EF33}" type="datetime1">
               <a:rPr lang="de-DE" smtClean="0"/>
-              <a:t>01.12.2016</a:t>
+              <a:t>02.12.2016</a:t>
             </a:fld>
             <a:endParaRPr lang="de-DE"/>
           </a:p>
@@ -41723,7 +41770,7 @@
           <p:nvPr>
             <p:extLst>
               <p:ext uri="{D42A27DB-BD31-4B8C-83A1-F6EECF244321}">
-                <p14:modId xmlns:p14="http://schemas.microsoft.com/office/powerpoint/2010/main" val="1352215307"/>
+                <p14:modId xmlns:p14="http://schemas.microsoft.com/office/powerpoint/2010/main" val="772662701"/>
               </p:ext>
             </p:extLst>
           </p:nvPr>
@@ -41745,7 +41792,7 @@
           <p:nvPr>
             <p:extLst>
               <p:ext uri="{D42A27DB-BD31-4B8C-83A1-F6EECF244321}">
-                <p14:modId xmlns:p14="http://schemas.microsoft.com/office/powerpoint/2010/main" val="3104720467"/>
+                <p14:modId xmlns:p14="http://schemas.microsoft.com/office/powerpoint/2010/main" val="3897664898"/>
               </p:ext>
             </p:extLst>
           </p:nvPr>
@@ -41874,6 +41921,13 @@
   <p:clrMapOvr>
     <a:masterClrMapping/>
   </p:clrMapOvr>
+  <p:timing>
+    <p:tnLst>
+      <p:par>
+        <p:cTn id="1" dur="indefinite" restart="never" nodeType="tmRoot"/>
+      </p:par>
+    </p:tnLst>
+  </p:timing>
 </p:sld>
 </file>
 
@@ -41966,7 +42020,7 @@
           <a:p>
             <a:fld id="{62A8A28E-B5F5-41EE-B009-8D872471EF33}" type="datetime1">
               <a:rPr lang="de-DE" smtClean="0"/>
-              <a:t>01.12.2016</a:t>
+              <a:t>02.12.2016</a:t>
             </a:fld>
             <a:endParaRPr lang="de-DE"/>
           </a:p>
@@ -42049,6 +42103,13 @@
   <p:clrMapOvr>
     <a:masterClrMapping/>
   </p:clrMapOvr>
+  <p:timing>
+    <p:tnLst>
+      <p:par>
+        <p:cTn id="1" dur="indefinite" restart="never" nodeType="tmRoot"/>
+      </p:par>
+    </p:tnLst>
+  </p:timing>
 </p:sld>
 </file>
 
@@ -42119,7 +42180,7 @@
           <a:p>
             <a:fld id="{62A8A28E-B5F5-41EE-B009-8D872471EF33}" type="datetime1">
               <a:rPr lang="de-DE" smtClean="0"/>
-              <a:t>01.12.2016</a:t>
+              <a:t>02.12.2016</a:t>
             </a:fld>
             <a:endParaRPr lang="de-DE"/>
           </a:p>
@@ -42235,6 +42296,13 @@
   <p:clrMapOvr>
     <a:masterClrMapping/>
   </p:clrMapOvr>
+  <p:timing>
+    <p:tnLst>
+      <p:par>
+        <p:cTn id="1" dur="indefinite" restart="never" nodeType="tmRoot"/>
+      </p:par>
+    </p:tnLst>
+  </p:timing>
 </p:sld>
 </file>
 
@@ -42295,7 +42363,7 @@
           <a:p>
             <a:fld id="{62A8A28E-B5F5-41EE-B009-8D872471EF33}" type="datetime1">
               <a:rPr lang="de-DE" smtClean="0"/>
-              <a:t>01.12.2016</a:t>
+              <a:t>02.12.2016</a:t>
             </a:fld>
             <a:endParaRPr lang="de-DE"/>
           </a:p>
@@ -42393,7 +42461,7 @@
         <p:spPr>
           <a:xfrm>
             <a:off x="478230" y="1063416"/>
-            <a:ext cx="9783872" cy="5262979"/>
+            <a:ext cx="9783872" cy="2800767"/>
           </a:xfrm>
           <a:prstGeom prst="rect">
             <a:avLst/>
@@ -42464,649 +42532,326 @@
             </a:r>
           </a:p>
           <a:p>
-            <a:pPr lvl="1"/>
-            <a:r>
-              <a:rPr lang="de-DE" sz="1600" dirty="0" smtClean="0">
-                <a:latin typeface="Consolas" panose="020B0609020204030204" pitchFamily="49" charset="0"/>
-                <a:cs typeface="Consolas" panose="020B0609020204030204" pitchFamily="49" charset="0"/>
-              </a:rPr>
-              <a:t>List&lt;Move&gt; </a:t>
-            </a:r>
-            <a:r>
-              <a:rPr lang="de-DE" sz="1600" dirty="0" err="1" smtClean="0">
-                <a:latin typeface="Consolas" panose="020B0609020204030204" pitchFamily="49" charset="0"/>
-                <a:cs typeface="Consolas" panose="020B0609020204030204" pitchFamily="49" charset="0"/>
-              </a:rPr>
-              <a:t>triedMoves</a:t>
-            </a:r>
-            <a:r>
-              <a:rPr lang="de-DE" sz="1600" dirty="0" smtClean="0">
-                <a:latin typeface="Consolas" panose="020B0609020204030204" pitchFamily="49" charset="0"/>
-                <a:cs typeface="Consolas" panose="020B0609020204030204" pitchFamily="49" charset="0"/>
-              </a:rPr>
-              <a:t> = </a:t>
-            </a:r>
-            <a:r>
-              <a:rPr lang="de-DE" sz="1600" dirty="0" err="1" smtClean="0">
-                <a:latin typeface="Consolas" panose="020B0609020204030204" pitchFamily="49" charset="0"/>
-                <a:cs typeface="Consolas" panose="020B0609020204030204" pitchFamily="49" charset="0"/>
-              </a:rPr>
-              <a:t>new</a:t>
-            </a:r>
-            <a:r>
-              <a:rPr lang="de-DE" sz="1600" dirty="0" smtClean="0">
-                <a:latin typeface="Consolas" panose="020B0609020204030204" pitchFamily="49" charset="0"/>
-                <a:cs typeface="Consolas" panose="020B0609020204030204" pitchFamily="49" charset="0"/>
-              </a:rPr>
-              <a:t> </a:t>
-            </a:r>
-            <a:r>
-              <a:rPr lang="de-DE" sz="1600" dirty="0" err="1" smtClean="0">
-                <a:latin typeface="Consolas" panose="020B0609020204030204" pitchFamily="49" charset="0"/>
-                <a:cs typeface="Consolas" panose="020B0609020204030204" pitchFamily="49" charset="0"/>
-              </a:rPr>
-              <a:t>ArrayList</a:t>
-            </a:r>
-            <a:r>
-              <a:rPr lang="de-DE" sz="1600" dirty="0" smtClean="0">
-                <a:latin typeface="Consolas" panose="020B0609020204030204" pitchFamily="49" charset="0"/>
-                <a:cs typeface="Consolas" panose="020B0609020204030204" pitchFamily="49" charset="0"/>
-              </a:rPr>
-              <a:t>&lt;Move&gt;();</a:t>
-            </a:r>
-          </a:p>
-          <a:p>
-            <a:pPr lvl="1"/>
-            <a:r>
-              <a:rPr lang="de-DE" sz="1600" dirty="0" err="1" smtClean="0">
-                <a:latin typeface="Consolas" panose="020B0609020204030204" pitchFamily="49" charset="0"/>
-                <a:cs typeface="Consolas" panose="020B0609020204030204" pitchFamily="49" charset="0"/>
-              </a:rPr>
-              <a:t>int</a:t>
-            </a:r>
-            <a:r>
-              <a:rPr lang="de-DE" sz="1600" dirty="0" smtClean="0">
-                <a:latin typeface="Consolas" panose="020B0609020204030204" pitchFamily="49" charset="0"/>
-                <a:cs typeface="Consolas" panose="020B0609020204030204" pitchFamily="49" charset="0"/>
-              </a:rPr>
-              <a:t> i, j;</a:t>
-            </a:r>
-          </a:p>
-          <a:p>
-            <a:pPr lvl="1"/>
-            <a:r>
-              <a:rPr lang="de-DE" sz="1600" dirty="0" err="1" smtClean="0">
-                <a:latin typeface="Consolas" panose="020B0609020204030204" pitchFamily="49" charset="0"/>
-                <a:cs typeface="Consolas" panose="020B0609020204030204" pitchFamily="49" charset="0"/>
-              </a:rPr>
-              <a:t>int</a:t>
-            </a:r>
-            <a:r>
-              <a:rPr lang="de-DE" sz="1600" dirty="0" smtClean="0">
-                <a:latin typeface="Consolas" panose="020B0609020204030204" pitchFamily="49" charset="0"/>
-                <a:cs typeface="Consolas" panose="020B0609020204030204" pitchFamily="49" charset="0"/>
-              </a:rPr>
-              <a:t> </a:t>
-            </a:r>
-            <a:r>
-              <a:rPr lang="de-DE" sz="1600" dirty="0" err="1" smtClean="0">
-                <a:latin typeface="Consolas" panose="020B0609020204030204" pitchFamily="49" charset="0"/>
-                <a:cs typeface="Consolas" panose="020B0609020204030204" pitchFamily="49" charset="0"/>
-              </a:rPr>
-              <a:t>maxIndex</a:t>
-            </a:r>
-            <a:r>
-              <a:rPr lang="de-DE" sz="1600" dirty="0" smtClean="0">
-                <a:latin typeface="Consolas" panose="020B0609020204030204" pitchFamily="49" charset="0"/>
-                <a:cs typeface="Consolas" panose="020B0609020204030204" pitchFamily="49" charset="0"/>
-              </a:rPr>
-              <a:t> = (</a:t>
-            </a:r>
-            <a:r>
-              <a:rPr lang="de-DE" sz="1600" dirty="0" err="1" smtClean="0">
-                <a:latin typeface="Consolas" panose="020B0609020204030204" pitchFamily="49" charset="0"/>
-                <a:cs typeface="Consolas" panose="020B0609020204030204" pitchFamily="49" charset="0"/>
-              </a:rPr>
-              <a:t>board.getSize</a:t>
-            </a:r>
-            <a:r>
-              <a:rPr lang="de-DE" sz="1600" dirty="0" smtClean="0">
-                <a:latin typeface="Consolas" panose="020B0609020204030204" pitchFamily="49" charset="0"/>
-                <a:cs typeface="Consolas" panose="020B0609020204030204" pitchFamily="49" charset="0"/>
-              </a:rPr>
-              <a:t>() - 1);</a:t>
-            </a:r>
-          </a:p>
-          <a:p>
-            <a:pPr lvl="1"/>
-            <a:r>
-              <a:rPr lang="de-DE" sz="1600" dirty="0" err="1" smtClean="0">
-                <a:latin typeface="Consolas" panose="020B0609020204030204" pitchFamily="49" charset="0"/>
-                <a:cs typeface="Consolas" panose="020B0609020204030204" pitchFamily="49" charset="0"/>
-              </a:rPr>
-              <a:t>int</a:t>
-            </a:r>
-            <a:r>
-              <a:rPr lang="de-DE" sz="1600" dirty="0" smtClean="0">
-                <a:latin typeface="Consolas" panose="020B0609020204030204" pitchFamily="49" charset="0"/>
-                <a:cs typeface="Consolas" panose="020B0609020204030204" pitchFamily="49" charset="0"/>
-              </a:rPr>
-              <a:t> </a:t>
-            </a:r>
-            <a:r>
-              <a:rPr lang="de-DE" sz="1600" dirty="0" err="1" smtClean="0">
-                <a:latin typeface="Consolas" panose="020B0609020204030204" pitchFamily="49" charset="0"/>
-                <a:cs typeface="Consolas" panose="020B0609020204030204" pitchFamily="49" charset="0"/>
-              </a:rPr>
-              <a:t>maxTries</a:t>
-            </a:r>
-            <a:r>
-              <a:rPr lang="de-DE" sz="1600" dirty="0" smtClean="0">
-                <a:latin typeface="Consolas" panose="020B0609020204030204" pitchFamily="49" charset="0"/>
-                <a:cs typeface="Consolas" panose="020B0609020204030204" pitchFamily="49" charset="0"/>
-              </a:rPr>
-              <a:t> = (</a:t>
-            </a:r>
-            <a:r>
-              <a:rPr lang="de-DE" sz="1600" dirty="0" err="1" smtClean="0">
-                <a:latin typeface="Consolas" panose="020B0609020204030204" pitchFamily="49" charset="0"/>
-                <a:cs typeface="Consolas" panose="020B0609020204030204" pitchFamily="49" charset="0"/>
-              </a:rPr>
-              <a:t>board.getSize</a:t>
-            </a:r>
-            <a:r>
-              <a:rPr lang="de-DE" sz="1600" dirty="0" smtClean="0">
-                <a:latin typeface="Consolas" panose="020B0609020204030204" pitchFamily="49" charset="0"/>
-                <a:cs typeface="Consolas" panose="020B0609020204030204" pitchFamily="49" charset="0"/>
-              </a:rPr>
-              <a:t>()) * (</a:t>
-            </a:r>
-            <a:r>
-              <a:rPr lang="de-DE" sz="1600" dirty="0" err="1" smtClean="0">
-                <a:latin typeface="Consolas" panose="020B0609020204030204" pitchFamily="49" charset="0"/>
-                <a:cs typeface="Consolas" panose="020B0609020204030204" pitchFamily="49" charset="0"/>
-              </a:rPr>
-              <a:t>board.getSize</a:t>
-            </a:r>
-            <a:r>
-              <a:rPr lang="de-DE" sz="1600" dirty="0" smtClean="0">
-                <a:latin typeface="Consolas" panose="020B0609020204030204" pitchFamily="49" charset="0"/>
-                <a:cs typeface="Consolas" panose="020B0609020204030204" pitchFamily="49" charset="0"/>
-              </a:rPr>
-              <a:t>());</a:t>
-            </a:r>
-          </a:p>
-          <a:p>
-            <a:pPr lvl="1"/>
-            <a:r>
-              <a:rPr lang="de-DE" sz="1600" dirty="0" smtClean="0">
-                <a:latin typeface="Consolas" panose="020B0609020204030204" pitchFamily="49" charset="0"/>
-                <a:cs typeface="Consolas" panose="020B0609020204030204" pitchFamily="49" charset="0"/>
-              </a:rPr>
-              <a:t>do {</a:t>
-            </a:r>
-          </a:p>
-          <a:p>
-            <a:pPr lvl="2"/>
-            <a:r>
-              <a:rPr lang="de-DE" sz="1600" dirty="0" smtClean="0">
-                <a:latin typeface="Consolas" panose="020B0609020204030204" pitchFamily="49" charset="0"/>
-                <a:cs typeface="Consolas" panose="020B0609020204030204" pitchFamily="49" charset="0"/>
-              </a:rPr>
-              <a:t>Move </a:t>
-            </a:r>
-            <a:r>
-              <a:rPr lang="de-DE" sz="1600" dirty="0" err="1" smtClean="0">
-                <a:latin typeface="Consolas" panose="020B0609020204030204" pitchFamily="49" charset="0"/>
-                <a:cs typeface="Consolas" panose="020B0609020204030204" pitchFamily="49" charset="0"/>
-              </a:rPr>
-              <a:t>actMove</a:t>
-            </a:r>
-            <a:r>
-              <a:rPr lang="de-DE" sz="1600" dirty="0" smtClean="0">
-                <a:latin typeface="Consolas" panose="020B0609020204030204" pitchFamily="49" charset="0"/>
-                <a:cs typeface="Consolas" panose="020B0609020204030204" pitchFamily="49" charset="0"/>
-              </a:rPr>
-              <a:t>;</a:t>
-            </a:r>
-          </a:p>
-          <a:p>
-            <a:pPr lvl="2"/>
-            <a:r>
-              <a:rPr lang="de-DE" sz="1600" dirty="0" smtClean="0">
-                <a:latin typeface="Consolas" panose="020B0609020204030204" pitchFamily="49" charset="0"/>
-                <a:cs typeface="Consolas" panose="020B0609020204030204" pitchFamily="49" charset="0"/>
-              </a:rPr>
-              <a:t>do {</a:t>
-            </a:r>
-          </a:p>
-          <a:p>
-            <a:pPr lvl="3"/>
-            <a:r>
-              <a:rPr lang="de-DE" sz="1600" dirty="0" smtClean="0">
-                <a:latin typeface="Consolas" panose="020B0609020204030204" pitchFamily="49" charset="0"/>
-                <a:cs typeface="Consolas" panose="020B0609020204030204" pitchFamily="49" charset="0"/>
-              </a:rPr>
-              <a:t>i = (</a:t>
-            </a:r>
-            <a:r>
-              <a:rPr lang="de-DE" sz="1600" dirty="0" err="1" smtClean="0">
-                <a:latin typeface="Consolas" panose="020B0609020204030204" pitchFamily="49" charset="0"/>
-                <a:cs typeface="Consolas" panose="020B0609020204030204" pitchFamily="49" charset="0"/>
-              </a:rPr>
-              <a:t>int</a:t>
-            </a:r>
-            <a:r>
-              <a:rPr lang="de-DE" sz="1600" dirty="0" smtClean="0">
-                <a:latin typeface="Consolas" panose="020B0609020204030204" pitchFamily="49" charset="0"/>
-                <a:cs typeface="Consolas" panose="020B0609020204030204" pitchFamily="49" charset="0"/>
-              </a:rPr>
-              <a:t>) </a:t>
-            </a:r>
-            <a:r>
-              <a:rPr lang="de-DE" sz="1600" dirty="0" err="1" smtClean="0">
-                <a:latin typeface="Consolas" panose="020B0609020204030204" pitchFamily="49" charset="0"/>
-                <a:cs typeface="Consolas" panose="020B0609020204030204" pitchFamily="49" charset="0"/>
-              </a:rPr>
-              <a:t>Math.round</a:t>
-            </a:r>
-            <a:r>
-              <a:rPr lang="de-DE" sz="1600" dirty="0" smtClean="0">
-                <a:latin typeface="Consolas" panose="020B0609020204030204" pitchFamily="49" charset="0"/>
-                <a:cs typeface="Consolas" panose="020B0609020204030204" pitchFamily="49" charset="0"/>
-              </a:rPr>
-              <a:t>((</a:t>
-            </a:r>
-            <a:r>
-              <a:rPr lang="de-DE" sz="1600" dirty="0" err="1" smtClean="0">
-                <a:latin typeface="Consolas" panose="020B0609020204030204" pitchFamily="49" charset="0"/>
-                <a:cs typeface="Consolas" panose="020B0609020204030204" pitchFamily="49" charset="0"/>
-              </a:rPr>
-              <a:t>Math.random</a:t>
-            </a:r>
-            <a:r>
-              <a:rPr lang="de-DE" sz="1600" dirty="0" smtClean="0">
-                <a:latin typeface="Consolas" panose="020B0609020204030204" pitchFamily="49" charset="0"/>
-                <a:cs typeface="Consolas" panose="020B0609020204030204" pitchFamily="49" charset="0"/>
-              </a:rPr>
-              <a:t>() * </a:t>
-            </a:r>
-            <a:r>
-              <a:rPr lang="de-DE" sz="1600" dirty="0" err="1" smtClean="0">
-                <a:latin typeface="Consolas" panose="020B0609020204030204" pitchFamily="49" charset="0"/>
-                <a:cs typeface="Consolas" panose="020B0609020204030204" pitchFamily="49" charset="0"/>
-              </a:rPr>
-              <a:t>maxIndex</a:t>
-            </a:r>
-            <a:r>
-              <a:rPr lang="de-DE" sz="1600" dirty="0" smtClean="0">
-                <a:latin typeface="Consolas" panose="020B0609020204030204" pitchFamily="49" charset="0"/>
-                <a:cs typeface="Consolas" panose="020B0609020204030204" pitchFamily="49" charset="0"/>
-              </a:rPr>
-              <a:t>));</a:t>
-            </a:r>
-          </a:p>
-          <a:p>
-            <a:pPr lvl="3"/>
-            <a:r>
-              <a:rPr lang="en-US" sz="1600" dirty="0" smtClean="0">
-                <a:latin typeface="Consolas" panose="020B0609020204030204" pitchFamily="49" charset="0"/>
-                <a:cs typeface="Consolas" panose="020B0609020204030204" pitchFamily="49" charset="0"/>
-              </a:rPr>
-              <a:t>j = (</a:t>
-            </a:r>
-            <a:r>
-              <a:rPr lang="en-US" sz="1600" dirty="0" err="1" smtClean="0">
-                <a:latin typeface="Consolas" panose="020B0609020204030204" pitchFamily="49" charset="0"/>
-                <a:cs typeface="Consolas" panose="020B0609020204030204" pitchFamily="49" charset="0"/>
-              </a:rPr>
-              <a:t>int</a:t>
-            </a:r>
-            <a:r>
-              <a:rPr lang="en-US" sz="1600" dirty="0" smtClean="0">
-                <a:latin typeface="Consolas" panose="020B0609020204030204" pitchFamily="49" charset="0"/>
-                <a:cs typeface="Consolas" panose="020B0609020204030204" pitchFamily="49" charset="0"/>
-              </a:rPr>
-              <a:t>) </a:t>
-            </a:r>
-            <a:r>
-              <a:rPr lang="en-US" sz="1600" dirty="0" err="1" smtClean="0">
-                <a:latin typeface="Consolas" panose="020B0609020204030204" pitchFamily="49" charset="0"/>
-                <a:cs typeface="Consolas" panose="020B0609020204030204" pitchFamily="49" charset="0"/>
-              </a:rPr>
-              <a:t>Math.round</a:t>
-            </a:r>
-            <a:r>
-              <a:rPr lang="en-US" sz="1600" dirty="0" smtClean="0">
-                <a:latin typeface="Consolas" panose="020B0609020204030204" pitchFamily="49" charset="0"/>
-                <a:cs typeface="Consolas" panose="020B0609020204030204" pitchFamily="49" charset="0"/>
-              </a:rPr>
-              <a:t>((</a:t>
-            </a:r>
-            <a:r>
-              <a:rPr lang="en-US" sz="1600" dirty="0" err="1" smtClean="0">
-                <a:latin typeface="Consolas" panose="020B0609020204030204" pitchFamily="49" charset="0"/>
-                <a:cs typeface="Consolas" panose="020B0609020204030204" pitchFamily="49" charset="0"/>
-              </a:rPr>
-              <a:t>Math.random</a:t>
-            </a:r>
-            <a:r>
-              <a:rPr lang="en-US" sz="1600" dirty="0" smtClean="0">
-                <a:latin typeface="Consolas" panose="020B0609020204030204" pitchFamily="49" charset="0"/>
-                <a:cs typeface="Consolas" panose="020B0609020204030204" pitchFamily="49" charset="0"/>
-              </a:rPr>
-              <a:t>() * </a:t>
-            </a:r>
-            <a:r>
-              <a:rPr lang="en-US" sz="1600" dirty="0" err="1" smtClean="0">
-                <a:latin typeface="Consolas" panose="020B0609020204030204" pitchFamily="49" charset="0"/>
-                <a:cs typeface="Consolas" panose="020B0609020204030204" pitchFamily="49" charset="0"/>
-              </a:rPr>
-              <a:t>maxIndex</a:t>
-            </a:r>
-            <a:r>
-              <a:rPr lang="en-US" sz="1600" dirty="0" smtClean="0">
-                <a:latin typeface="Consolas" panose="020B0609020204030204" pitchFamily="49" charset="0"/>
-                <a:cs typeface="Consolas" panose="020B0609020204030204" pitchFamily="49" charset="0"/>
-              </a:rPr>
-              <a:t>));</a:t>
-            </a:r>
-          </a:p>
-          <a:p>
-            <a:pPr lvl="3"/>
-            <a:r>
-              <a:rPr lang="de-DE" sz="1600" dirty="0" err="1" smtClean="0">
-                <a:latin typeface="Consolas" panose="020B0609020204030204" pitchFamily="49" charset="0"/>
-                <a:cs typeface="Consolas" panose="020B0609020204030204" pitchFamily="49" charset="0"/>
-              </a:rPr>
-              <a:t>actMove</a:t>
-            </a:r>
-            <a:r>
-              <a:rPr lang="de-DE" sz="1600" dirty="0" smtClean="0">
-                <a:latin typeface="Consolas" panose="020B0609020204030204" pitchFamily="49" charset="0"/>
-                <a:cs typeface="Consolas" panose="020B0609020204030204" pitchFamily="49" charset="0"/>
-              </a:rPr>
-              <a:t> = </a:t>
-            </a:r>
-            <a:r>
-              <a:rPr lang="de-DE" sz="1600" dirty="0" err="1" smtClean="0">
-                <a:latin typeface="Consolas" panose="020B0609020204030204" pitchFamily="49" charset="0"/>
-                <a:cs typeface="Consolas" panose="020B0609020204030204" pitchFamily="49" charset="0"/>
-              </a:rPr>
-              <a:t>new</a:t>
-            </a:r>
-            <a:r>
-              <a:rPr lang="de-DE" sz="1600" dirty="0" smtClean="0">
-                <a:latin typeface="Consolas" panose="020B0609020204030204" pitchFamily="49" charset="0"/>
-                <a:cs typeface="Consolas" panose="020B0609020204030204" pitchFamily="49" charset="0"/>
-              </a:rPr>
-              <a:t> Move(i, j);</a:t>
-            </a:r>
-          </a:p>
-          <a:p>
-            <a:pPr lvl="2"/>
-            <a:r>
-              <a:rPr lang="de-DE" sz="1600" dirty="0" smtClean="0">
-                <a:latin typeface="Consolas" panose="020B0609020204030204" pitchFamily="49" charset="0"/>
-                <a:cs typeface="Consolas" panose="020B0609020204030204" pitchFamily="49" charset="0"/>
-              </a:rPr>
-              <a:t>} </a:t>
-            </a:r>
-            <a:r>
-              <a:rPr lang="de-DE" sz="1600" dirty="0" err="1" smtClean="0">
-                <a:latin typeface="Consolas" panose="020B0609020204030204" pitchFamily="49" charset="0"/>
-                <a:cs typeface="Consolas" panose="020B0609020204030204" pitchFamily="49" charset="0"/>
-              </a:rPr>
-              <a:t>while</a:t>
-            </a:r>
-            <a:r>
-              <a:rPr lang="de-DE" sz="1600" dirty="0" smtClean="0">
-                <a:latin typeface="Consolas" panose="020B0609020204030204" pitchFamily="49" charset="0"/>
-                <a:cs typeface="Consolas" panose="020B0609020204030204" pitchFamily="49" charset="0"/>
-              </a:rPr>
-              <a:t> (</a:t>
-            </a:r>
-            <a:r>
-              <a:rPr lang="de-DE" sz="1600" dirty="0" err="1" smtClean="0">
-                <a:latin typeface="Consolas" panose="020B0609020204030204" pitchFamily="49" charset="0"/>
-                <a:cs typeface="Consolas" panose="020B0609020204030204" pitchFamily="49" charset="0"/>
-              </a:rPr>
-              <a:t>triedMoves.contains</a:t>
-            </a:r>
-            <a:r>
-              <a:rPr lang="de-DE" sz="1600" dirty="0" smtClean="0">
-                <a:latin typeface="Consolas" panose="020B0609020204030204" pitchFamily="49" charset="0"/>
-                <a:cs typeface="Consolas" panose="020B0609020204030204" pitchFamily="49" charset="0"/>
-              </a:rPr>
-              <a:t>(</a:t>
-            </a:r>
-            <a:r>
-              <a:rPr lang="de-DE" sz="1600" dirty="0" err="1" smtClean="0">
-                <a:latin typeface="Consolas" panose="020B0609020204030204" pitchFamily="49" charset="0"/>
-                <a:cs typeface="Consolas" panose="020B0609020204030204" pitchFamily="49" charset="0"/>
-              </a:rPr>
-              <a:t>actMove</a:t>
-            </a:r>
-            <a:r>
-              <a:rPr lang="de-DE" sz="1600" dirty="0" smtClean="0">
-                <a:latin typeface="Consolas" panose="020B0609020204030204" pitchFamily="49" charset="0"/>
-                <a:cs typeface="Consolas" panose="020B0609020204030204" pitchFamily="49" charset="0"/>
-              </a:rPr>
-              <a:t>));</a:t>
-            </a:r>
-          </a:p>
-          <a:p>
-            <a:pPr lvl="2"/>
-            <a:endParaRPr lang="de-DE" sz="1600" dirty="0" smtClean="0">
+            <a:endParaRPr lang="de-DE" sz="1600" dirty="0">
               <a:latin typeface="Consolas" panose="020B0609020204030204" pitchFamily="49" charset="0"/>
               <a:cs typeface="Consolas" panose="020B0609020204030204" pitchFamily="49" charset="0"/>
             </a:endParaRPr>
           </a:p>
           <a:p>
-            <a:pPr lvl="2"/>
-            <a:r>
-              <a:rPr lang="de-DE" sz="1600" dirty="0" err="1" smtClean="0">
-                <a:latin typeface="Consolas" panose="020B0609020204030204" pitchFamily="49" charset="0"/>
-                <a:cs typeface="Consolas" panose="020B0609020204030204" pitchFamily="49" charset="0"/>
-              </a:rPr>
-              <a:t>triedMoves.add</a:t>
-            </a:r>
-            <a:r>
-              <a:rPr lang="de-DE" sz="1600" dirty="0" smtClean="0">
-                <a:latin typeface="Consolas" panose="020B0609020204030204" pitchFamily="49" charset="0"/>
-                <a:cs typeface="Consolas" panose="020B0609020204030204" pitchFamily="49" charset="0"/>
-              </a:rPr>
-              <a:t>(</a:t>
-            </a:r>
-            <a:r>
-              <a:rPr lang="de-DE" sz="1600" dirty="0" err="1" smtClean="0">
-                <a:latin typeface="Consolas" panose="020B0609020204030204" pitchFamily="49" charset="0"/>
-                <a:cs typeface="Consolas" panose="020B0609020204030204" pitchFamily="49" charset="0"/>
-              </a:rPr>
-              <a:t>actMove</a:t>
-            </a:r>
-            <a:r>
-              <a:rPr lang="de-DE" sz="1600" dirty="0" smtClean="0">
-                <a:latin typeface="Consolas" panose="020B0609020204030204" pitchFamily="49" charset="0"/>
-                <a:cs typeface="Consolas" panose="020B0609020204030204" pitchFamily="49" charset="0"/>
-              </a:rPr>
-              <a:t>);</a:t>
+            <a:r>
+              <a:rPr lang="de-DE" sz="1600" dirty="0">
+                <a:latin typeface="Consolas" panose="020B0609020204030204" pitchFamily="49" charset="0"/>
+                <a:cs typeface="Consolas" panose="020B0609020204030204" pitchFamily="49" charset="0"/>
+              </a:rPr>
+              <a:t>	List&lt;Move&gt; </a:t>
+            </a:r>
+            <a:r>
+              <a:rPr lang="de-DE" sz="1600" dirty="0" err="1">
+                <a:latin typeface="Consolas" panose="020B0609020204030204" pitchFamily="49" charset="0"/>
+                <a:cs typeface="Consolas" panose="020B0609020204030204" pitchFamily="49" charset="0"/>
+              </a:rPr>
+              <a:t>possibleMoves</a:t>
+            </a:r>
+            <a:r>
+              <a:rPr lang="de-DE" sz="1600" dirty="0">
+                <a:latin typeface="Consolas" panose="020B0609020204030204" pitchFamily="49" charset="0"/>
+                <a:cs typeface="Consolas" panose="020B0609020204030204" pitchFamily="49" charset="0"/>
+              </a:rPr>
+              <a:t> = </a:t>
+            </a:r>
+            <a:r>
+              <a:rPr lang="de-DE" sz="1600" dirty="0" err="1">
+                <a:latin typeface="Consolas" panose="020B0609020204030204" pitchFamily="49" charset="0"/>
+                <a:cs typeface="Consolas" panose="020B0609020204030204" pitchFamily="49" charset="0"/>
+              </a:rPr>
+              <a:t>board.getPossibleMoves</a:t>
+            </a:r>
+            <a:r>
+              <a:rPr lang="de-DE" sz="1600" dirty="0">
+                <a:latin typeface="Consolas" panose="020B0609020204030204" pitchFamily="49" charset="0"/>
+                <a:cs typeface="Consolas" panose="020B0609020204030204" pitchFamily="49" charset="0"/>
+              </a:rPr>
+              <a:t>();</a:t>
             </a:r>
           </a:p>
           <a:p>
-            <a:pPr lvl="2"/>
-            <a:endParaRPr lang="de-DE" sz="1600" dirty="0" smtClean="0">
+            <a:r>
+              <a:rPr lang="de-DE" sz="1600" dirty="0">
+                <a:latin typeface="Consolas" panose="020B0609020204030204" pitchFamily="49" charset="0"/>
+                <a:cs typeface="Consolas" panose="020B0609020204030204" pitchFamily="49" charset="0"/>
+              </a:rPr>
+              <a:t>	</a:t>
+            </a:r>
+            <a:r>
+              <a:rPr lang="de-DE" sz="1600" dirty="0" err="1">
+                <a:latin typeface="Consolas" panose="020B0609020204030204" pitchFamily="49" charset="0"/>
+                <a:cs typeface="Consolas" panose="020B0609020204030204" pitchFamily="49" charset="0"/>
+              </a:rPr>
+              <a:t>int</a:t>
+            </a:r>
+            <a:r>
+              <a:rPr lang="de-DE" sz="1600" dirty="0">
+                <a:latin typeface="Consolas" panose="020B0609020204030204" pitchFamily="49" charset="0"/>
+                <a:cs typeface="Consolas" panose="020B0609020204030204" pitchFamily="49" charset="0"/>
+              </a:rPr>
+              <a:t> </a:t>
+            </a:r>
+            <a:r>
+              <a:rPr lang="de-DE" sz="1600" dirty="0" err="1">
+                <a:latin typeface="Consolas" panose="020B0609020204030204" pitchFamily="49" charset="0"/>
+                <a:cs typeface="Consolas" panose="020B0609020204030204" pitchFamily="49" charset="0"/>
+              </a:rPr>
+              <a:t>size</a:t>
+            </a:r>
+            <a:r>
+              <a:rPr lang="de-DE" sz="1600" dirty="0">
+                <a:latin typeface="Consolas" panose="020B0609020204030204" pitchFamily="49" charset="0"/>
+                <a:cs typeface="Consolas" panose="020B0609020204030204" pitchFamily="49" charset="0"/>
+              </a:rPr>
+              <a:t> = </a:t>
+            </a:r>
+            <a:r>
+              <a:rPr lang="de-DE" sz="1600" dirty="0" err="1">
+                <a:latin typeface="Consolas" panose="020B0609020204030204" pitchFamily="49" charset="0"/>
+                <a:cs typeface="Consolas" panose="020B0609020204030204" pitchFamily="49" charset="0"/>
+              </a:rPr>
+              <a:t>possibleMoves.size</a:t>
+            </a:r>
+            <a:r>
+              <a:rPr lang="de-DE" sz="1600" dirty="0">
+                <a:latin typeface="Consolas" panose="020B0609020204030204" pitchFamily="49" charset="0"/>
+                <a:cs typeface="Consolas" panose="020B0609020204030204" pitchFamily="49" charset="0"/>
+              </a:rPr>
+              <a:t>();</a:t>
+            </a:r>
+          </a:p>
+          <a:p>
+            <a:endParaRPr lang="de-DE" sz="1600" dirty="0">
               <a:latin typeface="Consolas" panose="020B0609020204030204" pitchFamily="49" charset="0"/>
               <a:cs typeface="Consolas" panose="020B0609020204030204" pitchFamily="49" charset="0"/>
             </a:endParaRPr>
           </a:p>
           <a:p>
-            <a:pPr lvl="2"/>
-            <a:r>
-              <a:rPr lang="de-DE" sz="1600" dirty="0" err="1" smtClean="0">
+            <a:r>
+              <a:rPr lang="de-DE" sz="1600" dirty="0">
+                <a:latin typeface="Consolas" panose="020B0609020204030204" pitchFamily="49" charset="0"/>
+                <a:cs typeface="Consolas" panose="020B0609020204030204" pitchFamily="49" charset="0"/>
+              </a:rPr>
+              <a:t>	</a:t>
+            </a:r>
+            <a:r>
+              <a:rPr lang="de-DE" sz="1600" dirty="0" err="1">
                 <a:latin typeface="Consolas" panose="020B0609020204030204" pitchFamily="49" charset="0"/>
                 <a:cs typeface="Consolas" panose="020B0609020204030204" pitchFamily="49" charset="0"/>
               </a:rPr>
               <a:t>if</a:t>
             </a:r>
             <a:r>
-              <a:rPr lang="de-DE" sz="1600" dirty="0" smtClean="0">
+              <a:rPr lang="de-DE" sz="1600" dirty="0">
                 <a:latin typeface="Consolas" panose="020B0609020204030204" pitchFamily="49" charset="0"/>
                 <a:cs typeface="Consolas" panose="020B0609020204030204" pitchFamily="49" charset="0"/>
               </a:rPr>
               <a:t> (</a:t>
             </a:r>
             <a:r>
-              <a:rPr lang="de-DE" sz="1600" dirty="0" err="1" smtClean="0">
-                <a:latin typeface="Consolas" panose="020B0609020204030204" pitchFamily="49" charset="0"/>
-                <a:cs typeface="Consolas" panose="020B0609020204030204" pitchFamily="49" charset="0"/>
-              </a:rPr>
-              <a:t>board.read</a:t>
-            </a:r>
-            <a:r>
-              <a:rPr lang="de-DE" sz="1600" dirty="0" smtClean="0">
-                <a:latin typeface="Consolas" panose="020B0609020204030204" pitchFamily="49" charset="0"/>
-                <a:cs typeface="Consolas" panose="020B0609020204030204" pitchFamily="49" charset="0"/>
-              </a:rPr>
-              <a:t>(i, j) == </a:t>
-            </a:r>
-            <a:r>
-              <a:rPr lang="de-DE" sz="1600" dirty="0" err="1" smtClean="0">
-                <a:latin typeface="Consolas" panose="020B0609020204030204" pitchFamily="49" charset="0"/>
-                <a:cs typeface="Consolas" panose="020B0609020204030204" pitchFamily="49" charset="0"/>
-              </a:rPr>
-              <a:t>FieldState.EMPTY</a:t>
-            </a:r>
-            <a:r>
-              <a:rPr lang="de-DE" sz="1600" dirty="0" smtClean="0">
-                <a:latin typeface="Consolas" panose="020B0609020204030204" pitchFamily="49" charset="0"/>
-                <a:cs typeface="Consolas" panose="020B0609020204030204" pitchFamily="49" charset="0"/>
-              </a:rPr>
-              <a:t>) {</a:t>
+              <a:rPr lang="de-DE" sz="1600" dirty="0" err="1">
+                <a:latin typeface="Consolas" panose="020B0609020204030204" pitchFamily="49" charset="0"/>
+                <a:cs typeface="Consolas" panose="020B0609020204030204" pitchFamily="49" charset="0"/>
+              </a:rPr>
+              <a:t>size</a:t>
+            </a:r>
+            <a:r>
+              <a:rPr lang="de-DE" sz="1600" dirty="0">
+                <a:latin typeface="Consolas" panose="020B0609020204030204" pitchFamily="49" charset="0"/>
+                <a:cs typeface="Consolas" panose="020B0609020204030204" pitchFamily="49" charset="0"/>
+              </a:rPr>
+              <a:t> == 0) {</a:t>
             </a:r>
           </a:p>
           <a:p>
-            <a:pPr lvl="2"/>
-            <a:r>
-              <a:rPr lang="de-DE" sz="1600" dirty="0" err="1" smtClean="0">
+            <a:r>
+              <a:rPr lang="de-DE" sz="1600" dirty="0">
+                <a:latin typeface="Consolas" panose="020B0609020204030204" pitchFamily="49" charset="0"/>
+                <a:cs typeface="Consolas" panose="020B0609020204030204" pitchFamily="49" charset="0"/>
+              </a:rPr>
+              <a:t>		</a:t>
+            </a:r>
+            <a:r>
+              <a:rPr lang="de-DE" sz="1600" dirty="0" err="1">
                 <a:latin typeface="Consolas" panose="020B0609020204030204" pitchFamily="49" charset="0"/>
                 <a:cs typeface="Consolas" panose="020B0609020204030204" pitchFamily="49" charset="0"/>
               </a:rPr>
               <a:t>return</a:t>
             </a:r>
             <a:r>
-              <a:rPr lang="de-DE" sz="1600" dirty="0" smtClean="0">
-                <a:latin typeface="Consolas" panose="020B0609020204030204" pitchFamily="49" charset="0"/>
-                <a:cs typeface="Consolas" panose="020B0609020204030204" pitchFamily="49" charset="0"/>
-              </a:rPr>
-              <a:t> </a:t>
-            </a:r>
-            <a:r>
-              <a:rPr lang="de-DE" sz="1600" dirty="0" err="1" smtClean="0">
-                <a:latin typeface="Consolas" panose="020B0609020204030204" pitchFamily="49" charset="0"/>
-                <a:cs typeface="Consolas" panose="020B0609020204030204" pitchFamily="49" charset="0"/>
-              </a:rPr>
-              <a:t>actMove</a:t>
-            </a:r>
-            <a:r>
-              <a:rPr lang="de-DE" sz="1600" dirty="0" smtClean="0">
-                <a:latin typeface="Consolas" panose="020B0609020204030204" pitchFamily="49" charset="0"/>
-                <a:cs typeface="Consolas" panose="020B0609020204030204" pitchFamily="49" charset="0"/>
-              </a:rPr>
-              <a:t>;</a:t>
+              <a:rPr lang="de-DE" sz="1600" dirty="0">
+                <a:latin typeface="Consolas" panose="020B0609020204030204" pitchFamily="49" charset="0"/>
+                <a:cs typeface="Consolas" panose="020B0609020204030204" pitchFamily="49" charset="0"/>
+              </a:rPr>
+              <a:t> null;</a:t>
             </a:r>
           </a:p>
           <a:p>
-            <a:pPr lvl="2"/>
-            <a:r>
-              <a:rPr lang="de-DE" sz="1600" dirty="0" smtClean="0">
-                <a:latin typeface="Consolas" panose="020B0609020204030204" pitchFamily="49" charset="0"/>
-                <a:cs typeface="Consolas" panose="020B0609020204030204" pitchFamily="49" charset="0"/>
-              </a:rPr>
-              <a:t>}</a:t>
+            <a:r>
+              <a:rPr lang="de-DE" sz="1600" dirty="0">
+                <a:latin typeface="Consolas" panose="020B0609020204030204" pitchFamily="49" charset="0"/>
+                <a:cs typeface="Consolas" panose="020B0609020204030204" pitchFamily="49" charset="0"/>
+              </a:rPr>
+              <a:t>	}</a:t>
             </a:r>
           </a:p>
           <a:p>
-            <a:pPr lvl="1"/>
-            <a:r>
-              <a:rPr lang="de-DE" sz="1600" dirty="0" smtClean="0">
-                <a:latin typeface="Consolas" panose="020B0609020204030204" pitchFamily="49" charset="0"/>
-                <a:cs typeface="Consolas" panose="020B0609020204030204" pitchFamily="49" charset="0"/>
-              </a:rPr>
-              <a:t>} </a:t>
-            </a:r>
-            <a:r>
-              <a:rPr lang="de-DE" sz="1600" dirty="0" err="1" smtClean="0">
-                <a:latin typeface="Consolas" panose="020B0609020204030204" pitchFamily="49" charset="0"/>
-                <a:cs typeface="Consolas" panose="020B0609020204030204" pitchFamily="49" charset="0"/>
-              </a:rPr>
-              <a:t>while</a:t>
-            </a:r>
-            <a:r>
-              <a:rPr lang="de-DE" sz="1600" dirty="0" smtClean="0">
-                <a:latin typeface="Consolas" panose="020B0609020204030204" pitchFamily="49" charset="0"/>
-                <a:cs typeface="Consolas" panose="020B0609020204030204" pitchFamily="49" charset="0"/>
-              </a:rPr>
-              <a:t> (</a:t>
-            </a:r>
-            <a:r>
-              <a:rPr lang="de-DE" sz="1600" dirty="0" err="1" smtClean="0">
-                <a:latin typeface="Consolas" panose="020B0609020204030204" pitchFamily="49" charset="0"/>
-                <a:cs typeface="Consolas" panose="020B0609020204030204" pitchFamily="49" charset="0"/>
-              </a:rPr>
-              <a:t>triedMoves.size</a:t>
-            </a:r>
-            <a:r>
-              <a:rPr lang="de-DE" sz="1600" dirty="0" smtClean="0">
-                <a:latin typeface="Consolas" panose="020B0609020204030204" pitchFamily="49" charset="0"/>
-                <a:cs typeface="Consolas" panose="020B0609020204030204" pitchFamily="49" charset="0"/>
-              </a:rPr>
-              <a:t>() &lt; </a:t>
-            </a:r>
-            <a:r>
-              <a:rPr lang="de-DE" sz="1600" dirty="0" err="1" smtClean="0">
-                <a:latin typeface="Consolas" panose="020B0609020204030204" pitchFamily="49" charset="0"/>
-                <a:cs typeface="Consolas" panose="020B0609020204030204" pitchFamily="49" charset="0"/>
-              </a:rPr>
-              <a:t>maxTries</a:t>
-            </a:r>
-            <a:r>
-              <a:rPr lang="de-DE" sz="1600" dirty="0" smtClean="0">
-                <a:latin typeface="Consolas" panose="020B0609020204030204" pitchFamily="49" charset="0"/>
-                <a:cs typeface="Consolas" panose="020B0609020204030204" pitchFamily="49" charset="0"/>
-              </a:rPr>
-              <a:t>);</a:t>
+            <a:r>
+              <a:rPr lang="de-DE" sz="1600" dirty="0">
+                <a:latin typeface="Consolas" panose="020B0609020204030204" pitchFamily="49" charset="0"/>
+                <a:cs typeface="Consolas" panose="020B0609020204030204" pitchFamily="49" charset="0"/>
+              </a:rPr>
+              <a:t>	</a:t>
+            </a:r>
+            <a:r>
+              <a:rPr lang="de-DE" sz="1600" dirty="0" err="1">
+                <a:latin typeface="Consolas" panose="020B0609020204030204" pitchFamily="49" charset="0"/>
+                <a:cs typeface="Consolas" panose="020B0609020204030204" pitchFamily="49" charset="0"/>
+              </a:rPr>
+              <a:t>int</a:t>
+            </a:r>
+            <a:r>
+              <a:rPr lang="de-DE" sz="1600" dirty="0">
+                <a:latin typeface="Consolas" panose="020B0609020204030204" pitchFamily="49" charset="0"/>
+                <a:cs typeface="Consolas" panose="020B0609020204030204" pitchFamily="49" charset="0"/>
+              </a:rPr>
+              <a:t> </a:t>
+            </a:r>
+            <a:r>
+              <a:rPr lang="de-DE" sz="1600" dirty="0" err="1">
+                <a:latin typeface="Consolas" panose="020B0609020204030204" pitchFamily="49" charset="0"/>
+                <a:cs typeface="Consolas" panose="020B0609020204030204" pitchFamily="49" charset="0"/>
+              </a:rPr>
+              <a:t>randomMove</a:t>
+            </a:r>
+            <a:r>
+              <a:rPr lang="de-DE" sz="1600" dirty="0">
+                <a:latin typeface="Consolas" panose="020B0609020204030204" pitchFamily="49" charset="0"/>
+                <a:cs typeface="Consolas" panose="020B0609020204030204" pitchFamily="49" charset="0"/>
+              </a:rPr>
+              <a:t> = (</a:t>
+            </a:r>
+            <a:r>
+              <a:rPr lang="de-DE" sz="1600" dirty="0" err="1">
+                <a:latin typeface="Consolas" panose="020B0609020204030204" pitchFamily="49" charset="0"/>
+                <a:cs typeface="Consolas" panose="020B0609020204030204" pitchFamily="49" charset="0"/>
+              </a:rPr>
+              <a:t>int</a:t>
+            </a:r>
+            <a:r>
+              <a:rPr lang="de-DE" sz="1600" dirty="0">
+                <a:latin typeface="Consolas" panose="020B0609020204030204" pitchFamily="49" charset="0"/>
+                <a:cs typeface="Consolas" panose="020B0609020204030204" pitchFamily="49" charset="0"/>
+              </a:rPr>
+              <a:t>) </a:t>
+            </a:r>
+            <a:r>
+              <a:rPr lang="de-DE" sz="1600" dirty="0" err="1">
+                <a:latin typeface="Consolas" panose="020B0609020204030204" pitchFamily="49" charset="0"/>
+                <a:cs typeface="Consolas" panose="020B0609020204030204" pitchFamily="49" charset="0"/>
+              </a:rPr>
+              <a:t>Math.round</a:t>
+            </a:r>
+            <a:r>
+              <a:rPr lang="de-DE" sz="1600" dirty="0">
+                <a:latin typeface="Consolas" panose="020B0609020204030204" pitchFamily="49" charset="0"/>
+                <a:cs typeface="Consolas" panose="020B0609020204030204" pitchFamily="49" charset="0"/>
+              </a:rPr>
+              <a:t>((</a:t>
+            </a:r>
+            <a:r>
+              <a:rPr lang="de-DE" sz="1600" dirty="0" err="1">
+                <a:latin typeface="Consolas" panose="020B0609020204030204" pitchFamily="49" charset="0"/>
+                <a:cs typeface="Consolas" panose="020B0609020204030204" pitchFamily="49" charset="0"/>
+              </a:rPr>
+              <a:t>Math.random</a:t>
+            </a:r>
+            <a:r>
+              <a:rPr lang="de-DE" sz="1600" dirty="0">
+                <a:latin typeface="Consolas" panose="020B0609020204030204" pitchFamily="49" charset="0"/>
+                <a:cs typeface="Consolas" panose="020B0609020204030204" pitchFamily="49" charset="0"/>
+              </a:rPr>
+              <a:t>() * (</a:t>
+            </a:r>
+            <a:r>
+              <a:rPr lang="de-DE" sz="1600" dirty="0" err="1">
+                <a:latin typeface="Consolas" panose="020B0609020204030204" pitchFamily="49" charset="0"/>
+                <a:cs typeface="Consolas" panose="020B0609020204030204" pitchFamily="49" charset="0"/>
+              </a:rPr>
+              <a:t>size</a:t>
+            </a:r>
+            <a:r>
+              <a:rPr lang="de-DE" sz="1600" dirty="0">
+                <a:latin typeface="Consolas" panose="020B0609020204030204" pitchFamily="49" charset="0"/>
+                <a:cs typeface="Consolas" panose="020B0609020204030204" pitchFamily="49" charset="0"/>
+              </a:rPr>
+              <a:t> - 1)));</a:t>
             </a:r>
           </a:p>
           <a:p>
-            <a:pPr lvl="1"/>
-            <a:r>
-              <a:rPr lang="de-DE" sz="1600" dirty="0" err="1" smtClean="0">
+            <a:r>
+              <a:rPr lang="de-DE" sz="1600" dirty="0">
+                <a:latin typeface="Consolas" panose="020B0609020204030204" pitchFamily="49" charset="0"/>
+                <a:cs typeface="Consolas" panose="020B0609020204030204" pitchFamily="49" charset="0"/>
+              </a:rPr>
+              <a:t>	</a:t>
+            </a:r>
+            <a:r>
+              <a:rPr lang="de-DE" sz="1600" dirty="0" err="1">
                 <a:latin typeface="Consolas" panose="020B0609020204030204" pitchFamily="49" charset="0"/>
                 <a:cs typeface="Consolas" panose="020B0609020204030204" pitchFamily="49" charset="0"/>
               </a:rPr>
               <a:t>return</a:t>
             </a:r>
             <a:r>
-              <a:rPr lang="de-DE" sz="1600" dirty="0" smtClean="0">
-                <a:latin typeface="Consolas" panose="020B0609020204030204" pitchFamily="49" charset="0"/>
-                <a:cs typeface="Consolas" panose="020B0609020204030204" pitchFamily="49" charset="0"/>
-              </a:rPr>
-              <a:t> null;</a:t>
+              <a:rPr lang="de-DE" sz="1600" dirty="0">
+                <a:latin typeface="Consolas" panose="020B0609020204030204" pitchFamily="49" charset="0"/>
+                <a:cs typeface="Consolas" panose="020B0609020204030204" pitchFamily="49" charset="0"/>
+              </a:rPr>
+              <a:t> </a:t>
+            </a:r>
+            <a:r>
+              <a:rPr lang="de-DE" sz="1600" dirty="0" err="1">
+                <a:latin typeface="Consolas" panose="020B0609020204030204" pitchFamily="49" charset="0"/>
+                <a:cs typeface="Consolas" panose="020B0609020204030204" pitchFamily="49" charset="0"/>
+              </a:rPr>
+              <a:t>possibleMoves.get</a:t>
+            </a:r>
+            <a:r>
+              <a:rPr lang="de-DE" sz="1600" dirty="0">
+                <a:latin typeface="Consolas" panose="020B0609020204030204" pitchFamily="49" charset="0"/>
+                <a:cs typeface="Consolas" panose="020B0609020204030204" pitchFamily="49" charset="0"/>
+              </a:rPr>
+              <a:t>(</a:t>
+            </a:r>
+            <a:r>
+              <a:rPr lang="de-DE" sz="1600" dirty="0" err="1">
+                <a:latin typeface="Consolas" panose="020B0609020204030204" pitchFamily="49" charset="0"/>
+                <a:cs typeface="Consolas" panose="020B0609020204030204" pitchFamily="49" charset="0"/>
+              </a:rPr>
+              <a:t>randomMove</a:t>
+            </a:r>
+            <a:r>
+              <a:rPr lang="de-DE" sz="1600" dirty="0">
+                <a:latin typeface="Consolas" panose="020B0609020204030204" pitchFamily="49" charset="0"/>
+                <a:cs typeface="Consolas" panose="020B0609020204030204" pitchFamily="49" charset="0"/>
+              </a:rPr>
+              <a:t>);</a:t>
             </a:r>
           </a:p>
           <a:p>
             <a:r>
-              <a:rPr lang="de-DE" sz="1600" dirty="0" smtClean="0">
+              <a:rPr lang="de-DE" sz="1600" dirty="0">
                 <a:latin typeface="Consolas" panose="020B0609020204030204" pitchFamily="49" charset="0"/>
                 <a:cs typeface="Consolas" panose="020B0609020204030204" pitchFamily="49" charset="0"/>
               </a:rPr>
               <a:t>}</a:t>
             </a:r>
-            <a:endParaRPr lang="de-DE" sz="1600" dirty="0">
-              <a:latin typeface="Consolas" panose="020B0609020204030204" pitchFamily="49" charset="0"/>
-              <a:cs typeface="Consolas" panose="020B0609020204030204" pitchFamily="49" charset="0"/>
-            </a:endParaRPr>
           </a:p>
         </p:txBody>
       </p:sp>
@@ -43367,7 +43112,7 @@
           <a:p>
             <a:fld id="{62A8A28E-B5F5-41EE-B009-8D872471EF33}" type="datetime1">
               <a:rPr lang="de-DE" smtClean="0"/>
-              <a:t>01.12.2016</a:t>
+              <a:t>02.12.2016</a:t>
             </a:fld>
             <a:endParaRPr lang="de-DE"/>
           </a:p>
@@ -43533,7 +43278,7 @@
           <a:p>
             <a:fld id="{62A8A28E-B5F5-41EE-B009-8D872471EF33}" type="datetime1">
               <a:rPr lang="de-DE" smtClean="0"/>
-              <a:t>01.12.2016</a:t>
+              <a:t>02.12.2016</a:t>
             </a:fld>
             <a:endParaRPr lang="de-DE"/>
           </a:p>
@@ -44812,7 +44557,7 @@
           <a:p>
             <a:fld id="{62A8A28E-B5F5-41EE-B009-8D872471EF33}" type="datetime1">
               <a:rPr lang="de-DE" smtClean="0"/>
-              <a:t>01.12.2016</a:t>
+              <a:t>02.12.2016</a:t>
             </a:fld>
             <a:endParaRPr lang="de-DE"/>
           </a:p>
@@ -45868,7 +45613,7 @@
           <a:p>
             <a:fld id="{62A8A28E-B5F5-41EE-B009-8D872471EF33}" type="datetime1">
               <a:rPr lang="de-DE" smtClean="0"/>
-              <a:t>01.12.2016</a:t>
+              <a:t>02.12.2016</a:t>
             </a:fld>
             <a:endParaRPr lang="de-DE"/>
           </a:p>
@@ -47063,7 +46808,7 @@
           <a:p>
             <a:fld id="{62A8A28E-B5F5-41EE-B009-8D872471EF33}" type="datetime1">
               <a:rPr lang="de-DE" smtClean="0"/>
-              <a:t>01.12.2016</a:t>
+              <a:t>02.12.2016</a:t>
             </a:fld>
             <a:endParaRPr lang="de-DE"/>
           </a:p>
@@ -47222,11 +46967,7 @@
             </a:r>
             <a:r>
               <a:rPr lang="de-DE" sz="2800" dirty="0" smtClean="0"/>
-              <a:t> </a:t>
-            </a:r>
-            <a:r>
-              <a:rPr lang="de-DE" sz="2800" dirty="0" smtClean="0"/>
-              <a:t>Berechnung (Heuristisch):</a:t>
+              <a:t> Berechnung (Heuristisch):</a:t>
             </a:r>
           </a:p>
           <a:p>
@@ -47534,7 +47275,7 @@
           <a:p>
             <a:fld id="{62A8A28E-B5F5-41EE-B009-8D872471EF33}" type="datetime1">
               <a:rPr lang="de-DE" smtClean="0"/>
-              <a:t>01.12.2016</a:t>
+              <a:t>02.12.2016</a:t>
             </a:fld>
             <a:endParaRPr lang="de-DE"/>
           </a:p>
@@ -49068,7 +48809,7 @@
             <p:ph idx="1"/>
             <p:extLst>
               <p:ext uri="{D42A27DB-BD31-4B8C-83A1-F6EECF244321}">
-                <p14:modId xmlns:p14="http://schemas.microsoft.com/office/powerpoint/2010/main" val="2077351876"/>
+                <p14:modId xmlns:p14="http://schemas.microsoft.com/office/powerpoint/2010/main" val="2491599456"/>
               </p:ext>
             </p:extLst>
           </p:nvPr>
@@ -49100,7 +48841,7 @@
           <a:p>
             <a:fld id="{62A8A28E-B5F5-41EE-B009-8D872471EF33}" type="datetime1">
               <a:rPr lang="de-DE" smtClean="0"/>
-              <a:t>01.12.2016</a:t>
+              <a:t>02.12.2016</a:t>
             </a:fld>
             <a:endParaRPr lang="de-DE"/>
           </a:p>
@@ -49440,15 +49181,7 @@
           <a:p>
             <a:r>
               <a:rPr lang="de-DE" sz="2800" dirty="0" smtClean="0"/>
-              <a:t>Laufzeit </a:t>
-            </a:r>
-            <a:r>
-              <a:rPr lang="de-DE" sz="2800" dirty="0" smtClean="0"/>
-              <a:t>wird mit </a:t>
-            </a:r>
-            <a:r>
-              <a:rPr lang="de-DE" sz="2800" dirty="0" smtClean="0"/>
-              <a:t>steigender Suchtiefe deutlich verbessert</a:t>
+              <a:t>Laufzeit wird mit steigender Suchtiefe deutlich verbessert</a:t>
             </a:r>
           </a:p>
           <a:p>

</xml_diff>